<commit_message>
add graph of leaf, add graphs to slides
</commit_message>
<xml_diff>
--- a/Spectra.of.the.Moon.using.a.Robotic.Telescope.pptx
+++ b/Spectra.of.the.Moon.using.a.Robotic.Telescope.pptx
@@ -6,6 +6,8 @@
   </p:sldMasterIdLst>
   <p:sldIdLst>
     <p:sldId id="256" r:id="rId2"/>
+    <p:sldId id="257" r:id="rId3"/>
+    <p:sldId id="258" r:id="rId4"/>
   </p:sldIdLst>
   <p:sldSz cx="12192000" cy="6858000"/>
   <p:notesSz cx="6858000" cy="9144000"/>
@@ -104,7 +106,2019 @@
       </a:defRPr>
     </a:lvl9pPr>
   </p:defaultTextStyle>
+  <p:extLst>
+    <p:ext uri="{EFAFB233-063F-42B5-8137-9DF3F51BA10A}">
+      <p15:sldGuideLst xmlns:p15="http://schemas.microsoft.com/office/powerpoint/2012/main"/>
+    </p:ext>
+  </p:extLst>
 </p:presentation>
+</file>
+
+<file path=ppt/charts/chart1.xml><?xml version="1.0" encoding="utf-8"?>
+<c:chartSpace xmlns:c="http://schemas.openxmlformats.org/drawingml/2006/chart" xmlns:a="http://schemas.openxmlformats.org/drawingml/2006/main" xmlns:r="http://schemas.openxmlformats.org/officeDocument/2006/relationships">
+  <c:date1904 val="0"/>
+  <c:lang val="en-US"/>
+  <c:roundedCorners val="0"/>
+  <mc:AlternateContent xmlns:mc="http://schemas.openxmlformats.org/markup-compatibility/2006">
+    <mc:Choice xmlns:c14="http://schemas.microsoft.com/office/drawing/2007/8/2/chart" Requires="c14">
+      <c14:style val="102"/>
+    </mc:Choice>
+    <mc:Fallback>
+      <c:style val="2"/>
+    </mc:Fallback>
+  </mc:AlternateContent>
+  <c:chart>
+    <c:autoTitleDeleted val="0"/>
+    <c:plotArea>
+      <c:layout>
+        <c:manualLayout>
+          <c:layoutTarget val="inner"/>
+          <c:xMode val="edge"/>
+          <c:yMode val="edge"/>
+          <c:x val="7.4467766775246413E-2"/>
+          <c:y val="1.8870023950920699E-2"/>
+          <c:w val="0.77972393278292906"/>
+          <c:h val="0.90600689782041099"/>
+        </c:manualLayout>
+      </c:layout>
+      <c:scatterChart>
+        <c:scatterStyle val="smoothMarker"/>
+        <c:varyColors val="0"/>
+        <c:ser>
+          <c:idx val="4"/>
+          <c:order val="0"/>
+          <c:tx>
+            <c:strRef>
+              <c:f>Sheet1!$G$18</c:f>
+              <c:strCache>
+                <c:ptCount val="1"/>
+                <c:pt idx="0">
+                  <c:v>Blue(ish) Carpet: </c:v>
+                </c:pt>
+              </c:strCache>
+            </c:strRef>
+          </c:tx>
+          <c:marker>
+            <c:symbol val="x"/>
+            <c:size val="7"/>
+            <c:spPr>
+              <a:ln>
+                <a:solidFill>
+                  <a:schemeClr val="tx1"/>
+                </a:solidFill>
+              </a:ln>
+            </c:spPr>
+          </c:marker>
+          <c:xVal>
+            <c:numRef>
+              <c:f>Sheet1!$B$19:$B$27</c:f>
+              <c:numCache>
+                <c:formatCode>General</c:formatCode>
+                <c:ptCount val="9"/>
+                <c:pt idx="0">
+                  <c:v>470</c:v>
+                </c:pt>
+                <c:pt idx="1">
+                  <c:v>555</c:v>
+                </c:pt>
+                <c:pt idx="2">
+                  <c:v>585</c:v>
+                </c:pt>
+                <c:pt idx="3">
+                  <c:v>605</c:v>
+                </c:pt>
+                <c:pt idx="4">
+                  <c:v>635</c:v>
+                </c:pt>
+                <c:pt idx="5">
+                  <c:v>660</c:v>
+                </c:pt>
+                <c:pt idx="6">
+                  <c:v>695</c:v>
+                </c:pt>
+                <c:pt idx="7">
+                  <c:v>880</c:v>
+                </c:pt>
+                <c:pt idx="8">
+                  <c:v>940</c:v>
+                </c:pt>
+              </c:numCache>
+            </c:numRef>
+          </c:xVal>
+          <c:yVal>
+            <c:numRef>
+              <c:f>Sheet1!$G$19:$G$27</c:f>
+              <c:numCache>
+                <c:formatCode>General</c:formatCode>
+                <c:ptCount val="9"/>
+                <c:pt idx="0">
+                  <c:v>240</c:v>
+                </c:pt>
+                <c:pt idx="1">
+                  <c:v>278</c:v>
+                </c:pt>
+                <c:pt idx="2">
+                  <c:v>258</c:v>
+                </c:pt>
+                <c:pt idx="3">
+                  <c:v>259</c:v>
+                </c:pt>
+                <c:pt idx="4">
+                  <c:v>250</c:v>
+                </c:pt>
+                <c:pt idx="5">
+                  <c:v>280</c:v>
+                </c:pt>
+                <c:pt idx="6">
+                  <c:v>300</c:v>
+                </c:pt>
+                <c:pt idx="7">
+                  <c:v>280</c:v>
+                </c:pt>
+                <c:pt idx="8">
+                  <c:v>215</c:v>
+                </c:pt>
+              </c:numCache>
+            </c:numRef>
+          </c:yVal>
+          <c:smooth val="1"/>
+        </c:ser>
+        <c:ser>
+          <c:idx val="10"/>
+          <c:order val="1"/>
+          <c:tx>
+            <c:strRef>
+              <c:f>Sheet1!$M$18</c:f>
+              <c:strCache>
+                <c:ptCount val="1"/>
+                <c:pt idx="0">
+                  <c:v>Blue pin board: </c:v>
+                </c:pt>
+              </c:strCache>
+            </c:strRef>
+          </c:tx>
+          <c:spPr>
+            <a:ln>
+              <a:solidFill>
+                <a:srgbClr val="00B0F0"/>
+              </a:solidFill>
+            </a:ln>
+          </c:spPr>
+          <c:marker>
+            <c:symbol val="x"/>
+            <c:size val="7"/>
+            <c:spPr>
+              <a:noFill/>
+              <a:ln>
+                <a:solidFill>
+                  <a:schemeClr val="tx1"/>
+                </a:solidFill>
+              </a:ln>
+            </c:spPr>
+          </c:marker>
+          <c:xVal>
+            <c:numRef>
+              <c:f>Sheet1!$B$19:$B$27</c:f>
+              <c:numCache>
+                <c:formatCode>General</c:formatCode>
+                <c:ptCount val="9"/>
+                <c:pt idx="0">
+                  <c:v>470</c:v>
+                </c:pt>
+                <c:pt idx="1">
+                  <c:v>555</c:v>
+                </c:pt>
+                <c:pt idx="2">
+                  <c:v>585</c:v>
+                </c:pt>
+                <c:pt idx="3">
+                  <c:v>605</c:v>
+                </c:pt>
+                <c:pt idx="4">
+                  <c:v>635</c:v>
+                </c:pt>
+                <c:pt idx="5">
+                  <c:v>660</c:v>
+                </c:pt>
+                <c:pt idx="6">
+                  <c:v>695</c:v>
+                </c:pt>
+                <c:pt idx="7">
+                  <c:v>880</c:v>
+                </c:pt>
+                <c:pt idx="8">
+                  <c:v>940</c:v>
+                </c:pt>
+              </c:numCache>
+            </c:numRef>
+          </c:xVal>
+          <c:yVal>
+            <c:numRef>
+              <c:f>Sheet1!$M$19:$M$27</c:f>
+              <c:numCache>
+                <c:formatCode>General</c:formatCode>
+                <c:ptCount val="9"/>
+                <c:pt idx="0">
+                  <c:v>260</c:v>
+                </c:pt>
+                <c:pt idx="1">
+                  <c:v>145</c:v>
+                </c:pt>
+                <c:pt idx="2">
+                  <c:v>138</c:v>
+                </c:pt>
+                <c:pt idx="3">
+                  <c:v>130</c:v>
+                </c:pt>
+                <c:pt idx="4">
+                  <c:v>128</c:v>
+                </c:pt>
+                <c:pt idx="5">
+                  <c:v>213</c:v>
+                </c:pt>
+                <c:pt idx="6">
+                  <c:v>209</c:v>
+                </c:pt>
+                <c:pt idx="7">
+                  <c:v>524</c:v>
+                </c:pt>
+                <c:pt idx="8">
+                  <c:v>354</c:v>
+                </c:pt>
+              </c:numCache>
+            </c:numRef>
+          </c:yVal>
+          <c:smooth val="1"/>
+        </c:ser>
+        <c:ser>
+          <c:idx val="9"/>
+          <c:order val="2"/>
+          <c:tx>
+            <c:strRef>
+              <c:f>Sheet1!$L$18</c:f>
+              <c:strCache>
+                <c:ptCount val="1"/>
+                <c:pt idx="0">
+                  <c:v>Green fabric pin board:</c:v>
+                </c:pt>
+              </c:strCache>
+            </c:strRef>
+          </c:tx>
+          <c:spPr>
+            <a:ln>
+              <a:solidFill>
+                <a:srgbClr val="00B050"/>
+              </a:solidFill>
+            </a:ln>
+          </c:spPr>
+          <c:marker>
+            <c:symbol val="x"/>
+            <c:size val="7"/>
+            <c:spPr>
+              <a:noFill/>
+              <a:ln>
+                <a:solidFill>
+                  <a:schemeClr val="tx1"/>
+                </a:solidFill>
+              </a:ln>
+            </c:spPr>
+          </c:marker>
+          <c:xVal>
+            <c:numRef>
+              <c:f>Sheet1!$B$19:$B$27</c:f>
+              <c:numCache>
+                <c:formatCode>General</c:formatCode>
+                <c:ptCount val="9"/>
+                <c:pt idx="0">
+                  <c:v>470</c:v>
+                </c:pt>
+                <c:pt idx="1">
+                  <c:v>555</c:v>
+                </c:pt>
+                <c:pt idx="2">
+                  <c:v>585</c:v>
+                </c:pt>
+                <c:pt idx="3">
+                  <c:v>605</c:v>
+                </c:pt>
+                <c:pt idx="4">
+                  <c:v>635</c:v>
+                </c:pt>
+                <c:pt idx="5">
+                  <c:v>660</c:v>
+                </c:pt>
+                <c:pt idx="6">
+                  <c:v>695</c:v>
+                </c:pt>
+                <c:pt idx="7">
+                  <c:v>880</c:v>
+                </c:pt>
+                <c:pt idx="8">
+                  <c:v>940</c:v>
+                </c:pt>
+              </c:numCache>
+            </c:numRef>
+          </c:xVal>
+          <c:yVal>
+            <c:numRef>
+              <c:f>Sheet1!$L$19:$L$27</c:f>
+              <c:numCache>
+                <c:formatCode>General</c:formatCode>
+                <c:ptCount val="9"/>
+                <c:pt idx="0">
+                  <c:v>163</c:v>
+                </c:pt>
+                <c:pt idx="1">
+                  <c:v>252</c:v>
+                </c:pt>
+                <c:pt idx="2">
+                  <c:v>165</c:v>
+                </c:pt>
+                <c:pt idx="3">
+                  <c:v>137</c:v>
+                </c:pt>
+                <c:pt idx="4">
+                  <c:v>133</c:v>
+                </c:pt>
+                <c:pt idx="5">
+                  <c:v>181</c:v>
+                </c:pt>
+                <c:pt idx="6">
+                  <c:v>189</c:v>
+                </c:pt>
+                <c:pt idx="7">
+                  <c:v>369</c:v>
+                </c:pt>
+                <c:pt idx="8">
+                  <c:v>256</c:v>
+                </c:pt>
+              </c:numCache>
+            </c:numRef>
+          </c:yVal>
+          <c:smooth val="1"/>
+        </c:ser>
+        <c:ser>
+          <c:idx val="0"/>
+          <c:order val="3"/>
+          <c:tx>
+            <c:strRef>
+              <c:f>Sheet1!$C$18</c:f>
+              <c:strCache>
+                <c:ptCount val="1"/>
+                <c:pt idx="0">
+                  <c:v>Leaf:</c:v>
+                </c:pt>
+              </c:strCache>
+            </c:strRef>
+          </c:tx>
+          <c:spPr>
+            <a:ln cap="rnd">
+              <a:solidFill>
+                <a:srgbClr val="92D050"/>
+              </a:solidFill>
+              <a:round/>
+            </a:ln>
+          </c:spPr>
+          <c:marker>
+            <c:symbol val="x"/>
+            <c:size val="7"/>
+            <c:spPr>
+              <a:noFill/>
+              <a:ln cap="rnd">
+                <a:solidFill>
+                  <a:schemeClr val="tx1"/>
+                </a:solidFill>
+              </a:ln>
+            </c:spPr>
+          </c:marker>
+          <c:xVal>
+            <c:numRef>
+              <c:f>Sheet1!$B$19:$B$27</c:f>
+              <c:numCache>
+                <c:formatCode>General</c:formatCode>
+                <c:ptCount val="9"/>
+                <c:pt idx="0">
+                  <c:v>470</c:v>
+                </c:pt>
+                <c:pt idx="1">
+                  <c:v>555</c:v>
+                </c:pt>
+                <c:pt idx="2">
+                  <c:v>585</c:v>
+                </c:pt>
+                <c:pt idx="3">
+                  <c:v>605</c:v>
+                </c:pt>
+                <c:pt idx="4">
+                  <c:v>635</c:v>
+                </c:pt>
+                <c:pt idx="5">
+                  <c:v>660</c:v>
+                </c:pt>
+                <c:pt idx="6">
+                  <c:v>695</c:v>
+                </c:pt>
+                <c:pt idx="7">
+                  <c:v>880</c:v>
+                </c:pt>
+                <c:pt idx="8">
+                  <c:v>940</c:v>
+                </c:pt>
+              </c:numCache>
+            </c:numRef>
+          </c:xVal>
+          <c:yVal>
+            <c:numRef>
+              <c:f>Sheet1!$C$19:$C$27</c:f>
+              <c:numCache>
+                <c:formatCode>General</c:formatCode>
+                <c:ptCount val="9"/>
+                <c:pt idx="0">
+                  <c:v>151</c:v>
+                </c:pt>
+                <c:pt idx="1">
+                  <c:v>280</c:v>
+                </c:pt>
+                <c:pt idx="2">
+                  <c:v>211</c:v>
+                </c:pt>
+                <c:pt idx="3">
+                  <c:v>165</c:v>
+                </c:pt>
+                <c:pt idx="4">
+                  <c:v>123</c:v>
+                </c:pt>
+                <c:pt idx="5">
+                  <c:v>249</c:v>
+                </c:pt>
+                <c:pt idx="6">
+                  <c:v>412</c:v>
+                </c:pt>
+                <c:pt idx="7">
+                  <c:v>615</c:v>
+                </c:pt>
+                <c:pt idx="8">
+                  <c:v>405</c:v>
+                </c:pt>
+              </c:numCache>
+            </c:numRef>
+          </c:yVal>
+          <c:smooth val="1"/>
+        </c:ser>
+        <c:ser>
+          <c:idx val="11"/>
+          <c:order val="4"/>
+          <c:tx>
+            <c:strRef>
+              <c:f>Sheet1!$N$18</c:f>
+              <c:strCache>
+                <c:ptCount val="1"/>
+                <c:pt idx="0">
+                  <c:v>Green sheet of paper: </c:v>
+                </c:pt>
+              </c:strCache>
+            </c:strRef>
+          </c:tx>
+          <c:spPr>
+            <a:ln>
+              <a:solidFill>
+                <a:srgbClr val="99F51F"/>
+              </a:solidFill>
+            </a:ln>
+          </c:spPr>
+          <c:marker>
+            <c:symbol val="x"/>
+            <c:size val="7"/>
+            <c:spPr>
+              <a:noFill/>
+              <a:ln>
+                <a:solidFill>
+                  <a:schemeClr val="tx1"/>
+                </a:solidFill>
+              </a:ln>
+            </c:spPr>
+          </c:marker>
+          <c:xVal>
+            <c:numRef>
+              <c:f>Sheet1!$B$19:$B$27</c:f>
+              <c:numCache>
+                <c:formatCode>General</c:formatCode>
+                <c:ptCount val="9"/>
+                <c:pt idx="0">
+                  <c:v>470</c:v>
+                </c:pt>
+                <c:pt idx="1">
+                  <c:v>555</c:v>
+                </c:pt>
+                <c:pt idx="2">
+                  <c:v>585</c:v>
+                </c:pt>
+                <c:pt idx="3">
+                  <c:v>605</c:v>
+                </c:pt>
+                <c:pt idx="4">
+                  <c:v>635</c:v>
+                </c:pt>
+                <c:pt idx="5">
+                  <c:v>660</c:v>
+                </c:pt>
+                <c:pt idx="6">
+                  <c:v>695</c:v>
+                </c:pt>
+                <c:pt idx="7">
+                  <c:v>880</c:v>
+                </c:pt>
+                <c:pt idx="8">
+                  <c:v>940</c:v>
+                </c:pt>
+              </c:numCache>
+            </c:numRef>
+          </c:xVal>
+          <c:yVal>
+            <c:numRef>
+              <c:f>Sheet1!$N$19:$N$27</c:f>
+              <c:numCache>
+                <c:formatCode>General</c:formatCode>
+                <c:ptCount val="9"/>
+                <c:pt idx="0">
+                  <c:v>355</c:v>
+                </c:pt>
+                <c:pt idx="1">
+                  <c:v>690</c:v>
+                </c:pt>
+                <c:pt idx="2">
+                  <c:v>463</c:v>
+                </c:pt>
+                <c:pt idx="3">
+                  <c:v>385</c:v>
+                </c:pt>
+                <c:pt idx="4">
+                  <c:v>367</c:v>
+                </c:pt>
+                <c:pt idx="5">
+                  <c:v>510</c:v>
+                </c:pt>
+                <c:pt idx="6">
+                  <c:v>634</c:v>
+                </c:pt>
+                <c:pt idx="7">
+                  <c:v>900</c:v>
+                </c:pt>
+                <c:pt idx="8">
+                  <c:v>577</c:v>
+                </c:pt>
+              </c:numCache>
+            </c:numRef>
+          </c:yVal>
+          <c:smooth val="1"/>
+        </c:ser>
+        <c:ser>
+          <c:idx val="14"/>
+          <c:order val="5"/>
+          <c:tx>
+            <c:strRef>
+              <c:f>Sheet1!$Q$18</c:f>
+              <c:strCache>
+                <c:ptCount val="1"/>
+                <c:pt idx="0">
+                  <c:v>Yellow book cover:</c:v>
+                </c:pt>
+              </c:strCache>
+            </c:strRef>
+          </c:tx>
+          <c:spPr>
+            <a:ln>
+              <a:solidFill>
+                <a:srgbClr val="ECFF7B"/>
+              </a:solidFill>
+            </a:ln>
+          </c:spPr>
+          <c:marker>
+            <c:symbol val="x"/>
+            <c:size val="7"/>
+            <c:spPr>
+              <a:noFill/>
+              <a:ln>
+                <a:solidFill>
+                  <a:schemeClr val="tx1"/>
+                </a:solidFill>
+              </a:ln>
+            </c:spPr>
+          </c:marker>
+          <c:xVal>
+            <c:numRef>
+              <c:f>Sheet1!$B$19:$B$27</c:f>
+              <c:numCache>
+                <c:formatCode>General</c:formatCode>
+                <c:ptCount val="9"/>
+                <c:pt idx="0">
+                  <c:v>470</c:v>
+                </c:pt>
+                <c:pt idx="1">
+                  <c:v>555</c:v>
+                </c:pt>
+                <c:pt idx="2">
+                  <c:v>585</c:v>
+                </c:pt>
+                <c:pt idx="3">
+                  <c:v>605</c:v>
+                </c:pt>
+                <c:pt idx="4">
+                  <c:v>635</c:v>
+                </c:pt>
+                <c:pt idx="5">
+                  <c:v>660</c:v>
+                </c:pt>
+                <c:pt idx="6">
+                  <c:v>695</c:v>
+                </c:pt>
+                <c:pt idx="7">
+                  <c:v>880</c:v>
+                </c:pt>
+                <c:pt idx="8">
+                  <c:v>940</c:v>
+                </c:pt>
+              </c:numCache>
+            </c:numRef>
+          </c:xVal>
+          <c:yVal>
+            <c:numRef>
+              <c:f>Sheet1!$Q$19:$Q$27</c:f>
+              <c:numCache>
+                <c:formatCode>General</c:formatCode>
+                <c:ptCount val="9"/>
+                <c:pt idx="0">
+                  <c:v>393</c:v>
+                </c:pt>
+                <c:pt idx="1">
+                  <c:v>1221</c:v>
+                </c:pt>
+                <c:pt idx="2">
+                  <c:v>1219</c:v>
+                </c:pt>
+                <c:pt idx="3">
+                  <c:v>1134</c:v>
+                </c:pt>
+                <c:pt idx="4">
+                  <c:v>1119</c:v>
+                </c:pt>
+                <c:pt idx="5">
+                  <c:v>1250</c:v>
+                </c:pt>
+                <c:pt idx="6">
+                  <c:v>1353</c:v>
+                </c:pt>
+                <c:pt idx="7">
+                  <c:v>1195</c:v>
+                </c:pt>
+                <c:pt idx="8">
+                  <c:v>692</c:v>
+                </c:pt>
+              </c:numCache>
+            </c:numRef>
+          </c:yVal>
+          <c:smooth val="1"/>
+        </c:ser>
+        <c:ser>
+          <c:idx val="12"/>
+          <c:order val="6"/>
+          <c:tx>
+            <c:strRef>
+              <c:f>Sheet1!$O$18</c:f>
+              <c:strCache>
+                <c:ptCount val="1"/>
+                <c:pt idx="0">
+                  <c:v>Yellow sheet of papir: </c:v>
+                </c:pt>
+              </c:strCache>
+            </c:strRef>
+          </c:tx>
+          <c:spPr>
+            <a:ln>
+              <a:solidFill>
+                <a:srgbClr val="FFFF00"/>
+              </a:solidFill>
+            </a:ln>
+          </c:spPr>
+          <c:marker>
+            <c:symbol val="x"/>
+            <c:size val="7"/>
+            <c:spPr>
+              <a:noFill/>
+              <a:ln>
+                <a:solidFill>
+                  <a:schemeClr val="tx1"/>
+                </a:solidFill>
+              </a:ln>
+            </c:spPr>
+          </c:marker>
+          <c:xVal>
+            <c:numRef>
+              <c:f>Sheet1!$B$19:$B$27</c:f>
+              <c:numCache>
+                <c:formatCode>General</c:formatCode>
+                <c:ptCount val="9"/>
+                <c:pt idx="0">
+                  <c:v>470</c:v>
+                </c:pt>
+                <c:pt idx="1">
+                  <c:v>555</c:v>
+                </c:pt>
+                <c:pt idx="2">
+                  <c:v>585</c:v>
+                </c:pt>
+                <c:pt idx="3">
+                  <c:v>605</c:v>
+                </c:pt>
+                <c:pt idx="4">
+                  <c:v>635</c:v>
+                </c:pt>
+                <c:pt idx="5">
+                  <c:v>660</c:v>
+                </c:pt>
+                <c:pt idx="6">
+                  <c:v>695</c:v>
+                </c:pt>
+                <c:pt idx="7">
+                  <c:v>880</c:v>
+                </c:pt>
+                <c:pt idx="8">
+                  <c:v>940</c:v>
+                </c:pt>
+              </c:numCache>
+            </c:numRef>
+          </c:xVal>
+          <c:yVal>
+            <c:numRef>
+              <c:f>Sheet1!$O$19:$O$27</c:f>
+              <c:numCache>
+                <c:formatCode>General</c:formatCode>
+                <c:ptCount val="9"/>
+                <c:pt idx="0">
+                  <c:v>387</c:v>
+                </c:pt>
+                <c:pt idx="1">
+                  <c:v>1242</c:v>
+                </c:pt>
+                <c:pt idx="2">
+                  <c:v>1222</c:v>
+                </c:pt>
+                <c:pt idx="3">
+                  <c:v>1104</c:v>
+                </c:pt>
+                <c:pt idx="4">
+                  <c:v>1084</c:v>
+                </c:pt>
+                <c:pt idx="5">
+                  <c:v>1199</c:v>
+                </c:pt>
+                <c:pt idx="6">
+                  <c:v>1271</c:v>
+                </c:pt>
+                <c:pt idx="7">
+                  <c:v>1050</c:v>
+                </c:pt>
+                <c:pt idx="8">
+                  <c:v>644</c:v>
+                </c:pt>
+              </c:numCache>
+            </c:numRef>
+          </c:yVal>
+          <c:smooth val="1"/>
+        </c:ser>
+        <c:ser>
+          <c:idx val="13"/>
+          <c:order val="7"/>
+          <c:tx>
+            <c:strRef>
+              <c:f>Sheet1!$P$18</c:f>
+              <c:strCache>
+                <c:ptCount val="1"/>
+                <c:pt idx="0">
+                  <c:v>Red book cover: </c:v>
+                </c:pt>
+              </c:strCache>
+            </c:strRef>
+          </c:tx>
+          <c:spPr>
+            <a:ln>
+              <a:solidFill>
+                <a:srgbClr val="FF0000"/>
+              </a:solidFill>
+            </a:ln>
+          </c:spPr>
+          <c:marker>
+            <c:symbol val="x"/>
+            <c:size val="7"/>
+            <c:spPr>
+              <a:noFill/>
+              <a:ln>
+                <a:solidFill>
+                  <a:schemeClr val="tx1"/>
+                </a:solidFill>
+              </a:ln>
+            </c:spPr>
+          </c:marker>
+          <c:xVal>
+            <c:numRef>
+              <c:f>Sheet1!$B$19:$B$27</c:f>
+              <c:numCache>
+                <c:formatCode>General</c:formatCode>
+                <c:ptCount val="9"/>
+                <c:pt idx="0">
+                  <c:v>470</c:v>
+                </c:pt>
+                <c:pt idx="1">
+                  <c:v>555</c:v>
+                </c:pt>
+                <c:pt idx="2">
+                  <c:v>585</c:v>
+                </c:pt>
+                <c:pt idx="3">
+                  <c:v>605</c:v>
+                </c:pt>
+                <c:pt idx="4">
+                  <c:v>635</c:v>
+                </c:pt>
+                <c:pt idx="5">
+                  <c:v>660</c:v>
+                </c:pt>
+                <c:pt idx="6">
+                  <c:v>695</c:v>
+                </c:pt>
+                <c:pt idx="7">
+                  <c:v>880</c:v>
+                </c:pt>
+                <c:pt idx="8">
+                  <c:v>940</c:v>
+                </c:pt>
+              </c:numCache>
+            </c:numRef>
+          </c:xVal>
+          <c:yVal>
+            <c:numRef>
+              <c:f>Sheet1!$P$19:$P$27</c:f>
+              <c:numCache>
+                <c:formatCode>General</c:formatCode>
+                <c:ptCount val="9"/>
+                <c:pt idx="0">
+                  <c:v>211</c:v>
+                </c:pt>
+                <c:pt idx="1">
+                  <c:v>234</c:v>
+                </c:pt>
+                <c:pt idx="2">
+                  <c:v>374</c:v>
+                </c:pt>
+                <c:pt idx="3">
+                  <c:v>520</c:v>
+                </c:pt>
+                <c:pt idx="4">
+                  <c:v>602</c:v>
+                </c:pt>
+                <c:pt idx="5">
+                  <c:v>719</c:v>
+                </c:pt>
+                <c:pt idx="6">
+                  <c:v>804</c:v>
+                </c:pt>
+                <c:pt idx="7">
+                  <c:v>765</c:v>
+                </c:pt>
+                <c:pt idx="8">
+                  <c:v>465</c:v>
+                </c:pt>
+              </c:numCache>
+            </c:numRef>
+          </c:yVal>
+          <c:smooth val="1"/>
+        </c:ser>
+        <c:ser>
+          <c:idx val="6"/>
+          <c:order val="8"/>
+          <c:tx>
+            <c:strRef>
+              <c:f>Sheet1!$I$18</c:f>
+              <c:strCache>
+                <c:ptCount val="1"/>
+                <c:pt idx="0">
+                  <c:v>Cardboard: </c:v>
+                </c:pt>
+              </c:strCache>
+            </c:strRef>
+          </c:tx>
+          <c:spPr>
+            <a:ln>
+              <a:solidFill>
+                <a:srgbClr val="BE7952"/>
+              </a:solidFill>
+            </a:ln>
+          </c:spPr>
+          <c:marker>
+            <c:symbol val="x"/>
+            <c:size val="7"/>
+            <c:spPr>
+              <a:noFill/>
+              <a:ln>
+                <a:solidFill>
+                  <a:schemeClr val="tx1"/>
+                </a:solidFill>
+              </a:ln>
+            </c:spPr>
+          </c:marker>
+          <c:xVal>
+            <c:numRef>
+              <c:f>Sheet1!$B$19:$B$27</c:f>
+              <c:numCache>
+                <c:formatCode>General</c:formatCode>
+                <c:ptCount val="9"/>
+                <c:pt idx="0">
+                  <c:v>470</c:v>
+                </c:pt>
+                <c:pt idx="1">
+                  <c:v>555</c:v>
+                </c:pt>
+                <c:pt idx="2">
+                  <c:v>585</c:v>
+                </c:pt>
+                <c:pt idx="3">
+                  <c:v>605</c:v>
+                </c:pt>
+                <c:pt idx="4">
+                  <c:v>635</c:v>
+                </c:pt>
+                <c:pt idx="5">
+                  <c:v>660</c:v>
+                </c:pt>
+                <c:pt idx="6">
+                  <c:v>695</c:v>
+                </c:pt>
+                <c:pt idx="7">
+                  <c:v>880</c:v>
+                </c:pt>
+                <c:pt idx="8">
+                  <c:v>940</c:v>
+                </c:pt>
+              </c:numCache>
+            </c:numRef>
+          </c:xVal>
+          <c:yVal>
+            <c:numRef>
+              <c:f>Sheet1!$I$19:$I$27</c:f>
+              <c:numCache>
+                <c:formatCode>General</c:formatCode>
+                <c:ptCount val="9"/>
+                <c:pt idx="0">
+                  <c:v>331</c:v>
+                </c:pt>
+                <c:pt idx="1">
+                  <c:v>550</c:v>
+                </c:pt>
+                <c:pt idx="2">
+                  <c:v>575</c:v>
+                </c:pt>
+                <c:pt idx="3">
+                  <c:v>532</c:v>
+                </c:pt>
+                <c:pt idx="4">
+                  <c:v>510</c:v>
+                </c:pt>
+                <c:pt idx="5">
+                  <c:v>608</c:v>
+                </c:pt>
+                <c:pt idx="6">
+                  <c:v>72</c:v>
+                </c:pt>
+                <c:pt idx="7">
+                  <c:v>623</c:v>
+                </c:pt>
+                <c:pt idx="8">
+                  <c:v>395</c:v>
+                </c:pt>
+              </c:numCache>
+            </c:numRef>
+          </c:yVal>
+          <c:smooth val="1"/>
+        </c:ser>
+        <c:ser>
+          <c:idx val="7"/>
+          <c:order val="9"/>
+          <c:tx>
+            <c:strRef>
+              <c:f>Sheet1!$J$18</c:f>
+              <c:strCache>
+                <c:ptCount val="1"/>
+                <c:pt idx="0">
+                  <c:v>Stone (smooth): </c:v>
+                </c:pt>
+              </c:strCache>
+            </c:strRef>
+          </c:tx>
+          <c:spPr>
+            <a:ln>
+              <a:solidFill>
+                <a:srgbClr val="795337"/>
+              </a:solidFill>
+            </a:ln>
+          </c:spPr>
+          <c:marker>
+            <c:symbol val="x"/>
+            <c:size val="7"/>
+            <c:spPr>
+              <a:noFill/>
+              <a:ln>
+                <a:solidFill>
+                  <a:schemeClr val="tx1"/>
+                </a:solidFill>
+              </a:ln>
+            </c:spPr>
+          </c:marker>
+          <c:xVal>
+            <c:numRef>
+              <c:f>Sheet1!$B$19:$B$27</c:f>
+              <c:numCache>
+                <c:formatCode>General</c:formatCode>
+                <c:ptCount val="9"/>
+                <c:pt idx="0">
+                  <c:v>470</c:v>
+                </c:pt>
+                <c:pt idx="1">
+                  <c:v>555</c:v>
+                </c:pt>
+                <c:pt idx="2">
+                  <c:v>585</c:v>
+                </c:pt>
+                <c:pt idx="3">
+                  <c:v>605</c:v>
+                </c:pt>
+                <c:pt idx="4">
+                  <c:v>635</c:v>
+                </c:pt>
+                <c:pt idx="5">
+                  <c:v>660</c:v>
+                </c:pt>
+                <c:pt idx="6">
+                  <c:v>695</c:v>
+                </c:pt>
+                <c:pt idx="7">
+                  <c:v>880</c:v>
+                </c:pt>
+                <c:pt idx="8">
+                  <c:v>940</c:v>
+                </c:pt>
+              </c:numCache>
+            </c:numRef>
+          </c:xVal>
+          <c:yVal>
+            <c:numRef>
+              <c:f>Sheet1!$J$19:$J$27</c:f>
+              <c:numCache>
+                <c:formatCode>General</c:formatCode>
+                <c:ptCount val="9"/>
+                <c:pt idx="0">
+                  <c:v>198</c:v>
+                </c:pt>
+                <c:pt idx="1">
+                  <c:v>252</c:v>
+                </c:pt>
+                <c:pt idx="2">
+                  <c:v>230</c:v>
+                </c:pt>
+                <c:pt idx="3">
+                  <c:v>147</c:v>
+                </c:pt>
+                <c:pt idx="4">
+                  <c:v>227</c:v>
+                </c:pt>
+                <c:pt idx="5">
+                  <c:v>253</c:v>
+                </c:pt>
+                <c:pt idx="6">
+                  <c:v>247</c:v>
+                </c:pt>
+                <c:pt idx="7">
+                  <c:v>190</c:v>
+                </c:pt>
+                <c:pt idx="8">
+                  <c:v>140</c:v>
+                </c:pt>
+              </c:numCache>
+            </c:numRef>
+          </c:yVal>
+          <c:smooth val="1"/>
+        </c:ser>
+        <c:ser>
+          <c:idx val="1"/>
+          <c:order val="10"/>
+          <c:tx>
+            <c:strRef>
+              <c:f>Sheet1!$D$18</c:f>
+              <c:strCache>
+                <c:ptCount val="1"/>
+                <c:pt idx="0">
+                  <c:v>Stone (rough): </c:v>
+                </c:pt>
+              </c:strCache>
+            </c:strRef>
+          </c:tx>
+          <c:spPr>
+            <a:ln>
+              <a:solidFill>
+                <a:srgbClr val="9E7E54"/>
+              </a:solidFill>
+            </a:ln>
+          </c:spPr>
+          <c:marker>
+            <c:symbol val="x"/>
+            <c:size val="7"/>
+            <c:spPr>
+              <a:noFill/>
+              <a:ln>
+                <a:solidFill>
+                  <a:schemeClr val="tx1"/>
+                </a:solidFill>
+              </a:ln>
+            </c:spPr>
+          </c:marker>
+          <c:xVal>
+            <c:numRef>
+              <c:f>Sheet1!$B$19:$B$27</c:f>
+              <c:numCache>
+                <c:formatCode>General</c:formatCode>
+                <c:ptCount val="9"/>
+                <c:pt idx="0">
+                  <c:v>470</c:v>
+                </c:pt>
+                <c:pt idx="1">
+                  <c:v>555</c:v>
+                </c:pt>
+                <c:pt idx="2">
+                  <c:v>585</c:v>
+                </c:pt>
+                <c:pt idx="3">
+                  <c:v>605</c:v>
+                </c:pt>
+                <c:pt idx="4">
+                  <c:v>635</c:v>
+                </c:pt>
+                <c:pt idx="5">
+                  <c:v>660</c:v>
+                </c:pt>
+                <c:pt idx="6">
+                  <c:v>695</c:v>
+                </c:pt>
+                <c:pt idx="7">
+                  <c:v>880</c:v>
+                </c:pt>
+                <c:pt idx="8">
+                  <c:v>940</c:v>
+                </c:pt>
+              </c:numCache>
+            </c:numRef>
+          </c:xVal>
+          <c:yVal>
+            <c:numRef>
+              <c:f>Sheet1!$D$19:$D$27</c:f>
+              <c:numCache>
+                <c:formatCode>General</c:formatCode>
+                <c:ptCount val="9"/>
+                <c:pt idx="0">
+                  <c:v>266</c:v>
+                </c:pt>
+                <c:pt idx="1">
+                  <c:v>353</c:v>
+                </c:pt>
+                <c:pt idx="2">
+                  <c:v>321</c:v>
+                </c:pt>
+                <c:pt idx="3">
+                  <c:v>256</c:v>
+                </c:pt>
+                <c:pt idx="4">
+                  <c:v>225</c:v>
+                </c:pt>
+                <c:pt idx="5">
+                  <c:v>271</c:v>
+                </c:pt>
+                <c:pt idx="6">
+                  <c:v>279</c:v>
+                </c:pt>
+                <c:pt idx="7">
+                  <c:v>220</c:v>
+                </c:pt>
+                <c:pt idx="8">
+                  <c:v>158</c:v>
+                </c:pt>
+              </c:numCache>
+            </c:numRef>
+          </c:yVal>
+          <c:smooth val="1"/>
+        </c:ser>
+        <c:ser>
+          <c:idx val="5"/>
+          <c:order val="11"/>
+          <c:tx>
+            <c:strRef>
+              <c:f>Sheet1!$H$18</c:f>
+              <c:strCache>
+                <c:ptCount val="1"/>
+                <c:pt idx="0">
+                  <c:v>White paint: </c:v>
+                </c:pt>
+              </c:strCache>
+            </c:strRef>
+          </c:tx>
+          <c:spPr>
+            <a:ln>
+              <a:solidFill>
+                <a:schemeClr val="bg1">
+                  <a:lumMod val="95000"/>
+                </a:schemeClr>
+              </a:solidFill>
+            </a:ln>
+          </c:spPr>
+          <c:marker>
+            <c:symbol val="x"/>
+            <c:size val="7"/>
+            <c:spPr>
+              <a:noFill/>
+              <a:ln>
+                <a:solidFill>
+                  <a:schemeClr val="tx1"/>
+                </a:solidFill>
+              </a:ln>
+            </c:spPr>
+          </c:marker>
+          <c:xVal>
+            <c:numRef>
+              <c:f>Sheet1!$B$19:$B$27</c:f>
+              <c:numCache>
+                <c:formatCode>General</c:formatCode>
+                <c:ptCount val="9"/>
+                <c:pt idx="0">
+                  <c:v>470</c:v>
+                </c:pt>
+                <c:pt idx="1">
+                  <c:v>555</c:v>
+                </c:pt>
+                <c:pt idx="2">
+                  <c:v>585</c:v>
+                </c:pt>
+                <c:pt idx="3">
+                  <c:v>605</c:v>
+                </c:pt>
+                <c:pt idx="4">
+                  <c:v>635</c:v>
+                </c:pt>
+                <c:pt idx="5">
+                  <c:v>660</c:v>
+                </c:pt>
+                <c:pt idx="6">
+                  <c:v>695</c:v>
+                </c:pt>
+                <c:pt idx="7">
+                  <c:v>880</c:v>
+                </c:pt>
+                <c:pt idx="8">
+                  <c:v>940</c:v>
+                </c:pt>
+              </c:numCache>
+            </c:numRef>
+          </c:xVal>
+          <c:yVal>
+            <c:numRef>
+              <c:f>Sheet1!$H$19:$H$27</c:f>
+              <c:numCache>
+                <c:formatCode>General</c:formatCode>
+                <c:ptCount val="9"/>
+                <c:pt idx="0">
+                  <c:v>1056</c:v>
+                </c:pt>
+                <c:pt idx="1">
+                  <c:v>1125</c:v>
+                </c:pt>
+                <c:pt idx="2">
+                  <c:v>1030</c:v>
+                </c:pt>
+                <c:pt idx="3">
+                  <c:v>1017</c:v>
+                </c:pt>
+                <c:pt idx="4">
+                  <c:v>983</c:v>
+                </c:pt>
+                <c:pt idx="5">
+                  <c:v>1075</c:v>
+                </c:pt>
+                <c:pt idx="6">
+                  <c:v>1200</c:v>
+                </c:pt>
+                <c:pt idx="7">
+                  <c:v>1040</c:v>
+                </c:pt>
+                <c:pt idx="8">
+                  <c:v>593</c:v>
+                </c:pt>
+              </c:numCache>
+            </c:numRef>
+          </c:yVal>
+          <c:smooth val="1"/>
+        </c:ser>
+        <c:ser>
+          <c:idx val="2"/>
+          <c:order val="12"/>
+          <c:tx>
+            <c:strRef>
+              <c:f>Sheet1!$E$18</c:f>
+              <c:strCache>
+                <c:ptCount val="1"/>
+                <c:pt idx="0">
+                  <c:v>Mirror: </c:v>
+                </c:pt>
+              </c:strCache>
+            </c:strRef>
+          </c:tx>
+          <c:spPr>
+            <a:ln>
+              <a:solidFill>
+                <a:schemeClr val="bg1">
+                  <a:lumMod val="65000"/>
+                </a:schemeClr>
+              </a:solidFill>
+            </a:ln>
+          </c:spPr>
+          <c:marker>
+            <c:symbol val="x"/>
+            <c:size val="7"/>
+            <c:spPr>
+              <a:noFill/>
+              <a:ln>
+                <a:solidFill>
+                  <a:schemeClr val="tx1">
+                    <a:alpha val="94000"/>
+                  </a:schemeClr>
+                </a:solidFill>
+              </a:ln>
+            </c:spPr>
+          </c:marker>
+          <c:xVal>
+            <c:numRef>
+              <c:f>Sheet1!$B$19:$B$27</c:f>
+              <c:numCache>
+                <c:formatCode>General</c:formatCode>
+                <c:ptCount val="9"/>
+                <c:pt idx="0">
+                  <c:v>470</c:v>
+                </c:pt>
+                <c:pt idx="1">
+                  <c:v>555</c:v>
+                </c:pt>
+                <c:pt idx="2">
+                  <c:v>585</c:v>
+                </c:pt>
+                <c:pt idx="3">
+                  <c:v>605</c:v>
+                </c:pt>
+                <c:pt idx="4">
+                  <c:v>635</c:v>
+                </c:pt>
+                <c:pt idx="5">
+                  <c:v>660</c:v>
+                </c:pt>
+                <c:pt idx="6">
+                  <c:v>695</c:v>
+                </c:pt>
+                <c:pt idx="7">
+                  <c:v>880</c:v>
+                </c:pt>
+                <c:pt idx="8">
+                  <c:v>940</c:v>
+                </c:pt>
+              </c:numCache>
+            </c:numRef>
+          </c:xVal>
+          <c:yVal>
+            <c:numRef>
+              <c:f>Sheet1!$E$19:$E$27</c:f>
+              <c:numCache>
+                <c:formatCode>General</c:formatCode>
+                <c:ptCount val="9"/>
+                <c:pt idx="1">
+                  <c:v>1950</c:v>
+                </c:pt>
+                <c:pt idx="2">
+                  <c:v>816</c:v>
+                </c:pt>
+                <c:pt idx="3">
+                  <c:v>630</c:v>
+                </c:pt>
+                <c:pt idx="4">
+                  <c:v>711</c:v>
+                </c:pt>
+                <c:pt idx="5">
+                  <c:v>930</c:v>
+                </c:pt>
+                <c:pt idx="6">
+                  <c:v>1360</c:v>
+                </c:pt>
+                <c:pt idx="8">
+                  <c:v>1233</c:v>
+                </c:pt>
+              </c:numCache>
+            </c:numRef>
+          </c:yVal>
+          <c:smooth val="1"/>
+        </c:ser>
+        <c:ser>
+          <c:idx val="3"/>
+          <c:order val="13"/>
+          <c:tx>
+            <c:strRef>
+              <c:f>Sheet1!$F$18</c:f>
+              <c:strCache>
+                <c:ptCount val="1"/>
+                <c:pt idx="0">
+                  <c:v>Polished Metal (steel ?):</c:v>
+                </c:pt>
+              </c:strCache>
+            </c:strRef>
+          </c:tx>
+          <c:spPr>
+            <a:ln>
+              <a:solidFill>
+                <a:schemeClr val="tx1">
+                  <a:lumMod val="50000"/>
+                  <a:lumOff val="50000"/>
+                </a:schemeClr>
+              </a:solidFill>
+            </a:ln>
+          </c:spPr>
+          <c:marker>
+            <c:symbol val="x"/>
+            <c:size val="7"/>
+            <c:spPr>
+              <a:noFill/>
+              <a:ln>
+                <a:solidFill>
+                  <a:schemeClr val="tx1"/>
+                </a:solidFill>
+              </a:ln>
+            </c:spPr>
+          </c:marker>
+          <c:xVal>
+            <c:numRef>
+              <c:f>Sheet1!$B$19:$B$27</c:f>
+              <c:numCache>
+                <c:formatCode>General</c:formatCode>
+                <c:ptCount val="9"/>
+                <c:pt idx="0">
+                  <c:v>470</c:v>
+                </c:pt>
+                <c:pt idx="1">
+                  <c:v>555</c:v>
+                </c:pt>
+                <c:pt idx="2">
+                  <c:v>585</c:v>
+                </c:pt>
+                <c:pt idx="3">
+                  <c:v>605</c:v>
+                </c:pt>
+                <c:pt idx="4">
+                  <c:v>635</c:v>
+                </c:pt>
+                <c:pt idx="5">
+                  <c:v>660</c:v>
+                </c:pt>
+                <c:pt idx="6">
+                  <c:v>695</c:v>
+                </c:pt>
+                <c:pt idx="7">
+                  <c:v>880</c:v>
+                </c:pt>
+                <c:pt idx="8">
+                  <c:v>940</c:v>
+                </c:pt>
+              </c:numCache>
+            </c:numRef>
+          </c:xVal>
+          <c:yVal>
+            <c:numRef>
+              <c:f>Sheet1!$F$19:$F$27</c:f>
+              <c:numCache>
+                <c:formatCode>General</c:formatCode>
+                <c:ptCount val="9"/>
+                <c:pt idx="2">
+                  <c:v>1421</c:v>
+                </c:pt>
+                <c:pt idx="3">
+                  <c:v>1695</c:v>
+                </c:pt>
+                <c:pt idx="4">
+                  <c:v>1299</c:v>
+                </c:pt>
+                <c:pt idx="5">
+                  <c:v>1415</c:v>
+                </c:pt>
+                <c:pt idx="8">
+                  <c:v>1160</c:v>
+                </c:pt>
+              </c:numCache>
+            </c:numRef>
+          </c:yVal>
+          <c:smooth val="1"/>
+        </c:ser>
+        <c:ser>
+          <c:idx val="8"/>
+          <c:order val="14"/>
+          <c:tx>
+            <c:strRef>
+              <c:f>Sheet1!$K$18</c:f>
+              <c:strCache>
+                <c:ptCount val="1"/>
+                <c:pt idx="0">
+                  <c:v>Mouse Mat (Black rubber): </c:v>
+                </c:pt>
+              </c:strCache>
+            </c:strRef>
+          </c:tx>
+          <c:spPr>
+            <a:ln>
+              <a:solidFill>
+                <a:schemeClr val="tx1"/>
+              </a:solidFill>
+            </a:ln>
+          </c:spPr>
+          <c:marker>
+            <c:symbol val="x"/>
+            <c:size val="7"/>
+            <c:spPr>
+              <a:noFill/>
+              <a:ln>
+                <a:solidFill>
+                  <a:schemeClr val="tx1"/>
+                </a:solidFill>
+              </a:ln>
+            </c:spPr>
+          </c:marker>
+          <c:xVal>
+            <c:numRef>
+              <c:f>Sheet1!$B$19:$B$27</c:f>
+              <c:numCache>
+                <c:formatCode>General</c:formatCode>
+                <c:ptCount val="9"/>
+                <c:pt idx="0">
+                  <c:v>470</c:v>
+                </c:pt>
+                <c:pt idx="1">
+                  <c:v>555</c:v>
+                </c:pt>
+                <c:pt idx="2">
+                  <c:v>585</c:v>
+                </c:pt>
+                <c:pt idx="3">
+                  <c:v>605</c:v>
+                </c:pt>
+                <c:pt idx="4">
+                  <c:v>635</c:v>
+                </c:pt>
+                <c:pt idx="5">
+                  <c:v>660</c:v>
+                </c:pt>
+                <c:pt idx="6">
+                  <c:v>695</c:v>
+                </c:pt>
+                <c:pt idx="7">
+                  <c:v>880</c:v>
+                </c:pt>
+                <c:pt idx="8">
+                  <c:v>940</c:v>
+                </c:pt>
+              </c:numCache>
+            </c:numRef>
+          </c:xVal>
+          <c:yVal>
+            <c:numRef>
+              <c:f>Sheet1!$K$19:$K$27</c:f>
+              <c:numCache>
+                <c:formatCode>General</c:formatCode>
+                <c:ptCount val="9"/>
+                <c:pt idx="0">
+                  <c:v>125</c:v>
+                </c:pt>
+                <c:pt idx="1">
+                  <c:v>152</c:v>
+                </c:pt>
+                <c:pt idx="2">
+                  <c:v>157</c:v>
+                </c:pt>
+                <c:pt idx="3">
+                  <c:v>137</c:v>
+                </c:pt>
+                <c:pt idx="4">
+                  <c:v>141</c:v>
+                </c:pt>
+                <c:pt idx="5">
+                  <c:v>262</c:v>
+                </c:pt>
+                <c:pt idx="6">
+                  <c:v>497</c:v>
+                </c:pt>
+                <c:pt idx="7">
+                  <c:v>725</c:v>
+                </c:pt>
+                <c:pt idx="8">
+                  <c:v>460</c:v>
+                </c:pt>
+              </c:numCache>
+            </c:numRef>
+          </c:yVal>
+          <c:smooth val="1"/>
+        </c:ser>
+        <c:dLbls>
+          <c:showLegendKey val="0"/>
+          <c:showVal val="0"/>
+          <c:showCatName val="0"/>
+          <c:showSerName val="0"/>
+          <c:showPercent val="0"/>
+          <c:showBubbleSize val="0"/>
+        </c:dLbls>
+        <c:axId val="313575608"/>
+        <c:axId val="313572080"/>
+      </c:scatterChart>
+      <c:valAx>
+        <c:axId val="313575608"/>
+        <c:scaling>
+          <c:orientation val="minMax"/>
+          <c:max val="950"/>
+          <c:min val="450"/>
+        </c:scaling>
+        <c:delete val="0"/>
+        <c:axPos val="b"/>
+        <c:title>
+          <c:tx>
+            <c:rich>
+              <a:bodyPr/>
+              <a:lstStyle/>
+              <a:p>
+                <a:pPr>
+                  <a:defRPr/>
+                </a:pPr>
+                <a:r>
+                  <a:rPr lang="en-GB"/>
+                  <a:t>Wavelength/</a:t>
+                </a:r>
+                <a:r>
+                  <a:rPr lang="en-GB" baseline="0"/>
+                  <a:t>nm</a:t>
+                </a:r>
+                <a:endParaRPr lang="en-GB"/>
+              </a:p>
+            </c:rich>
+          </c:tx>
+          <c:layout/>
+          <c:overlay val="0"/>
+        </c:title>
+        <c:numFmt formatCode="General" sourceLinked="1"/>
+        <c:majorTickMark val="out"/>
+        <c:minorTickMark val="none"/>
+        <c:tickLblPos val="nextTo"/>
+        <c:crossAx val="313572080"/>
+        <c:crosses val="autoZero"/>
+        <c:crossBetween val="midCat"/>
+      </c:valAx>
+      <c:valAx>
+        <c:axId val="313572080"/>
+        <c:scaling>
+          <c:orientation val="minMax"/>
+          <c:max val="2000"/>
+          <c:min val="0"/>
+        </c:scaling>
+        <c:delete val="0"/>
+        <c:axPos val="l"/>
+        <c:majorGridlines/>
+        <c:title>
+          <c:tx>
+            <c:rich>
+              <a:bodyPr/>
+              <a:lstStyle/>
+              <a:p>
+                <a:pPr>
+                  <a:defRPr/>
+                </a:pPr>
+                <a:r>
+                  <a:rPr lang="en-GB"/>
+                  <a:t>Intensity/AU</a:t>
+                </a:r>
+              </a:p>
+            </c:rich>
+          </c:tx>
+          <c:layout/>
+          <c:overlay val="0"/>
+        </c:title>
+        <c:numFmt formatCode="General" sourceLinked="1"/>
+        <c:majorTickMark val="out"/>
+        <c:minorTickMark val="none"/>
+        <c:tickLblPos val="nextTo"/>
+        <c:crossAx val="313575608"/>
+        <c:crosses val="autoZero"/>
+        <c:crossBetween val="midCat"/>
+      </c:valAx>
+      <c:spPr>
+        <a:gradFill>
+          <a:gsLst>
+            <a:gs pos="0">
+              <a:schemeClr val="accent1">
+                <a:lumMod val="5000"/>
+                <a:lumOff val="95000"/>
+              </a:schemeClr>
+            </a:gs>
+            <a:gs pos="76000">
+              <a:schemeClr val="accent1">
+                <a:lumMod val="45000"/>
+                <a:lumOff val="55000"/>
+              </a:schemeClr>
+            </a:gs>
+            <a:gs pos="94000">
+              <a:schemeClr val="accent1">
+                <a:lumMod val="45000"/>
+                <a:lumOff val="55000"/>
+              </a:schemeClr>
+            </a:gs>
+            <a:gs pos="100000">
+              <a:schemeClr val="accent1">
+                <a:lumMod val="30000"/>
+                <a:lumOff val="70000"/>
+              </a:schemeClr>
+            </a:gs>
+          </a:gsLst>
+          <a:lin ang="5400000" scaled="1"/>
+        </a:gradFill>
+        <a:ln>
+          <a:noFill/>
+        </a:ln>
+      </c:spPr>
+    </c:plotArea>
+    <c:legend>
+      <c:legendPos val="r"/>
+      <c:layout>
+        <c:manualLayout>
+          <c:xMode val="edge"/>
+          <c:yMode val="edge"/>
+          <c:x val="0.87188365316683336"/>
+          <c:y val="2.3449005909668289E-3"/>
+          <c:w val="0.12449318155882688"/>
+          <c:h val="0.99282669539230683"/>
+        </c:manualLayout>
+      </c:layout>
+      <c:overlay val="0"/>
+      <c:spPr>
+        <a:solidFill>
+          <a:schemeClr val="tx2">
+            <a:lumMod val="20000"/>
+            <a:lumOff val="80000"/>
+          </a:schemeClr>
+        </a:solidFill>
+      </c:spPr>
+    </c:legend>
+    <c:plotVisOnly val="1"/>
+    <c:dispBlanksAs val="gap"/>
+    <c:showDLblsOverMax val="0"/>
+  </c:chart>
+  <c:externalData r:id="rId1">
+    <c:autoUpdate val="0"/>
+  </c:externalData>
+</c:chartSpace>
+</file>
+
+<file path=ppt/charts/chart2.xml><?xml version="1.0" encoding="utf-8"?>
+<c:chartSpace xmlns:c="http://schemas.openxmlformats.org/drawingml/2006/chart" xmlns:a="http://schemas.openxmlformats.org/drawingml/2006/main" xmlns:r="http://schemas.openxmlformats.org/officeDocument/2006/relationships">
+  <c:date1904 val="0"/>
+  <c:lang val="en-US"/>
+  <c:roundedCorners val="0"/>
+  <mc:AlternateContent xmlns:mc="http://schemas.openxmlformats.org/markup-compatibility/2006">
+    <mc:Choice xmlns:c14="http://schemas.microsoft.com/office/drawing/2007/8/2/chart" Requires="c14">
+      <c14:style val="102"/>
+    </mc:Choice>
+    <mc:Fallback>
+      <c:style val="2"/>
+    </mc:Fallback>
+  </mc:AlternateContent>
+  <c:chart>
+    <c:title>
+      <c:layout/>
+      <c:overlay val="0"/>
+    </c:title>
+    <c:autoTitleDeleted val="0"/>
+    <c:plotArea>
+      <c:layout>
+        <c:manualLayout>
+          <c:layoutTarget val="inner"/>
+          <c:xMode val="edge"/>
+          <c:yMode val="edge"/>
+          <c:x val="3.1502352528514577E-2"/>
+          <c:y val="1.1317559185698803E-2"/>
+          <c:w val="0.9349618051639087"/>
+          <c:h val="0.94675049505287012"/>
+        </c:manualLayout>
+      </c:layout>
+      <c:scatterChart>
+        <c:scatterStyle val="smoothMarker"/>
+        <c:varyColors val="0"/>
+        <c:ser>
+          <c:idx val="0"/>
+          <c:order val="0"/>
+          <c:tx>
+            <c:strRef>
+              <c:f>Sheet1!$C$18</c:f>
+              <c:strCache>
+                <c:ptCount val="1"/>
+                <c:pt idx="0">
+                  <c:v>Leaf:</c:v>
+                </c:pt>
+              </c:strCache>
+            </c:strRef>
+          </c:tx>
+          <c:spPr>
+            <a:ln cap="rnd">
+              <a:solidFill>
+                <a:srgbClr val="92D050"/>
+              </a:solidFill>
+              <a:round/>
+            </a:ln>
+          </c:spPr>
+          <c:marker>
+            <c:symbol val="x"/>
+            <c:size val="7"/>
+            <c:spPr>
+              <a:noFill/>
+              <a:ln cap="rnd">
+                <a:solidFill>
+                  <a:schemeClr val="tx1"/>
+                </a:solidFill>
+              </a:ln>
+            </c:spPr>
+          </c:marker>
+          <c:xVal>
+            <c:numRef>
+              <c:f>Sheet1!$B$19:$B$27</c:f>
+              <c:numCache>
+                <c:formatCode>General</c:formatCode>
+                <c:ptCount val="9"/>
+                <c:pt idx="0">
+                  <c:v>470</c:v>
+                </c:pt>
+                <c:pt idx="1">
+                  <c:v>555</c:v>
+                </c:pt>
+                <c:pt idx="2">
+                  <c:v>585</c:v>
+                </c:pt>
+                <c:pt idx="3">
+                  <c:v>605</c:v>
+                </c:pt>
+                <c:pt idx="4">
+                  <c:v>635</c:v>
+                </c:pt>
+                <c:pt idx="5">
+                  <c:v>660</c:v>
+                </c:pt>
+                <c:pt idx="6">
+                  <c:v>695</c:v>
+                </c:pt>
+                <c:pt idx="7">
+                  <c:v>880</c:v>
+                </c:pt>
+                <c:pt idx="8">
+                  <c:v>940</c:v>
+                </c:pt>
+              </c:numCache>
+            </c:numRef>
+          </c:xVal>
+          <c:yVal>
+            <c:numRef>
+              <c:f>Sheet1!$C$19:$C$27</c:f>
+              <c:numCache>
+                <c:formatCode>General</c:formatCode>
+                <c:ptCount val="9"/>
+                <c:pt idx="0">
+                  <c:v>151</c:v>
+                </c:pt>
+                <c:pt idx="1">
+                  <c:v>280</c:v>
+                </c:pt>
+                <c:pt idx="2">
+                  <c:v>211</c:v>
+                </c:pt>
+                <c:pt idx="3">
+                  <c:v>165</c:v>
+                </c:pt>
+                <c:pt idx="4">
+                  <c:v>123</c:v>
+                </c:pt>
+                <c:pt idx="5">
+                  <c:v>249</c:v>
+                </c:pt>
+                <c:pt idx="6">
+                  <c:v>412</c:v>
+                </c:pt>
+                <c:pt idx="7">
+                  <c:v>615</c:v>
+                </c:pt>
+                <c:pt idx="8">
+                  <c:v>405</c:v>
+                </c:pt>
+              </c:numCache>
+            </c:numRef>
+          </c:yVal>
+          <c:smooth val="1"/>
+        </c:ser>
+        <c:dLbls>
+          <c:showLegendKey val="0"/>
+          <c:showVal val="0"/>
+          <c:showCatName val="0"/>
+          <c:showSerName val="0"/>
+          <c:showPercent val="0"/>
+          <c:showBubbleSize val="0"/>
+        </c:dLbls>
+        <c:axId val="313836352"/>
+        <c:axId val="313833608"/>
+      </c:scatterChart>
+      <c:valAx>
+        <c:axId val="313836352"/>
+        <c:scaling>
+          <c:orientation val="minMax"/>
+          <c:max val="950"/>
+          <c:min val="450"/>
+        </c:scaling>
+        <c:delete val="0"/>
+        <c:axPos val="b"/>
+        <c:numFmt formatCode="General" sourceLinked="1"/>
+        <c:majorTickMark val="out"/>
+        <c:minorTickMark val="none"/>
+        <c:tickLblPos val="nextTo"/>
+        <c:crossAx val="313833608"/>
+        <c:crosses val="autoZero"/>
+        <c:crossBetween val="midCat"/>
+      </c:valAx>
+      <c:valAx>
+        <c:axId val="313833608"/>
+        <c:scaling>
+          <c:orientation val="minMax"/>
+          <c:min val="0"/>
+        </c:scaling>
+        <c:delete val="0"/>
+        <c:axPos val="l"/>
+        <c:majorGridlines/>
+        <c:numFmt formatCode="General" sourceLinked="1"/>
+        <c:majorTickMark val="out"/>
+        <c:minorTickMark val="none"/>
+        <c:tickLblPos val="nextTo"/>
+        <c:crossAx val="313836352"/>
+        <c:crosses val="autoZero"/>
+        <c:crossBetween val="midCat"/>
+      </c:valAx>
+      <c:spPr>
+        <a:gradFill>
+          <a:gsLst>
+            <a:gs pos="0">
+              <a:schemeClr val="accent1">
+                <a:lumMod val="5000"/>
+                <a:lumOff val="95000"/>
+              </a:schemeClr>
+            </a:gs>
+            <a:gs pos="76000">
+              <a:schemeClr val="accent1">
+                <a:lumMod val="45000"/>
+                <a:lumOff val="55000"/>
+              </a:schemeClr>
+            </a:gs>
+            <a:gs pos="94000">
+              <a:schemeClr val="accent1">
+                <a:lumMod val="45000"/>
+                <a:lumOff val="55000"/>
+              </a:schemeClr>
+            </a:gs>
+            <a:gs pos="100000">
+              <a:schemeClr val="accent1">
+                <a:lumMod val="30000"/>
+                <a:lumOff val="70000"/>
+              </a:schemeClr>
+            </a:gs>
+          </a:gsLst>
+          <a:lin ang="5400000" scaled="1"/>
+        </a:gradFill>
+        <a:ln>
+          <a:noFill/>
+        </a:ln>
+      </c:spPr>
+    </c:plotArea>
+    <c:plotVisOnly val="1"/>
+    <c:dispBlanksAs val="gap"/>
+    <c:showDLblsOverMax val="0"/>
+  </c:chart>
+  <c:externalData r:id="rId1">
+    <c:autoUpdate val="0"/>
+  </c:externalData>
+</c:chartSpace>
 </file>
 
 <file path=ppt/slideLayouts/slideLayout1.xml><?xml version="1.0" encoding="utf-8"?>
@@ -3055,6 +5069,360 @@
 </p:sld>
 </file>
 
+<file path=ppt/slides/slide2.xml><?xml version="1.0" encoding="utf-8"?>
+<p:sld xmlns:a="http://schemas.openxmlformats.org/drawingml/2006/main" xmlns:r="http://schemas.openxmlformats.org/officeDocument/2006/relationships" xmlns:p="http://schemas.openxmlformats.org/presentationml/2006/main">
+  <p:cSld>
+    <p:spTree>
+      <p:nvGrpSpPr>
+        <p:cNvPr id="1" name=""/>
+        <p:cNvGrpSpPr/>
+        <p:nvPr/>
+      </p:nvGrpSpPr>
+      <p:grpSpPr>
+        <a:xfrm>
+          <a:off x="0" y="0"/>
+          <a:ext cx="0" cy="0"/>
+          <a:chOff x="0" y="0"/>
+          <a:chExt cx="0" cy="0"/>
+        </a:xfrm>
+      </p:grpSpPr>
+      <p:sp>
+        <p:nvSpPr>
+          <p:cNvPr id="2" name="Title 1"/>
+          <p:cNvSpPr>
+            <a:spLocks noGrp="1"/>
+          </p:cNvSpPr>
+          <p:nvPr>
+            <p:ph type="title"/>
+          </p:nvPr>
+        </p:nvSpPr>
+        <p:spPr/>
+        <p:txBody>
+          <a:bodyPr/>
+          <a:lstStyle/>
+          <a:p>
+            <a:r>
+              <a:rPr lang="en-GB" dirty="0" smtClean="0"/>
+              <a:t>Spectra of objects with handheld spectrometer</a:t>
+            </a:r>
+            <a:endParaRPr lang="en-GB" dirty="0"/>
+          </a:p>
+        </p:txBody>
+      </p:sp>
+      <p:graphicFrame>
+        <p:nvGraphicFramePr>
+          <p:cNvPr id="5" name="Chart 4"/>
+          <p:cNvGraphicFramePr>
+            <a:graphicFrameLocks/>
+          </p:cNvGraphicFramePr>
+          <p:nvPr>
+            <p:extLst>
+              <p:ext uri="{D42A27DB-BD31-4B8C-83A1-F6EECF244321}">
+                <p14:modId xmlns:p14="http://schemas.microsoft.com/office/powerpoint/2010/main" val="2745908023"/>
+              </p:ext>
+            </p:extLst>
+          </p:nvPr>
+        </p:nvGraphicFramePr>
+        <p:xfrm>
+          <a:off x="0" y="1525225"/>
+          <a:ext cx="10843771" cy="5267461"/>
+        </p:xfrm>
+        <a:graphic>
+          <a:graphicData uri="http://schemas.openxmlformats.org/drawingml/2006/chart">
+            <c:chart xmlns:c="http://schemas.openxmlformats.org/drawingml/2006/chart" xmlns:r="http://schemas.openxmlformats.org/officeDocument/2006/relationships" r:id="rId2"/>
+          </a:graphicData>
+        </a:graphic>
+      </p:graphicFrame>
+    </p:spTree>
+    <p:extLst>
+      <p:ext uri="{BB962C8B-B14F-4D97-AF65-F5344CB8AC3E}">
+        <p14:creationId xmlns:p14="http://schemas.microsoft.com/office/powerpoint/2010/main" val="219609254"/>
+      </p:ext>
+    </p:extLst>
+  </p:cSld>
+  <p:clrMapOvr>
+    <a:masterClrMapping/>
+  </p:clrMapOvr>
+</p:sld>
+</file>
+
+<file path=ppt/slides/slide3.xml><?xml version="1.0" encoding="utf-8"?>
+<p:sld xmlns:a="http://schemas.openxmlformats.org/drawingml/2006/main" xmlns:r="http://schemas.openxmlformats.org/officeDocument/2006/relationships" xmlns:p="http://schemas.openxmlformats.org/presentationml/2006/main">
+  <p:cSld>
+    <p:spTree>
+      <p:nvGrpSpPr>
+        <p:cNvPr id="1" name=""/>
+        <p:cNvGrpSpPr/>
+        <p:nvPr/>
+      </p:nvGrpSpPr>
+      <p:grpSpPr>
+        <a:xfrm>
+          <a:off x="0" y="0"/>
+          <a:ext cx="0" cy="0"/>
+          <a:chOff x="0" y="0"/>
+          <a:chExt cx="0" cy="0"/>
+        </a:xfrm>
+      </p:grpSpPr>
+      <p:sp>
+        <p:nvSpPr>
+          <p:cNvPr id="2" name="Title 1"/>
+          <p:cNvSpPr>
+            <a:spLocks noGrp="1"/>
+          </p:cNvSpPr>
+          <p:nvPr>
+            <p:ph type="title"/>
+          </p:nvPr>
+        </p:nvSpPr>
+        <p:spPr/>
+        <p:txBody>
+          <a:bodyPr/>
+          <a:lstStyle/>
+          <a:p>
+            <a:r>
+              <a:rPr lang="en-GB" dirty="0" smtClean="0"/>
+              <a:t>Comparing to Known spectra</a:t>
+            </a:r>
+            <a:endParaRPr lang="en-GB" dirty="0"/>
+          </a:p>
+        </p:txBody>
+      </p:sp>
+      <p:grpSp>
+        <p:nvGrpSpPr>
+          <p:cNvPr id="9" name="Group 8"/>
+          <p:cNvGrpSpPr/>
+          <p:nvPr/>
+        </p:nvGrpSpPr>
+        <p:grpSpPr>
+          <a:xfrm>
+            <a:off x="176495" y="1690688"/>
+            <a:ext cx="7106894" cy="3968940"/>
+            <a:chOff x="176495" y="1690688"/>
+            <a:chExt cx="7147414" cy="3968940"/>
+          </a:xfrm>
+        </p:grpSpPr>
+        <p:graphicFrame>
+          <p:nvGraphicFramePr>
+            <p:cNvPr id="4" name="Chart 3"/>
+            <p:cNvGraphicFramePr>
+              <a:graphicFrameLocks/>
+            </p:cNvGraphicFramePr>
+            <p:nvPr>
+              <p:extLst>
+                <p:ext uri="{D42A27DB-BD31-4B8C-83A1-F6EECF244321}">
+                  <p14:modId xmlns:p14="http://schemas.microsoft.com/office/powerpoint/2010/main" val="63599492"/>
+                </p:ext>
+              </p:extLst>
+            </p:nvPr>
+          </p:nvGraphicFramePr>
+          <p:xfrm>
+            <a:off x="176495" y="1690688"/>
+            <a:ext cx="7147414" cy="3968940"/>
+          </p:xfrm>
+          <a:graphic>
+            <a:graphicData uri="http://schemas.openxmlformats.org/drawingml/2006/chart">
+              <c:chart xmlns:c="http://schemas.openxmlformats.org/drawingml/2006/chart" xmlns:r="http://schemas.openxmlformats.org/officeDocument/2006/relationships" r:id="rId2"/>
+            </a:graphicData>
+          </a:graphic>
+        </p:graphicFrame>
+        <p:sp>
+          <p:nvSpPr>
+            <p:cNvPr id="7" name="Rectangle 6"/>
+            <p:cNvSpPr/>
+            <p:nvPr/>
+          </p:nvSpPr>
+          <p:spPr>
+            <a:xfrm>
+              <a:off x="838200" y="2926081"/>
+              <a:ext cx="3002280" cy="2333897"/>
+            </a:xfrm>
+            <a:prstGeom prst="rect">
+              <a:avLst/>
+            </a:prstGeom>
+            <a:noFill/>
+          </p:spPr>
+          <p:style>
+            <a:lnRef idx="2">
+              <a:schemeClr val="accent1">
+                <a:shade val="50000"/>
+              </a:schemeClr>
+            </a:lnRef>
+            <a:fillRef idx="1">
+              <a:schemeClr val="accent1"/>
+            </a:fillRef>
+            <a:effectRef idx="0">
+              <a:schemeClr val="accent1"/>
+            </a:effectRef>
+            <a:fontRef idx="minor">
+              <a:schemeClr val="lt1"/>
+            </a:fontRef>
+          </p:style>
+          <p:txBody>
+            <a:bodyPr rtlCol="0" anchor="ctr"/>
+            <a:lstStyle/>
+            <a:p>
+              <a:pPr algn="ctr"/>
+              <a:endParaRPr lang="en-GB"/>
+            </a:p>
+          </p:txBody>
+        </p:sp>
+      </p:grpSp>
+      <p:grpSp>
+        <p:nvGrpSpPr>
+          <p:cNvPr id="10" name="Group 9"/>
+          <p:cNvGrpSpPr/>
+          <p:nvPr/>
+        </p:nvGrpSpPr>
+        <p:grpSpPr>
+          <a:xfrm>
+            <a:off x="7448852" y="1690688"/>
+            <a:ext cx="4299011" cy="4589845"/>
+            <a:chOff x="7614315" y="2269939"/>
+            <a:chExt cx="4299011" cy="4589845"/>
+          </a:xfrm>
+        </p:grpSpPr>
+        <p:pic>
+          <p:nvPicPr>
+            <p:cNvPr id="5" name="Picture 4"/>
+            <p:cNvPicPr>
+              <a:picLocks noChangeAspect="1"/>
+            </p:cNvPicPr>
+            <p:nvPr/>
+          </p:nvPicPr>
+          <p:blipFill>
+            <a:blip r:embed="rId3">
+              <a:extLst>
+                <a:ext uri="{28A0092B-C50C-407E-A947-70E740481C1C}">
+                  <a14:useLocalDpi xmlns:a14="http://schemas.microsoft.com/office/drawing/2010/main" val="0"/>
+                </a:ext>
+              </a:extLst>
+            </a:blip>
+            <a:stretch>
+              <a:fillRect/>
+            </a:stretch>
+          </p:blipFill>
+          <p:spPr>
+            <a:xfrm>
+              <a:off x="7614315" y="2269939"/>
+              <a:ext cx="3739485" cy="3830415"/>
+            </a:xfrm>
+            <a:prstGeom prst="rect">
+              <a:avLst/>
+            </a:prstGeom>
+          </p:spPr>
+        </p:pic>
+        <p:sp>
+          <p:nvSpPr>
+            <p:cNvPr id="6" name="Rectangle 5"/>
+            <p:cNvSpPr/>
+            <p:nvPr/>
+          </p:nvSpPr>
+          <p:spPr>
+            <a:xfrm>
+              <a:off x="9405257" y="4319451"/>
+              <a:ext cx="1846217" cy="1254035"/>
+            </a:xfrm>
+            <a:prstGeom prst="rect">
+              <a:avLst/>
+            </a:prstGeom>
+            <a:noFill/>
+          </p:spPr>
+          <p:style>
+            <a:lnRef idx="2">
+              <a:schemeClr val="accent1">
+                <a:shade val="50000"/>
+              </a:schemeClr>
+            </a:lnRef>
+            <a:fillRef idx="1">
+              <a:schemeClr val="accent1"/>
+            </a:fillRef>
+            <a:effectRef idx="0">
+              <a:schemeClr val="accent1"/>
+            </a:effectRef>
+            <a:fontRef idx="minor">
+              <a:schemeClr val="lt1"/>
+            </a:fontRef>
+          </p:style>
+          <p:txBody>
+            <a:bodyPr rtlCol="0" anchor="ctr"/>
+            <a:lstStyle/>
+            <a:p>
+              <a:pPr algn="ctr"/>
+              <a:endParaRPr lang="en-GB"/>
+            </a:p>
+          </p:txBody>
+        </p:sp>
+        <p:sp>
+          <p:nvSpPr>
+            <p:cNvPr id="8" name="TextBox 7"/>
+            <p:cNvSpPr txBox="1"/>
+            <p:nvPr/>
+          </p:nvSpPr>
+          <p:spPr>
+            <a:xfrm>
+              <a:off x="7907383" y="6074954"/>
+              <a:ext cx="4005943" cy="784830"/>
+            </a:xfrm>
+            <a:prstGeom prst="rect">
+              <a:avLst/>
+            </a:prstGeom>
+            <a:noFill/>
+          </p:spPr>
+          <p:txBody>
+            <a:bodyPr wrap="square" rtlCol="0">
+              <a:spAutoFit/>
+            </a:bodyPr>
+            <a:lstStyle/>
+            <a:p>
+              <a:r>
+                <a:rPr lang="en-GB" sz="900" dirty="0">
+                  <a:solidFill>
+                    <a:schemeClr val="tx1">
+                      <a:lumMod val="50000"/>
+                      <a:lumOff val="50000"/>
+                    </a:schemeClr>
+                  </a:solidFill>
+                </a:rPr>
+                <a:t>Figure 1: Mean reflectance spectra of brown leaf litter (n = 20) and... - Scientific Figure on </a:t>
+              </a:r>
+              <a:r>
+                <a:rPr lang="en-GB" sz="900" dirty="0" err="1">
+                  <a:solidFill>
+                    <a:schemeClr val="tx1">
+                      <a:lumMod val="50000"/>
+                      <a:lumOff val="50000"/>
+                    </a:schemeClr>
+                  </a:solidFill>
+                </a:rPr>
+                <a:t>ResearchGate</a:t>
+              </a:r>
+              <a:r>
+                <a:rPr lang="en-GB" sz="900" dirty="0">
+                  <a:solidFill>
+                    <a:schemeClr val="tx1">
+                      <a:lumMod val="50000"/>
+                      <a:lumOff val="50000"/>
+                    </a:schemeClr>
+                  </a:solidFill>
+                </a:rPr>
+                <a:t>. Available from: https://www.researchgate.net/figure/276212092_fig6_Figure-1-Mean-reflectance-spectra-of-brown-leaf-litter-n-20-and-green-foliage-n [accessed Feb 19, 2016]</a:t>
+              </a:r>
+            </a:p>
+          </p:txBody>
+        </p:sp>
+      </p:grpSp>
+    </p:spTree>
+    <p:extLst>
+      <p:ext uri="{BB962C8B-B14F-4D97-AF65-F5344CB8AC3E}">
+        <p14:creationId xmlns:p14="http://schemas.microsoft.com/office/powerpoint/2010/main" val="661632368"/>
+      </p:ext>
+    </p:extLst>
+  </p:cSld>
+  <p:clrMapOvr>
+    <a:masterClrMapping/>
+  </p:clrMapOvr>
+</p:sld>
+</file>
+
 <file path=ppt/theme/theme1.xml><?xml version="1.0" encoding="utf-8"?>
 <a:theme xmlns:a="http://schemas.openxmlformats.org/drawingml/2006/main" name="Office Theme">
   <a:themeElements>

</xml_diff>

<commit_message>
add goals of presentation
</commit_message>
<xml_diff>
--- a/Spectra.of.the.Moon.using.a.Robotic.Telescope.pptx
+++ b/Spectra.of.the.Moon.using.a.Robotic.Telescope.pptx
@@ -6,8 +6,9 @@
   </p:sldMasterIdLst>
   <p:sldIdLst>
     <p:sldId id="256" r:id="rId2"/>
-    <p:sldId id="257" r:id="rId3"/>
-    <p:sldId id="258" r:id="rId4"/>
+    <p:sldId id="259" r:id="rId3"/>
+    <p:sldId id="257" r:id="rId4"/>
+    <p:sldId id="258" r:id="rId5"/>
   </p:sldIdLst>
   <p:sldSz cx="12192000" cy="6858000"/>
   <p:notesSz cx="6858000" cy="9144000"/>
@@ -1741,11 +1742,11 @@
           <c:showPercent val="0"/>
           <c:showBubbleSize val="0"/>
         </c:dLbls>
-        <c:axId val="313575608"/>
-        <c:axId val="313572080"/>
+        <c:axId val="200740656"/>
+        <c:axId val="200741048"/>
       </c:scatterChart>
       <c:valAx>
-        <c:axId val="313575608"/>
+        <c:axId val="200740656"/>
         <c:scaling>
           <c:orientation val="minMax"/>
           <c:max val="950"/>
@@ -1781,12 +1782,12 @@
         <c:majorTickMark val="out"/>
         <c:minorTickMark val="none"/>
         <c:tickLblPos val="nextTo"/>
-        <c:crossAx val="313572080"/>
+        <c:crossAx val="200741048"/>
         <c:crosses val="autoZero"/>
         <c:crossBetween val="midCat"/>
       </c:valAx>
       <c:valAx>
-        <c:axId val="313572080"/>
+        <c:axId val="200741048"/>
         <c:scaling>
           <c:orientation val="minMax"/>
           <c:max val="2000"/>
@@ -1818,7 +1819,7 @@
         <c:majorTickMark val="out"/>
         <c:minorTickMark val="none"/>
         <c:tickLblPos val="nextTo"/>
-        <c:crossAx val="313575608"/>
+        <c:crossAx val="200740656"/>
         <c:crosses val="autoZero"/>
         <c:crossBetween val="midCat"/>
       </c:valAx>
@@ -2039,11 +2040,11 @@
           <c:showPercent val="0"/>
           <c:showBubbleSize val="0"/>
         </c:dLbls>
-        <c:axId val="313836352"/>
-        <c:axId val="313833608"/>
+        <c:axId val="200741832"/>
+        <c:axId val="200742616"/>
       </c:scatterChart>
       <c:valAx>
-        <c:axId val="313836352"/>
+        <c:axId val="200741832"/>
         <c:scaling>
           <c:orientation val="minMax"/>
           <c:max val="950"/>
@@ -2055,12 +2056,12 @@
         <c:majorTickMark val="out"/>
         <c:minorTickMark val="none"/>
         <c:tickLblPos val="nextTo"/>
-        <c:crossAx val="313833608"/>
+        <c:crossAx val="200742616"/>
         <c:crosses val="autoZero"/>
         <c:crossBetween val="midCat"/>
       </c:valAx>
       <c:valAx>
-        <c:axId val="313833608"/>
+        <c:axId val="200742616"/>
         <c:scaling>
           <c:orientation val="minMax"/>
           <c:min val="0"/>
@@ -2072,7 +2073,7 @@
         <c:majorTickMark val="out"/>
         <c:minorTickMark val="none"/>
         <c:tickLblPos val="nextTo"/>
-        <c:crossAx val="313836352"/>
+        <c:crossAx val="200741832"/>
         <c:crosses val="autoZero"/>
         <c:crossBetween val="midCat"/>
       </c:valAx>
@@ -2252,7 +2253,7 @@
           <a:p>
             <a:fld id="{D740CCCC-DC05-48B5-A616-8A1A10162312}" type="datetimeFigureOut">
               <a:rPr lang="en-GB" smtClean="0"/>
-              <a:t>19/02/2016</a:t>
+              <a:t>22/02/2016</a:t>
             </a:fld>
             <a:endParaRPr lang="en-GB"/>
           </a:p>
@@ -2422,7 +2423,7 @@
           <a:p>
             <a:fld id="{D740CCCC-DC05-48B5-A616-8A1A10162312}" type="datetimeFigureOut">
               <a:rPr lang="en-GB" smtClean="0"/>
-              <a:t>19/02/2016</a:t>
+              <a:t>22/02/2016</a:t>
             </a:fld>
             <a:endParaRPr lang="en-GB"/>
           </a:p>
@@ -2602,7 +2603,7 @@
           <a:p>
             <a:fld id="{D740CCCC-DC05-48B5-A616-8A1A10162312}" type="datetimeFigureOut">
               <a:rPr lang="en-GB" smtClean="0"/>
-              <a:t>19/02/2016</a:t>
+              <a:t>22/02/2016</a:t>
             </a:fld>
             <a:endParaRPr lang="en-GB"/>
           </a:p>
@@ -2772,7 +2773,7 @@
           <a:p>
             <a:fld id="{D740CCCC-DC05-48B5-A616-8A1A10162312}" type="datetimeFigureOut">
               <a:rPr lang="en-GB" smtClean="0"/>
-              <a:t>19/02/2016</a:t>
+              <a:t>22/02/2016</a:t>
             </a:fld>
             <a:endParaRPr lang="en-GB"/>
           </a:p>
@@ -3018,7 +3019,7 @@
           <a:p>
             <a:fld id="{D740CCCC-DC05-48B5-A616-8A1A10162312}" type="datetimeFigureOut">
               <a:rPr lang="en-GB" smtClean="0"/>
-              <a:t>19/02/2016</a:t>
+              <a:t>22/02/2016</a:t>
             </a:fld>
             <a:endParaRPr lang="en-GB"/>
           </a:p>
@@ -3250,7 +3251,7 @@
           <a:p>
             <a:fld id="{D740CCCC-DC05-48B5-A616-8A1A10162312}" type="datetimeFigureOut">
               <a:rPr lang="en-GB" smtClean="0"/>
-              <a:t>19/02/2016</a:t>
+              <a:t>22/02/2016</a:t>
             </a:fld>
             <a:endParaRPr lang="en-GB"/>
           </a:p>
@@ -3617,7 +3618,7 @@
           <a:p>
             <a:fld id="{D740CCCC-DC05-48B5-A616-8A1A10162312}" type="datetimeFigureOut">
               <a:rPr lang="en-GB" smtClean="0"/>
-              <a:t>19/02/2016</a:t>
+              <a:t>22/02/2016</a:t>
             </a:fld>
             <a:endParaRPr lang="en-GB"/>
           </a:p>
@@ -3735,7 +3736,7 @@
           <a:p>
             <a:fld id="{D740CCCC-DC05-48B5-A616-8A1A10162312}" type="datetimeFigureOut">
               <a:rPr lang="en-GB" smtClean="0"/>
-              <a:t>19/02/2016</a:t>
+              <a:t>22/02/2016</a:t>
             </a:fld>
             <a:endParaRPr lang="en-GB"/>
           </a:p>
@@ -3830,7 +3831,7 @@
           <a:p>
             <a:fld id="{D740CCCC-DC05-48B5-A616-8A1A10162312}" type="datetimeFigureOut">
               <a:rPr lang="en-GB" smtClean="0"/>
-              <a:t>19/02/2016</a:t>
+              <a:t>22/02/2016</a:t>
             </a:fld>
             <a:endParaRPr lang="en-GB"/>
           </a:p>
@@ -4107,7 +4108,7 @@
           <a:p>
             <a:fld id="{D740CCCC-DC05-48B5-A616-8A1A10162312}" type="datetimeFigureOut">
               <a:rPr lang="en-GB" smtClean="0"/>
-              <a:t>19/02/2016</a:t>
+              <a:t>22/02/2016</a:t>
             </a:fld>
             <a:endParaRPr lang="en-GB"/>
           </a:p>
@@ -4360,7 +4361,7 @@
           <a:p>
             <a:fld id="{D740CCCC-DC05-48B5-A616-8A1A10162312}" type="datetimeFigureOut">
               <a:rPr lang="en-GB" smtClean="0"/>
-              <a:t>19/02/2016</a:t>
+              <a:t>22/02/2016</a:t>
             </a:fld>
             <a:endParaRPr lang="en-GB"/>
           </a:p>
@@ -4573,7 +4574,7 @@
           <a:p>
             <a:fld id="{D740CCCC-DC05-48B5-A616-8A1A10162312}" type="datetimeFigureOut">
               <a:rPr lang="en-GB" smtClean="0"/>
-              <a:t>19/02/2016</a:t>
+              <a:t>22/02/2016</a:t>
             </a:fld>
             <a:endParaRPr lang="en-GB"/>
           </a:p>
@@ -5101,6 +5102,498 @@
           <a:bodyPr/>
           <a:lstStyle/>
           <a:p>
+            <a:endParaRPr lang="en-GB"/>
+          </a:p>
+        </p:txBody>
+      </p:sp>
+      <p:sp>
+        <p:nvSpPr>
+          <p:cNvPr id="3" name="Content Placeholder 2"/>
+          <p:cNvSpPr>
+            <a:spLocks noGrp="1"/>
+          </p:cNvSpPr>
+          <p:nvPr>
+            <p:ph idx="1"/>
+          </p:nvPr>
+        </p:nvSpPr>
+        <p:spPr/>
+        <p:txBody>
+          <a:bodyPr>
+            <a:noAutofit/>
+          </a:bodyPr>
+          <a:lstStyle/>
+          <a:p>
+            <a:r>
+              <a:rPr lang="en-GB" sz="800" dirty="0" err="1" smtClean="0"/>
+              <a:t>Goals:the</a:t>
+            </a:r>
+            <a:r>
+              <a:rPr lang="en-GB" sz="800" dirty="0" smtClean="0"/>
+              <a:t> </a:t>
+            </a:r>
+            <a:r>
+              <a:rPr lang="en-GB" sz="800" dirty="0"/>
+              <a:t>following steps (</a:t>
+            </a:r>
+            <a:r>
+              <a:rPr lang="en-GB" sz="800" dirty="0" smtClean="0"/>
+              <a:t>1-5) </a:t>
+            </a:r>
+            <a:r>
+              <a:rPr lang="en-GB" sz="800" dirty="0"/>
+              <a:t>are </a:t>
+            </a:r>
+            <a:r>
+              <a:rPr lang="en-GB" sz="800" dirty="0" err="1" smtClean="0"/>
+              <a:t>mandatoryin</a:t>
+            </a:r>
+            <a:r>
+              <a:rPr lang="en-GB" sz="800" dirty="0" smtClean="0"/>
+              <a:t> </a:t>
+            </a:r>
+            <a:r>
+              <a:rPr lang="en-GB" sz="800" dirty="0"/>
+              <a:t>order to complete the </a:t>
+            </a:r>
+            <a:r>
+              <a:rPr lang="en-GB" sz="800" dirty="0" smtClean="0"/>
+              <a:t>project, however </a:t>
+            </a:r>
+            <a:r>
+              <a:rPr lang="en-GB" sz="800" dirty="0"/>
+              <a:t>you may </a:t>
+            </a:r>
+            <a:r>
+              <a:rPr lang="en-GB" sz="800" dirty="0" smtClean="0"/>
+              <a:t>boost marks</a:t>
+            </a:r>
+            <a:r>
+              <a:rPr lang="en-GB" sz="800" dirty="0"/>
+              <a:t>, either as a group, or as </a:t>
+            </a:r>
+            <a:r>
+              <a:rPr lang="en-GB" sz="800" dirty="0" smtClean="0"/>
+              <a:t>an </a:t>
+            </a:r>
+            <a:r>
+              <a:rPr lang="en-GB" sz="800" dirty="0" err="1" smtClean="0"/>
+              <a:t>individual,with</a:t>
+            </a:r>
+            <a:r>
+              <a:rPr lang="en-GB" sz="800" dirty="0" smtClean="0"/>
+              <a:t> optional goals </a:t>
+            </a:r>
+            <a:r>
+              <a:rPr lang="en-GB" sz="800" dirty="0"/>
+              <a:t>(</a:t>
+            </a:r>
+            <a:r>
+              <a:rPr lang="en-GB" sz="800" dirty="0" smtClean="0"/>
+              <a:t>5-8). (1)Demonstrate </a:t>
+            </a:r>
+            <a:r>
+              <a:rPr lang="en-GB" sz="800" dirty="0"/>
+              <a:t>acquiring </a:t>
+            </a:r>
+            <a:r>
+              <a:rPr lang="en-GB" sz="800" dirty="0" smtClean="0"/>
+              <a:t>calibrated </a:t>
+            </a:r>
+            <a:r>
+              <a:rPr lang="en-GB" sz="800" dirty="0"/>
+              <a:t>test spectra of different materials </a:t>
+            </a:r>
+            <a:r>
+              <a:rPr lang="en-GB" sz="800" dirty="0" smtClean="0"/>
+              <a:t>.</a:t>
+            </a:r>
+            <a:r>
+              <a:rPr lang="en-GB" sz="800" dirty="0"/>
+              <a:t>g. tarmac, </a:t>
+            </a:r>
+            <a:r>
+              <a:rPr lang="en-GB" sz="800" dirty="0" smtClean="0"/>
+              <a:t>concrete</a:t>
+            </a:r>
+            <a:r>
+              <a:rPr lang="en-GB" sz="800" dirty="0"/>
+              <a:t>, rock </a:t>
+            </a:r>
+            <a:r>
+              <a:rPr lang="en-GB" sz="800" dirty="0" smtClean="0"/>
+              <a:t>samples, vegetation, using </a:t>
+            </a:r>
+            <a:r>
+              <a:rPr lang="en-GB" sz="800" dirty="0"/>
+              <a:t>a hand held </a:t>
+            </a:r>
+            <a:r>
+              <a:rPr lang="en-GB" sz="800" dirty="0" smtClean="0"/>
+              <a:t>spectrometer. (2)Use </a:t>
+            </a:r>
+            <a:r>
+              <a:rPr lang="en-GB" sz="800" dirty="0"/>
+              <a:t>N </a:t>
+            </a:r>
+            <a:r>
+              <a:rPr lang="en-GB" sz="800" dirty="0" smtClean="0"/>
+              <a:t>(</a:t>
+            </a:r>
+            <a:r>
+              <a:rPr lang="en-GB" sz="800" dirty="0"/>
+              <a:t>e.g. 20) </a:t>
+            </a:r>
+            <a:r>
+              <a:rPr lang="en-GB" sz="800" dirty="0" smtClean="0"/>
+              <a:t>identifiable reference </a:t>
+            </a:r>
+            <a:r>
+              <a:rPr lang="en-GB" sz="800" dirty="0"/>
+              <a:t>areas of the Moon </a:t>
+            </a:r>
+            <a:r>
+              <a:rPr lang="en-GB" sz="800" dirty="0" smtClean="0"/>
+              <a:t>(</a:t>
+            </a:r>
+            <a:r>
+              <a:rPr lang="en-GB" sz="800" dirty="0"/>
+              <a:t>highland and/or </a:t>
+            </a:r>
+            <a:r>
+              <a:rPr lang="en-GB" sz="800" dirty="0" smtClean="0"/>
+              <a:t>mare</a:t>
+            </a:r>
+            <a:r>
+              <a:rPr lang="en-GB" sz="800" dirty="0"/>
+              <a:t>) to calibrate measured </a:t>
+            </a:r>
+            <a:r>
+              <a:rPr lang="en-GB" sz="800" dirty="0" smtClean="0"/>
+              <a:t>brightness </a:t>
+            </a:r>
+            <a:r>
+              <a:rPr lang="en-GB" sz="800" dirty="0"/>
+              <a:t>values in the CCD camera </a:t>
+            </a:r>
+            <a:r>
+              <a:rPr lang="en-GB" sz="800" dirty="0" err="1" smtClean="0"/>
+              <a:t>wrta</a:t>
+            </a:r>
+            <a:r>
+              <a:rPr lang="en-GB" sz="800" dirty="0" smtClean="0"/>
+              <a:t> </a:t>
+            </a:r>
+            <a:r>
+              <a:rPr lang="en-GB" sz="800" dirty="0"/>
+              <a:t>standard lunar </a:t>
+            </a:r>
+            <a:r>
+              <a:rPr lang="en-GB" sz="800" dirty="0" err="1" smtClean="0"/>
+              <a:t>pectrum</a:t>
+            </a:r>
+            <a:r>
+              <a:rPr lang="en-GB" sz="800" dirty="0" smtClean="0"/>
+              <a:t>(find </a:t>
+            </a:r>
+            <a:r>
+              <a:rPr lang="en-GB" sz="800" dirty="0"/>
+              <a:t>this </a:t>
+            </a:r>
+            <a:r>
+              <a:rPr lang="en-GB" sz="800" dirty="0" smtClean="0"/>
+              <a:t>on-line). (3)select </a:t>
+            </a:r>
+            <a:r>
+              <a:rPr lang="en-GB" sz="800" dirty="0"/>
+              <a:t>and measure some target areas that you want to measure the spectrum of </a:t>
+            </a:r>
+            <a:r>
+              <a:rPr lang="en-GB" sz="800" dirty="0" err="1"/>
+              <a:t>wrt</a:t>
+            </a:r>
+            <a:r>
+              <a:rPr lang="en-GB" sz="800" dirty="0"/>
+              <a:t> the </a:t>
+            </a:r>
+            <a:r>
+              <a:rPr lang="en-GB" sz="800" dirty="0" smtClean="0"/>
+              <a:t>previously </a:t>
+            </a:r>
+            <a:r>
+              <a:rPr lang="en-GB" sz="800" dirty="0"/>
+              <a:t>derived </a:t>
+            </a:r>
+            <a:r>
+              <a:rPr lang="en-GB" sz="800" dirty="0" smtClean="0"/>
+              <a:t>standard </a:t>
+            </a:r>
+            <a:r>
+              <a:rPr lang="en-GB" sz="800" dirty="0"/>
+              <a:t>lunar spectra. </a:t>
+            </a:r>
+            <a:r>
+              <a:rPr lang="en-GB" sz="800" dirty="0" smtClean="0"/>
+              <a:t>(4)Analyse </a:t>
+            </a:r>
+            <a:r>
+              <a:rPr lang="en-GB" sz="800" dirty="0"/>
+              <a:t>the spectra from (3) to </a:t>
+            </a:r>
+            <a:r>
+              <a:rPr lang="en-GB" sz="800" dirty="0" smtClean="0"/>
+              <a:t>determine –can you </a:t>
+            </a:r>
+            <a:r>
+              <a:rPr lang="en-GB" sz="800" dirty="0"/>
+              <a:t>see any mineral absorption </a:t>
+            </a:r>
+            <a:r>
+              <a:rPr lang="en-GB" sz="800" dirty="0" smtClean="0"/>
+              <a:t>ands –what </a:t>
+            </a:r>
+            <a:r>
+              <a:rPr lang="en-GB" sz="800" dirty="0"/>
+              <a:t>might these </a:t>
+            </a:r>
+            <a:r>
+              <a:rPr lang="en-GB" sz="800" dirty="0" err="1" smtClean="0"/>
+              <a:t>be?What</a:t>
+            </a:r>
+            <a:r>
+              <a:rPr lang="en-GB" sz="800" dirty="0" smtClean="0"/>
+              <a:t> is/</a:t>
+            </a:r>
+            <a:r>
+              <a:rPr lang="en-GB" sz="800" dirty="0" err="1" smtClean="0"/>
+              <a:t>arethe</a:t>
+            </a:r>
+            <a:r>
+              <a:rPr lang="en-GB" sz="800" dirty="0" smtClean="0"/>
+              <a:t> </a:t>
+            </a:r>
+            <a:r>
+              <a:rPr lang="en-GB" sz="800" dirty="0"/>
+              <a:t>most colourful </a:t>
+            </a:r>
+            <a:r>
+              <a:rPr lang="en-GB" sz="800" dirty="0" smtClean="0"/>
+              <a:t>area(s)f </a:t>
+            </a:r>
+            <a:r>
+              <a:rPr lang="en-GB" sz="800" dirty="0"/>
+              <a:t>the Moon? </a:t>
+            </a:r>
+            <a:r>
+              <a:rPr lang="en-GB" sz="800" dirty="0" smtClean="0"/>
+              <a:t>(5)How </a:t>
+            </a:r>
+            <a:r>
+              <a:rPr lang="en-GB" sz="800" dirty="0"/>
+              <a:t>accurately can you measure absorption bands in the spectra of </a:t>
+            </a:r>
+            <a:r>
+              <a:rPr lang="en-GB" sz="800" dirty="0" smtClean="0"/>
+              <a:t>lunar </a:t>
+            </a:r>
+            <a:r>
+              <a:rPr lang="en-GB" sz="800" dirty="0"/>
+              <a:t>surface features you are </a:t>
+            </a:r>
+            <a:r>
+              <a:rPr lang="en-GB" sz="800" dirty="0" smtClean="0"/>
+              <a:t>studying(use </a:t>
+            </a:r>
+            <a:r>
+              <a:rPr lang="en-GB" sz="800" dirty="0"/>
+              <a:t>propagation of errors</a:t>
+            </a:r>
+            <a:r>
+              <a:rPr lang="en-GB" sz="800" dirty="0" smtClean="0"/>
+              <a:t>)? (6)Investigate </a:t>
+            </a:r>
+            <a:r>
+              <a:rPr lang="en-GB" sz="800" dirty="0"/>
+              <a:t>whether </a:t>
+            </a:r>
+            <a:r>
+              <a:rPr lang="en-GB" sz="800" dirty="0" smtClean="0"/>
+              <a:t>the </a:t>
+            </a:r>
+            <a:r>
+              <a:rPr lang="en-GB" sz="800" dirty="0" err="1" smtClean="0"/>
+              <a:t>elescope</a:t>
+            </a:r>
+            <a:r>
+              <a:rPr lang="en-GB" sz="800" dirty="0" smtClean="0"/>
+              <a:t> </a:t>
+            </a:r>
+            <a:r>
+              <a:rPr lang="en-GB" sz="800" dirty="0"/>
+              <a:t>optics suffer from </a:t>
+            </a:r>
+            <a:r>
+              <a:rPr lang="en-GB" sz="800" dirty="0" err="1" smtClean="0"/>
+              <a:t>vignetting,or</a:t>
+            </a:r>
+            <a:r>
+              <a:rPr lang="en-GB" sz="800" dirty="0" smtClean="0"/>
+              <a:t> </a:t>
+            </a:r>
+            <a:r>
+              <a:rPr lang="en-GB" sz="800" dirty="0"/>
+              <a:t>other </a:t>
+            </a:r>
+            <a:r>
+              <a:rPr lang="en-GB" sz="800" dirty="0" smtClean="0"/>
+              <a:t>non-linear </a:t>
+            </a:r>
+            <a:r>
+              <a:rPr lang="en-GB" sz="800" dirty="0"/>
+              <a:t>sensitivity </a:t>
+            </a:r>
+            <a:r>
+              <a:rPr lang="en-GB" sz="800" dirty="0" err="1" smtClean="0"/>
+              <a:t>effects,across</a:t>
+            </a:r>
+            <a:r>
+              <a:rPr lang="en-GB" sz="800" dirty="0" smtClean="0"/>
+              <a:t> </a:t>
+            </a:r>
+            <a:r>
+              <a:rPr lang="en-GB" sz="800" dirty="0" err="1" smtClean="0"/>
+              <a:t>theimage</a:t>
+            </a:r>
+            <a:r>
+              <a:rPr lang="en-GB" sz="800" dirty="0"/>
+              <a:t>. </a:t>
+            </a:r>
+            <a:r>
+              <a:rPr lang="en-GB" sz="800" dirty="0" smtClean="0"/>
+              <a:t>Can </a:t>
+            </a:r>
+            <a:r>
+              <a:rPr lang="en-GB" sz="800" dirty="0"/>
+              <a:t>you calibrate out/mitigate this effect if present? </a:t>
+            </a:r>
+            <a:r>
+              <a:rPr lang="en-GB" sz="800" dirty="0" smtClean="0"/>
+              <a:t>(7)Experiment </a:t>
+            </a:r>
+            <a:r>
+              <a:rPr lang="en-GB" sz="800" dirty="0"/>
+              <a:t>with producing </a:t>
+            </a:r>
+            <a:r>
+              <a:rPr lang="en-GB" sz="800" dirty="0" smtClean="0"/>
+              <a:t>meaningful co-registered </a:t>
+            </a:r>
+            <a:r>
+              <a:rPr lang="en-GB" sz="800" dirty="0"/>
+              <a:t>colour ratio images of the lunar surface </a:t>
+            </a:r>
+            <a:r>
+              <a:rPr lang="en-GB" sz="800" dirty="0" smtClean="0"/>
+              <a:t>o </a:t>
+            </a:r>
+            <a:r>
+              <a:rPr lang="en-GB" sz="800" dirty="0"/>
+              <a:t>highlight </a:t>
+            </a:r>
+            <a:r>
+              <a:rPr lang="en-GB" sz="800" dirty="0" smtClean="0"/>
+              <a:t>surface composition </a:t>
+            </a:r>
+            <a:r>
+              <a:rPr lang="en-GB" sz="800" dirty="0"/>
+              <a:t>differences. </a:t>
+            </a:r>
+            <a:r>
+              <a:rPr lang="en-GB" sz="800" dirty="0" smtClean="0"/>
+              <a:t>(8)Repeat </a:t>
+            </a:r>
+            <a:r>
+              <a:rPr lang="en-GB" sz="800" dirty="0"/>
+              <a:t>your spectra measurements at other </a:t>
+            </a:r>
+            <a:r>
+              <a:rPr lang="en-GB" sz="800" dirty="0" err="1" smtClean="0"/>
+              <a:t>lunarphases</a:t>
+            </a:r>
+            <a:r>
+              <a:rPr lang="en-GB" sz="800" dirty="0" smtClean="0"/>
+              <a:t> </a:t>
+            </a:r>
+            <a:r>
+              <a:rPr lang="en-GB" sz="800" dirty="0"/>
+              <a:t>to see if </a:t>
+            </a:r>
+            <a:r>
+              <a:rPr lang="en-GB" sz="800" dirty="0" smtClean="0"/>
+              <a:t>the </a:t>
+            </a:r>
+            <a:r>
+              <a:rPr lang="en-GB" sz="800" dirty="0"/>
+              <a:t>surface changes colour at different </a:t>
+            </a:r>
+            <a:r>
+              <a:rPr lang="en-GB" sz="800" dirty="0" smtClean="0"/>
+              <a:t>illumination </a:t>
+            </a:r>
+            <a:r>
+              <a:rPr lang="en-GB" sz="800" dirty="0"/>
+              <a:t>and viewing angles?</a:t>
+            </a:r>
+          </a:p>
+          <a:p>
+            <a:endParaRPr lang="en-GB" sz="800" dirty="0"/>
+          </a:p>
+        </p:txBody>
+      </p:sp>
+    </p:spTree>
+    <p:extLst>
+      <p:ext uri="{BB962C8B-B14F-4D97-AF65-F5344CB8AC3E}">
+        <p14:creationId xmlns:p14="http://schemas.microsoft.com/office/powerpoint/2010/main" val="1574227417"/>
+      </p:ext>
+    </p:extLst>
+  </p:cSld>
+  <p:clrMapOvr>
+    <a:masterClrMapping/>
+  </p:clrMapOvr>
+</p:sld>
+</file>
+
+<file path=ppt/slides/slide3.xml><?xml version="1.0" encoding="utf-8"?>
+<p:sld xmlns:a="http://schemas.openxmlformats.org/drawingml/2006/main" xmlns:r="http://schemas.openxmlformats.org/officeDocument/2006/relationships" xmlns:p="http://schemas.openxmlformats.org/presentationml/2006/main">
+  <p:cSld>
+    <p:spTree>
+      <p:nvGrpSpPr>
+        <p:cNvPr id="1" name=""/>
+        <p:cNvGrpSpPr/>
+        <p:nvPr/>
+      </p:nvGrpSpPr>
+      <p:grpSpPr>
+        <a:xfrm>
+          <a:off x="0" y="0"/>
+          <a:ext cx="0" cy="0"/>
+          <a:chOff x="0" y="0"/>
+          <a:chExt cx="0" cy="0"/>
+        </a:xfrm>
+      </p:grpSpPr>
+      <p:sp>
+        <p:nvSpPr>
+          <p:cNvPr id="2" name="Title 1"/>
+          <p:cNvSpPr>
+            <a:spLocks noGrp="1"/>
+          </p:cNvSpPr>
+          <p:nvPr>
+            <p:ph type="title"/>
+          </p:nvPr>
+        </p:nvSpPr>
+        <p:spPr/>
+        <p:txBody>
+          <a:bodyPr/>
+          <a:lstStyle/>
+          <a:p>
             <a:r>
               <a:rPr lang="en-GB" dirty="0" smtClean="0"/>
               <a:t>Spectra of objects with handheld spectrometer</a:t>
@@ -5146,7 +5639,7 @@
 </p:sld>
 </file>
 
-<file path=ppt/slides/slide3.xml><?xml version="1.0" encoding="utf-8"?>
+<file path=ppt/slides/slide4.xml><?xml version="1.0" encoding="utf-8"?>
 <p:sld xmlns:a="http://schemas.openxmlformats.org/drawingml/2006/main" xmlns:r="http://schemas.openxmlformats.org/officeDocument/2006/relationships" xmlns:p="http://schemas.openxmlformats.org/presentationml/2006/main">
   <p:cSld>
     <p:spTree>

</xml_diff>

<commit_message>
make goals of presentation readable
</commit_message>
<xml_diff>
--- a/Spectra.of.the.Moon.using.a.Robotic.Telescope.pptx
+++ b/Spectra.of.the.Moon.using.a.Robotic.Telescope.pptx
@@ -5102,7 +5102,7 @@
           <a:bodyPr/>
           <a:lstStyle/>
           <a:p>
-            <a:endParaRPr lang="en-GB"/>
+            <a:endParaRPr lang="en-GB" dirty="0"/>
           </a:p>
         </p:txBody>
       </p:sp>
@@ -5124,423 +5124,415 @@
           <a:lstStyle/>
           <a:p>
             <a:r>
-              <a:rPr lang="en-GB" sz="800" dirty="0" err="1" smtClean="0"/>
-              <a:t>Goals:the</a:t>
-            </a:r>
-            <a:r>
-              <a:rPr lang="en-GB" sz="800" dirty="0" smtClean="0"/>
-              <a:t> </a:t>
-            </a:r>
-            <a:r>
-              <a:rPr lang="en-GB" sz="800" dirty="0"/>
+              <a:rPr lang="en-GB" sz="1200" dirty="0" smtClean="0"/>
+              <a:t>Goals: the </a:t>
+            </a:r>
+            <a:r>
+              <a:rPr lang="en-GB" sz="1200" dirty="0"/>
               <a:t>following steps (</a:t>
             </a:r>
             <a:r>
-              <a:rPr lang="en-GB" sz="800" dirty="0" smtClean="0"/>
+              <a:rPr lang="en-GB" sz="1200" dirty="0" smtClean="0"/>
               <a:t>1-5) </a:t>
             </a:r>
             <a:r>
-              <a:rPr lang="en-GB" sz="800" dirty="0"/>
+              <a:rPr lang="en-GB" sz="1200" dirty="0"/>
               <a:t>are </a:t>
             </a:r>
             <a:r>
-              <a:rPr lang="en-GB" sz="800" dirty="0" err="1" smtClean="0"/>
-              <a:t>mandatoryin</a:t>
-            </a:r>
-            <a:r>
-              <a:rPr lang="en-GB" sz="800" dirty="0" smtClean="0"/>
-              <a:t> </a:t>
-            </a:r>
-            <a:r>
-              <a:rPr lang="en-GB" sz="800" dirty="0"/>
+              <a:rPr lang="en-GB" sz="1200" dirty="0" smtClean="0"/>
+              <a:t>mandatory in </a:t>
+            </a:r>
+            <a:r>
+              <a:rPr lang="en-GB" sz="1200" dirty="0"/>
               <a:t>order to complete the </a:t>
             </a:r>
             <a:r>
-              <a:rPr lang="en-GB" sz="800" dirty="0" smtClean="0"/>
+              <a:rPr lang="en-GB" sz="1200" dirty="0" smtClean="0"/>
               <a:t>project, however </a:t>
             </a:r>
             <a:r>
-              <a:rPr lang="en-GB" sz="800" dirty="0"/>
+              <a:rPr lang="en-GB" sz="1200" dirty="0"/>
               <a:t>you may </a:t>
             </a:r>
             <a:r>
-              <a:rPr lang="en-GB" sz="800" dirty="0" smtClean="0"/>
+              <a:rPr lang="en-GB" sz="1200" dirty="0" smtClean="0"/>
               <a:t>boost marks</a:t>
             </a:r>
             <a:r>
-              <a:rPr lang="en-GB" sz="800" dirty="0"/>
+              <a:rPr lang="en-GB" sz="1200" dirty="0"/>
               <a:t>, either as a group, or as </a:t>
             </a:r>
             <a:r>
-              <a:rPr lang="en-GB" sz="800" dirty="0" smtClean="0"/>
-              <a:t>an </a:t>
-            </a:r>
-            <a:r>
-              <a:rPr lang="en-GB" sz="800" dirty="0" err="1" smtClean="0"/>
-              <a:t>individual,with</a:t>
-            </a:r>
-            <a:r>
-              <a:rPr lang="en-GB" sz="800" dirty="0" smtClean="0"/>
-              <a:t> optional goals </a:t>
-            </a:r>
-            <a:r>
-              <a:rPr lang="en-GB" sz="800" dirty="0"/>
+              <a:rPr lang="en-GB" sz="1200" dirty="0" smtClean="0"/>
+              <a:t>an individual, with optional goals </a:t>
+            </a:r>
+            <a:r>
+              <a:rPr lang="en-GB" sz="1200" dirty="0"/>
               <a:t>(</a:t>
             </a:r>
             <a:r>
-              <a:rPr lang="en-GB" sz="800" dirty="0" smtClean="0"/>
-              <a:t>5-8). (1)Demonstrate </a:t>
-            </a:r>
-            <a:r>
-              <a:rPr lang="en-GB" sz="800" dirty="0"/>
+              <a:rPr lang="en-GB" sz="1200" dirty="0" smtClean="0"/>
+              <a:t>5-8). </a:t>
+            </a:r>
+          </a:p>
+          <a:p>
+            <a:r>
+              <a:rPr lang="en-GB" sz="1200" dirty="0" smtClean="0"/>
+              <a:t>(1)Demonstrate </a:t>
+            </a:r>
+            <a:r>
+              <a:rPr lang="en-GB" sz="1200" dirty="0"/>
               <a:t>acquiring </a:t>
             </a:r>
             <a:r>
-              <a:rPr lang="en-GB" sz="800" dirty="0" smtClean="0"/>
+              <a:rPr lang="en-GB" sz="1200" dirty="0" smtClean="0"/>
               <a:t>calibrated </a:t>
             </a:r>
             <a:r>
-              <a:rPr lang="en-GB" sz="800" dirty="0"/>
+              <a:rPr lang="en-GB" sz="1200" dirty="0"/>
               <a:t>test spectra of different materials </a:t>
             </a:r>
             <a:r>
-              <a:rPr lang="en-GB" sz="800" dirty="0" smtClean="0"/>
+              <a:rPr lang="en-GB" sz="1200" dirty="0" smtClean="0"/>
               <a:t>.</a:t>
             </a:r>
             <a:r>
-              <a:rPr lang="en-GB" sz="800" dirty="0"/>
+              <a:rPr lang="en-GB" sz="1200" dirty="0"/>
               <a:t>g. tarmac, </a:t>
             </a:r>
             <a:r>
-              <a:rPr lang="en-GB" sz="800" dirty="0" smtClean="0"/>
+              <a:rPr lang="en-GB" sz="1200" dirty="0" smtClean="0"/>
               <a:t>concrete</a:t>
             </a:r>
             <a:r>
-              <a:rPr lang="en-GB" sz="800" dirty="0"/>
+              <a:rPr lang="en-GB" sz="1200" dirty="0"/>
               <a:t>, rock </a:t>
             </a:r>
             <a:r>
-              <a:rPr lang="en-GB" sz="800" dirty="0" smtClean="0"/>
+              <a:rPr lang="en-GB" sz="1200" dirty="0" smtClean="0"/>
               <a:t>samples, vegetation, using </a:t>
             </a:r>
             <a:r>
-              <a:rPr lang="en-GB" sz="800" dirty="0"/>
+              <a:rPr lang="en-GB" sz="1200" dirty="0"/>
               <a:t>a hand held </a:t>
             </a:r>
             <a:r>
-              <a:rPr lang="en-GB" sz="800" dirty="0" smtClean="0"/>
-              <a:t>spectrometer. (2)Use </a:t>
-            </a:r>
-            <a:r>
-              <a:rPr lang="en-GB" sz="800" dirty="0"/>
+              <a:rPr lang="en-GB" sz="1200" dirty="0" smtClean="0"/>
+              <a:t>spectrometer. </a:t>
+            </a:r>
+          </a:p>
+          <a:p>
+            <a:r>
+              <a:rPr lang="en-GB" sz="1200" dirty="0" smtClean="0"/>
+              <a:t>(2)Use </a:t>
+            </a:r>
+            <a:r>
+              <a:rPr lang="en-GB" sz="1200" dirty="0"/>
               <a:t>N </a:t>
             </a:r>
             <a:r>
-              <a:rPr lang="en-GB" sz="800" dirty="0" smtClean="0"/>
+              <a:rPr lang="en-GB" sz="1200" dirty="0" smtClean="0"/>
               <a:t>(</a:t>
             </a:r>
             <a:r>
-              <a:rPr lang="en-GB" sz="800" dirty="0"/>
+              <a:rPr lang="en-GB" sz="1200" dirty="0"/>
               <a:t>e.g. 20) </a:t>
             </a:r>
             <a:r>
-              <a:rPr lang="en-GB" sz="800" dirty="0" smtClean="0"/>
+              <a:rPr lang="en-GB" sz="1200" dirty="0" smtClean="0"/>
               <a:t>identifiable reference </a:t>
             </a:r>
             <a:r>
-              <a:rPr lang="en-GB" sz="800" dirty="0"/>
+              <a:rPr lang="en-GB" sz="1200" dirty="0"/>
               <a:t>areas of the Moon </a:t>
             </a:r>
             <a:r>
-              <a:rPr lang="en-GB" sz="800" dirty="0" smtClean="0"/>
+              <a:rPr lang="en-GB" sz="1200" dirty="0" smtClean="0"/>
               <a:t>(</a:t>
             </a:r>
             <a:r>
-              <a:rPr lang="en-GB" sz="800" dirty="0"/>
+              <a:rPr lang="en-GB" sz="1200" dirty="0"/>
               <a:t>highland and/or </a:t>
             </a:r>
             <a:r>
-              <a:rPr lang="en-GB" sz="800" dirty="0" smtClean="0"/>
+              <a:rPr lang="en-GB" sz="1200" dirty="0" smtClean="0"/>
               <a:t>mare</a:t>
             </a:r>
             <a:r>
-              <a:rPr lang="en-GB" sz="800" dirty="0"/>
+              <a:rPr lang="en-GB" sz="1200" dirty="0"/>
               <a:t>) to calibrate measured </a:t>
             </a:r>
             <a:r>
-              <a:rPr lang="en-GB" sz="800" dirty="0" smtClean="0"/>
+              <a:rPr lang="en-GB" sz="1200" dirty="0" smtClean="0"/>
               <a:t>brightness </a:t>
             </a:r>
             <a:r>
-              <a:rPr lang="en-GB" sz="800" dirty="0"/>
+              <a:rPr lang="en-GB" sz="1200" dirty="0"/>
               <a:t>values in the CCD camera </a:t>
             </a:r>
             <a:r>
-              <a:rPr lang="en-GB" sz="800" dirty="0" err="1" smtClean="0"/>
-              <a:t>wrta</a:t>
-            </a:r>
-            <a:r>
-              <a:rPr lang="en-GB" sz="800" dirty="0" smtClean="0"/>
-              <a:t> </a:t>
-            </a:r>
-            <a:r>
-              <a:rPr lang="en-GB" sz="800" dirty="0"/>
+              <a:rPr lang="en-GB" sz="1200" dirty="0" err="1" smtClean="0"/>
+              <a:t>wrt</a:t>
+            </a:r>
+            <a:r>
+              <a:rPr lang="en-GB" sz="1200" dirty="0" smtClean="0"/>
+              <a:t> a </a:t>
+            </a:r>
+            <a:r>
+              <a:rPr lang="en-GB" sz="1200" dirty="0"/>
               <a:t>standard lunar </a:t>
             </a:r>
             <a:r>
-              <a:rPr lang="en-GB" sz="800" dirty="0" err="1" smtClean="0"/>
+              <a:rPr lang="en-GB" sz="1200" dirty="0" err="1" smtClean="0"/>
               <a:t>pectrum</a:t>
             </a:r>
             <a:r>
-              <a:rPr lang="en-GB" sz="800" dirty="0" smtClean="0"/>
+              <a:rPr lang="en-GB" sz="1200" dirty="0" smtClean="0"/>
               <a:t>(find </a:t>
             </a:r>
             <a:r>
-              <a:rPr lang="en-GB" sz="800" dirty="0"/>
+              <a:rPr lang="en-GB" sz="1200" dirty="0"/>
               <a:t>this </a:t>
             </a:r>
             <a:r>
-              <a:rPr lang="en-GB" sz="800" dirty="0" smtClean="0"/>
-              <a:t>on-line). (3)select </a:t>
-            </a:r>
-            <a:r>
-              <a:rPr lang="en-GB" sz="800" dirty="0"/>
+              <a:rPr lang="en-GB" sz="1200" dirty="0" smtClean="0"/>
+              <a:t>on-line). </a:t>
+            </a:r>
+          </a:p>
+          <a:p>
+            <a:r>
+              <a:rPr lang="en-GB" sz="1200" dirty="0" smtClean="0"/>
+              <a:t>(3)select </a:t>
+            </a:r>
+            <a:r>
+              <a:rPr lang="en-GB" sz="1200" dirty="0"/>
               <a:t>and measure some target areas that you want to measure the spectrum of </a:t>
             </a:r>
             <a:r>
-              <a:rPr lang="en-GB" sz="800" dirty="0" err="1"/>
+              <a:rPr lang="en-GB" sz="1200" dirty="0" err="1"/>
               <a:t>wrt</a:t>
             </a:r>
             <a:r>
-              <a:rPr lang="en-GB" sz="800" dirty="0"/>
+              <a:rPr lang="en-GB" sz="1200" dirty="0"/>
               <a:t> the </a:t>
             </a:r>
             <a:r>
-              <a:rPr lang="en-GB" sz="800" dirty="0" smtClean="0"/>
+              <a:rPr lang="en-GB" sz="1200" dirty="0" smtClean="0"/>
               <a:t>previously </a:t>
             </a:r>
             <a:r>
-              <a:rPr lang="en-GB" sz="800" dirty="0"/>
+              <a:rPr lang="en-GB" sz="1200" dirty="0"/>
               <a:t>derived </a:t>
             </a:r>
             <a:r>
-              <a:rPr lang="en-GB" sz="800" dirty="0" smtClean="0"/>
+              <a:rPr lang="en-GB" sz="1200" dirty="0" smtClean="0"/>
               <a:t>standard </a:t>
             </a:r>
             <a:r>
-              <a:rPr lang="en-GB" sz="800" dirty="0"/>
+              <a:rPr lang="en-GB" sz="1200" dirty="0"/>
               <a:t>lunar spectra. </a:t>
             </a:r>
-            <a:r>
-              <a:rPr lang="en-GB" sz="800" dirty="0" smtClean="0"/>
+            <a:endParaRPr lang="en-GB" sz="1200" dirty="0" smtClean="0"/>
+          </a:p>
+          <a:p>
+            <a:r>
+              <a:rPr lang="en-GB" sz="1200" dirty="0" smtClean="0"/>
               <a:t>(4)Analyse </a:t>
             </a:r>
             <a:r>
-              <a:rPr lang="en-GB" sz="800" dirty="0"/>
+              <a:rPr lang="en-GB" sz="1200" dirty="0"/>
               <a:t>the spectra from (3) to </a:t>
             </a:r>
             <a:r>
-              <a:rPr lang="en-GB" sz="800" dirty="0" smtClean="0"/>
+              <a:rPr lang="en-GB" sz="1200" dirty="0" smtClean="0"/>
               <a:t>determine –can you </a:t>
             </a:r>
             <a:r>
-              <a:rPr lang="en-GB" sz="800" dirty="0"/>
+              <a:rPr lang="en-GB" sz="1200" dirty="0"/>
               <a:t>see any mineral absorption </a:t>
             </a:r>
             <a:r>
-              <a:rPr lang="en-GB" sz="800" dirty="0" smtClean="0"/>
+              <a:rPr lang="en-GB" sz="1200" dirty="0" smtClean="0"/>
               <a:t>ands –what </a:t>
             </a:r>
             <a:r>
-              <a:rPr lang="en-GB" sz="800" dirty="0"/>
+              <a:rPr lang="en-GB" sz="1200" dirty="0"/>
               <a:t>might these </a:t>
             </a:r>
             <a:r>
-              <a:rPr lang="en-GB" sz="800" dirty="0" err="1" smtClean="0"/>
-              <a:t>be?What</a:t>
-            </a:r>
-            <a:r>
-              <a:rPr lang="en-GB" sz="800" dirty="0" smtClean="0"/>
-              <a:t> is/</a:t>
-            </a:r>
-            <a:r>
-              <a:rPr lang="en-GB" sz="800" dirty="0" err="1" smtClean="0"/>
-              <a:t>arethe</a:t>
-            </a:r>
-            <a:r>
-              <a:rPr lang="en-GB" sz="800" dirty="0" smtClean="0"/>
-              <a:t> </a:t>
-            </a:r>
-            <a:r>
-              <a:rPr lang="en-GB" sz="800" dirty="0"/>
+              <a:rPr lang="en-GB" sz="1200" dirty="0" smtClean="0"/>
+              <a:t>be? What is/are the </a:t>
+            </a:r>
+            <a:r>
+              <a:rPr lang="en-GB" sz="1200" dirty="0"/>
               <a:t>most colourful </a:t>
             </a:r>
             <a:r>
-              <a:rPr lang="en-GB" sz="800" dirty="0" smtClean="0"/>
+              <a:rPr lang="en-GB" sz="1200" dirty="0" smtClean="0"/>
               <a:t>area(s)f </a:t>
             </a:r>
             <a:r>
-              <a:rPr lang="en-GB" sz="800" dirty="0"/>
+              <a:rPr lang="en-GB" sz="1200" dirty="0"/>
               <a:t>the Moon? </a:t>
             </a:r>
-            <a:r>
-              <a:rPr lang="en-GB" sz="800" dirty="0" smtClean="0"/>
+            <a:endParaRPr lang="en-GB" sz="1200" dirty="0" smtClean="0"/>
+          </a:p>
+          <a:p>
+            <a:r>
+              <a:rPr lang="en-GB" sz="1200" dirty="0" smtClean="0"/>
               <a:t>(5)How </a:t>
             </a:r>
             <a:r>
-              <a:rPr lang="en-GB" sz="800" dirty="0"/>
+              <a:rPr lang="en-GB" sz="1200" dirty="0"/>
               <a:t>accurately can you measure absorption bands in the spectra of </a:t>
             </a:r>
             <a:r>
-              <a:rPr lang="en-GB" sz="800" dirty="0" smtClean="0"/>
+              <a:rPr lang="en-GB" sz="1200" dirty="0" smtClean="0"/>
               <a:t>lunar </a:t>
             </a:r>
             <a:r>
-              <a:rPr lang="en-GB" sz="800" dirty="0"/>
+              <a:rPr lang="en-GB" sz="1200" dirty="0"/>
               <a:t>surface features you are </a:t>
             </a:r>
             <a:r>
-              <a:rPr lang="en-GB" sz="800" dirty="0" smtClean="0"/>
+              <a:rPr lang="en-GB" sz="1200" dirty="0" smtClean="0"/>
               <a:t>studying(use </a:t>
             </a:r>
             <a:r>
-              <a:rPr lang="en-GB" sz="800" dirty="0"/>
+              <a:rPr lang="en-GB" sz="1200" dirty="0"/>
               <a:t>propagation of errors</a:t>
             </a:r>
             <a:r>
-              <a:rPr lang="en-GB" sz="800" dirty="0" smtClean="0"/>
-              <a:t>)? (6)Investigate </a:t>
-            </a:r>
-            <a:r>
-              <a:rPr lang="en-GB" sz="800" dirty="0"/>
+              <a:rPr lang="en-GB" sz="1200" dirty="0" smtClean="0"/>
+              <a:t>)? </a:t>
+            </a:r>
+          </a:p>
+          <a:p>
+            <a:r>
+              <a:rPr lang="en-GB" sz="1200" dirty="0" smtClean="0"/>
+              <a:t>(6)Investigate </a:t>
+            </a:r>
+            <a:r>
+              <a:rPr lang="en-GB" sz="1200" dirty="0"/>
               <a:t>whether </a:t>
             </a:r>
             <a:r>
-              <a:rPr lang="en-GB" sz="800" dirty="0" smtClean="0"/>
+              <a:rPr lang="en-GB" sz="1200" dirty="0" smtClean="0"/>
+              <a:t>the telescope </a:t>
+            </a:r>
+            <a:r>
+              <a:rPr lang="en-GB" sz="1200" dirty="0"/>
+              <a:t>optics suffer from </a:t>
+            </a:r>
+            <a:r>
+              <a:rPr lang="en-GB" sz="1200" dirty="0" err="1" smtClean="0"/>
+              <a:t>vignetting</a:t>
+            </a:r>
+            <a:r>
+              <a:rPr lang="en-GB" sz="1200" dirty="0" smtClean="0"/>
+              <a:t>, or </a:t>
+            </a:r>
+            <a:r>
+              <a:rPr lang="en-GB" sz="1200" dirty="0"/>
+              <a:t>other </a:t>
+            </a:r>
+            <a:r>
+              <a:rPr lang="en-GB" sz="1200" dirty="0" smtClean="0"/>
+              <a:t>non-linear </a:t>
+            </a:r>
+            <a:r>
+              <a:rPr lang="en-GB" sz="1200" dirty="0"/>
+              <a:t>sensitivity </a:t>
+            </a:r>
+            <a:r>
+              <a:rPr lang="en-GB" sz="1200" dirty="0" smtClean="0"/>
+              <a:t>effects, across the image</a:t>
+            </a:r>
+            <a:r>
+              <a:rPr lang="en-GB" sz="1200" dirty="0"/>
+              <a:t>. </a:t>
+            </a:r>
+            <a:r>
+              <a:rPr lang="en-GB" sz="1200" dirty="0" smtClean="0"/>
+              <a:t>Can </a:t>
+            </a:r>
+            <a:r>
+              <a:rPr lang="en-GB" sz="1200" dirty="0"/>
+              <a:t>you calibrate out/mitigate this effect if present? </a:t>
+            </a:r>
+            <a:endParaRPr lang="en-GB" sz="1200" dirty="0" smtClean="0"/>
+          </a:p>
+          <a:p>
+            <a:r>
+              <a:rPr lang="en-GB" sz="1200" dirty="0" smtClean="0"/>
+              <a:t>(7)Experiment </a:t>
+            </a:r>
+            <a:r>
+              <a:rPr lang="en-GB" sz="1200" dirty="0"/>
+              <a:t>with producing </a:t>
+            </a:r>
+            <a:r>
+              <a:rPr lang="en-GB" sz="1200" dirty="0" smtClean="0"/>
+              <a:t>meaningful co-registered </a:t>
+            </a:r>
+            <a:r>
+              <a:rPr lang="en-GB" sz="1200" dirty="0"/>
+              <a:t>colour ratio images of the lunar surface </a:t>
+            </a:r>
+            <a:r>
+              <a:rPr lang="en-GB" sz="1200" dirty="0" smtClean="0"/>
+              <a:t>o </a:t>
+            </a:r>
+            <a:r>
+              <a:rPr lang="en-GB" sz="1200" dirty="0"/>
+              <a:t>highlight </a:t>
+            </a:r>
+            <a:r>
+              <a:rPr lang="en-GB" sz="1200" dirty="0" smtClean="0"/>
+              <a:t>surface composition </a:t>
+            </a:r>
+            <a:r>
+              <a:rPr lang="en-GB" sz="1200" dirty="0"/>
+              <a:t>differences. </a:t>
+            </a:r>
+            <a:endParaRPr lang="en-GB" sz="1200" dirty="0" smtClean="0"/>
+          </a:p>
+          <a:p>
+            <a:r>
+              <a:rPr lang="en-GB" sz="1200" dirty="0" smtClean="0"/>
+              <a:t>(8)Repeat </a:t>
+            </a:r>
+            <a:r>
+              <a:rPr lang="en-GB" sz="1200" dirty="0"/>
+              <a:t>your spectra measurements at </a:t>
+            </a:r>
+            <a:r>
+              <a:rPr lang="en-GB" sz="1200"/>
+              <a:t>other </a:t>
+            </a:r>
+            <a:r>
+              <a:rPr lang="en-GB" sz="1200" smtClean="0"/>
+              <a:t>lunar phases </a:t>
+            </a:r>
+            <a:r>
+              <a:rPr lang="en-GB" sz="1200" dirty="0"/>
+              <a:t>to see if </a:t>
+            </a:r>
+            <a:r>
+              <a:rPr lang="en-GB" sz="1200" dirty="0" smtClean="0"/>
               <a:t>the </a:t>
             </a:r>
             <a:r>
-              <a:rPr lang="en-GB" sz="800" dirty="0" err="1" smtClean="0"/>
-              <a:t>elescope</a:t>
-            </a:r>
-            <a:r>
-              <a:rPr lang="en-GB" sz="800" dirty="0" smtClean="0"/>
-              <a:t> </a:t>
-            </a:r>
-            <a:r>
-              <a:rPr lang="en-GB" sz="800" dirty="0"/>
-              <a:t>optics suffer from </a:t>
-            </a:r>
-            <a:r>
-              <a:rPr lang="en-GB" sz="800" dirty="0" err="1" smtClean="0"/>
-              <a:t>vignetting,or</a:t>
-            </a:r>
-            <a:r>
-              <a:rPr lang="en-GB" sz="800" dirty="0" smtClean="0"/>
-              <a:t> </a:t>
-            </a:r>
-            <a:r>
-              <a:rPr lang="en-GB" sz="800" dirty="0"/>
-              <a:t>other </a:t>
-            </a:r>
-            <a:r>
-              <a:rPr lang="en-GB" sz="800" dirty="0" smtClean="0"/>
-              <a:t>non-linear </a:t>
-            </a:r>
-            <a:r>
-              <a:rPr lang="en-GB" sz="800" dirty="0"/>
-              <a:t>sensitivity </a:t>
-            </a:r>
-            <a:r>
-              <a:rPr lang="en-GB" sz="800" dirty="0" err="1" smtClean="0"/>
-              <a:t>effects,across</a:t>
-            </a:r>
-            <a:r>
-              <a:rPr lang="en-GB" sz="800" dirty="0" smtClean="0"/>
-              <a:t> </a:t>
-            </a:r>
-            <a:r>
-              <a:rPr lang="en-GB" sz="800" dirty="0" err="1" smtClean="0"/>
-              <a:t>theimage</a:t>
-            </a:r>
-            <a:r>
-              <a:rPr lang="en-GB" sz="800" dirty="0"/>
-              <a:t>. </a:t>
-            </a:r>
-            <a:r>
-              <a:rPr lang="en-GB" sz="800" dirty="0" smtClean="0"/>
-              <a:t>Can </a:t>
-            </a:r>
-            <a:r>
-              <a:rPr lang="en-GB" sz="800" dirty="0"/>
-              <a:t>you calibrate out/mitigate this effect if present? </a:t>
-            </a:r>
-            <a:r>
-              <a:rPr lang="en-GB" sz="800" dirty="0" smtClean="0"/>
-              <a:t>(7)Experiment </a:t>
-            </a:r>
-            <a:r>
-              <a:rPr lang="en-GB" sz="800" dirty="0"/>
-              <a:t>with producing </a:t>
-            </a:r>
-            <a:r>
-              <a:rPr lang="en-GB" sz="800" dirty="0" smtClean="0"/>
-              <a:t>meaningful co-registered </a:t>
-            </a:r>
-            <a:r>
-              <a:rPr lang="en-GB" sz="800" dirty="0"/>
-              <a:t>colour ratio images of the lunar surface </a:t>
-            </a:r>
-            <a:r>
-              <a:rPr lang="en-GB" sz="800" dirty="0" smtClean="0"/>
-              <a:t>o </a:t>
-            </a:r>
-            <a:r>
-              <a:rPr lang="en-GB" sz="800" dirty="0"/>
-              <a:t>highlight </a:t>
-            </a:r>
-            <a:r>
-              <a:rPr lang="en-GB" sz="800" dirty="0" smtClean="0"/>
-              <a:t>surface composition </a:t>
-            </a:r>
-            <a:r>
-              <a:rPr lang="en-GB" sz="800" dirty="0"/>
-              <a:t>differences. </a:t>
-            </a:r>
-            <a:r>
-              <a:rPr lang="en-GB" sz="800" dirty="0" smtClean="0"/>
-              <a:t>(8)Repeat </a:t>
-            </a:r>
-            <a:r>
-              <a:rPr lang="en-GB" sz="800" dirty="0"/>
-              <a:t>your spectra measurements at other </a:t>
-            </a:r>
-            <a:r>
-              <a:rPr lang="en-GB" sz="800" dirty="0" err="1" smtClean="0"/>
-              <a:t>lunarphases</a:t>
-            </a:r>
-            <a:r>
-              <a:rPr lang="en-GB" sz="800" dirty="0" smtClean="0"/>
-              <a:t> </a:t>
-            </a:r>
-            <a:r>
-              <a:rPr lang="en-GB" sz="800" dirty="0"/>
-              <a:t>to see if </a:t>
-            </a:r>
-            <a:r>
-              <a:rPr lang="en-GB" sz="800" dirty="0" smtClean="0"/>
-              <a:t>the </a:t>
-            </a:r>
-            <a:r>
-              <a:rPr lang="en-GB" sz="800" dirty="0"/>
+              <a:rPr lang="en-GB" sz="1200" dirty="0"/>
               <a:t>surface changes colour at different </a:t>
             </a:r>
             <a:r>
-              <a:rPr lang="en-GB" sz="800" dirty="0" smtClean="0"/>
+              <a:rPr lang="en-GB" sz="1200" dirty="0" smtClean="0"/>
               <a:t>illumination </a:t>
             </a:r>
             <a:r>
-              <a:rPr lang="en-GB" sz="800" dirty="0"/>
+              <a:rPr lang="en-GB" sz="1200" dirty="0"/>
               <a:t>and viewing angles?</a:t>
             </a:r>
           </a:p>

</xml_diff>

<commit_message>
edit graphs to %
</commit_message>
<xml_diff>
--- a/Spectra.of.the.Moon.using.a.Robotic.Telescope.pptx
+++ b/Spectra.of.the.Moon.using.a.Robotic.Telescope.pptx
@@ -136,10 +136,10 @@
           <c:layoutTarget val="inner"/>
           <c:xMode val="edge"/>
           <c:yMode val="edge"/>
-          <c:x val="7.4467766775246413E-2"/>
-          <c:y val="1.8870023950920699E-2"/>
-          <c:w val="0.77972393278292906"/>
-          <c:h val="0.90600689782041099"/>
+          <c:x val="3.99508932351198E-2"/>
+          <c:y val="1.1317559185698803E-2"/>
+          <c:w val="0.82631499691570798"/>
+          <c:h val="0.92288413232355515"/>
         </c:manualLayout>
       </c:layout>
       <c:scatterChart>
@@ -150,7 +150,7 @@
           <c:order val="0"/>
           <c:tx>
             <c:strRef>
-              <c:f>Sheet1!$G$18</c:f>
+              <c:f>Sheet1!$N$18</c:f>
               <c:strCache>
                 <c:ptCount val="1"/>
                 <c:pt idx="0">
@@ -172,7 +172,7 @@
           </c:marker>
           <c:xVal>
             <c:numRef>
-              <c:f>Sheet1!$B$19:$B$27</c:f>
+              <c:f>Sheet1!$C$19:$C$27</c:f>
               <c:numCache>
                 <c:formatCode>General</c:formatCode>
                 <c:ptCount val="9"/>
@@ -208,36 +208,36 @@
           </c:xVal>
           <c:yVal>
             <c:numRef>
-              <c:f>Sheet1!$G$19:$G$27</c:f>
+              <c:f>Sheet1!$N$19:$N$27</c:f>
               <c:numCache>
                 <c:formatCode>General</c:formatCode>
                 <c:ptCount val="9"/>
                 <c:pt idx="0">
-                  <c:v>240</c:v>
+                  <c:v>12</c:v>
                 </c:pt>
                 <c:pt idx="1">
-                  <c:v>278</c:v>
+                  <c:v>13.900000000000002</c:v>
                 </c:pt>
                 <c:pt idx="2">
-                  <c:v>258</c:v>
+                  <c:v>12.9</c:v>
                 </c:pt>
                 <c:pt idx="3">
-                  <c:v>259</c:v>
+                  <c:v>12.950000000000001</c:v>
                 </c:pt>
                 <c:pt idx="4">
-                  <c:v>250</c:v>
+                  <c:v>12.5</c:v>
                 </c:pt>
                 <c:pt idx="5">
-                  <c:v>280</c:v>
+                  <c:v>14.000000000000002</c:v>
                 </c:pt>
                 <c:pt idx="6">
-                  <c:v>300</c:v>
+                  <c:v>15</c:v>
                 </c:pt>
                 <c:pt idx="7">
-                  <c:v>280</c:v>
+                  <c:v>14.000000000000002</c:v>
                 </c:pt>
                 <c:pt idx="8">
-                  <c:v>215</c:v>
+                  <c:v>10.75</c:v>
                 </c:pt>
               </c:numCache>
             </c:numRef>
@@ -249,7 +249,7 @@
           <c:order val="1"/>
           <c:tx>
             <c:strRef>
-              <c:f>Sheet1!$M$18</c:f>
+              <c:f>Sheet1!$Z$18</c:f>
               <c:strCache>
                 <c:ptCount val="1"/>
                 <c:pt idx="0">
@@ -279,7 +279,7 @@
           </c:marker>
           <c:xVal>
             <c:numRef>
-              <c:f>Sheet1!$B$19:$B$27</c:f>
+              <c:f>Sheet1!$C$19:$C$27</c:f>
               <c:numCache>
                 <c:formatCode>General</c:formatCode>
                 <c:ptCount val="9"/>
@@ -315,36 +315,36 @@
           </c:xVal>
           <c:yVal>
             <c:numRef>
-              <c:f>Sheet1!$M$19:$M$27</c:f>
+              <c:f>Sheet1!$Z$19:$Z$27</c:f>
               <c:numCache>
                 <c:formatCode>General</c:formatCode>
                 <c:ptCount val="9"/>
                 <c:pt idx="0">
-                  <c:v>260</c:v>
+                  <c:v>13</c:v>
                 </c:pt>
                 <c:pt idx="1">
-                  <c:v>145</c:v>
+                  <c:v>7.2499999999999991</c:v>
                 </c:pt>
                 <c:pt idx="2">
-                  <c:v>138</c:v>
+                  <c:v>6.9</c:v>
                 </c:pt>
                 <c:pt idx="3">
-                  <c:v>130</c:v>
+                  <c:v>6.5</c:v>
                 </c:pt>
                 <c:pt idx="4">
-                  <c:v>128</c:v>
+                  <c:v>6.4</c:v>
                 </c:pt>
                 <c:pt idx="5">
-                  <c:v>213</c:v>
+                  <c:v>10.65</c:v>
                 </c:pt>
                 <c:pt idx="6">
-                  <c:v>209</c:v>
+                  <c:v>10.45</c:v>
                 </c:pt>
                 <c:pt idx="7">
-                  <c:v>524</c:v>
+                  <c:v>26.200000000000003</c:v>
                 </c:pt>
                 <c:pt idx="8">
-                  <c:v>354</c:v>
+                  <c:v>17.7</c:v>
                 </c:pt>
               </c:numCache>
             </c:numRef>
@@ -356,7 +356,7 @@
           <c:order val="2"/>
           <c:tx>
             <c:strRef>
-              <c:f>Sheet1!$L$18</c:f>
+              <c:f>Sheet1!$X$18</c:f>
               <c:strCache>
                 <c:ptCount val="1"/>
                 <c:pt idx="0">
@@ -386,7 +386,7 @@
           </c:marker>
           <c:xVal>
             <c:numRef>
-              <c:f>Sheet1!$B$19:$B$27</c:f>
+              <c:f>Sheet1!$C$19:$C$27</c:f>
               <c:numCache>
                 <c:formatCode>General</c:formatCode>
                 <c:ptCount val="9"/>
@@ -422,36 +422,36 @@
           </c:xVal>
           <c:yVal>
             <c:numRef>
-              <c:f>Sheet1!$L$19:$L$27</c:f>
+              <c:f>Sheet1!$X$19:$X$27</c:f>
               <c:numCache>
                 <c:formatCode>General</c:formatCode>
                 <c:ptCount val="9"/>
                 <c:pt idx="0">
-                  <c:v>163</c:v>
+                  <c:v>8.15</c:v>
                 </c:pt>
                 <c:pt idx="1">
-                  <c:v>252</c:v>
+                  <c:v>12.6</c:v>
                 </c:pt>
                 <c:pt idx="2">
-                  <c:v>165</c:v>
+                  <c:v>8.25</c:v>
                 </c:pt>
                 <c:pt idx="3">
-                  <c:v>137</c:v>
+                  <c:v>6.8500000000000005</c:v>
                 </c:pt>
                 <c:pt idx="4">
-                  <c:v>133</c:v>
+                  <c:v>6.65</c:v>
                 </c:pt>
                 <c:pt idx="5">
-                  <c:v>181</c:v>
+                  <c:v>9.0499999999999989</c:v>
                 </c:pt>
                 <c:pt idx="6">
-                  <c:v>189</c:v>
+                  <c:v>9.4499999999999993</c:v>
                 </c:pt>
                 <c:pt idx="7">
-                  <c:v>369</c:v>
+                  <c:v>18.45</c:v>
                 </c:pt>
                 <c:pt idx="8">
-                  <c:v>256</c:v>
+                  <c:v>12.8</c:v>
                 </c:pt>
               </c:numCache>
             </c:numRef>
@@ -463,7 +463,7 @@
           <c:order val="3"/>
           <c:tx>
             <c:strRef>
-              <c:f>Sheet1!$C$18</c:f>
+              <c:f>Sheet1!$E$18</c:f>
               <c:strCache>
                 <c:ptCount val="1"/>
                 <c:pt idx="0">
@@ -494,7 +494,7 @@
           </c:marker>
           <c:xVal>
             <c:numRef>
-              <c:f>Sheet1!$B$19:$B$27</c:f>
+              <c:f>Sheet1!$C$19:$C$27</c:f>
               <c:numCache>
                 <c:formatCode>General</c:formatCode>
                 <c:ptCount val="9"/>
@@ -530,36 +530,36 @@
           </c:xVal>
           <c:yVal>
             <c:numRef>
-              <c:f>Sheet1!$C$19:$C$27</c:f>
+              <c:f>Sheet1!$E$19:$E$27</c:f>
               <c:numCache>
                 <c:formatCode>General</c:formatCode>
                 <c:ptCount val="9"/>
                 <c:pt idx="0">
-                  <c:v>151</c:v>
+                  <c:v>7.55</c:v>
                 </c:pt>
                 <c:pt idx="1">
-                  <c:v>280</c:v>
+                  <c:v>14.000000000000002</c:v>
                 </c:pt>
                 <c:pt idx="2">
-                  <c:v>211</c:v>
+                  <c:v>10.549999999999999</c:v>
                 </c:pt>
                 <c:pt idx="3">
-                  <c:v>165</c:v>
+                  <c:v>8.25</c:v>
                 </c:pt>
                 <c:pt idx="4">
-                  <c:v>123</c:v>
+                  <c:v>6.15</c:v>
                 </c:pt>
                 <c:pt idx="5">
-                  <c:v>249</c:v>
+                  <c:v>12.45</c:v>
                 </c:pt>
                 <c:pt idx="6">
-                  <c:v>412</c:v>
+                  <c:v>20.599999999999998</c:v>
                 </c:pt>
                 <c:pt idx="7">
-                  <c:v>615</c:v>
+                  <c:v>30.75</c:v>
                 </c:pt>
                 <c:pt idx="8">
-                  <c:v>405</c:v>
+                  <c:v>20.25</c:v>
                 </c:pt>
               </c:numCache>
             </c:numRef>
@@ -571,7 +571,7 @@
           <c:order val="4"/>
           <c:tx>
             <c:strRef>
-              <c:f>Sheet1!$N$18</c:f>
+              <c:f>Sheet1!$AB$18</c:f>
               <c:strCache>
                 <c:ptCount val="1"/>
                 <c:pt idx="0">
@@ -601,7 +601,7 @@
           </c:marker>
           <c:xVal>
             <c:numRef>
-              <c:f>Sheet1!$B$19:$B$27</c:f>
+              <c:f>Sheet1!$C$19:$C$27</c:f>
               <c:numCache>
                 <c:formatCode>General</c:formatCode>
                 <c:ptCount val="9"/>
@@ -637,36 +637,36 @@
           </c:xVal>
           <c:yVal>
             <c:numRef>
-              <c:f>Sheet1!$N$19:$N$27</c:f>
+              <c:f>Sheet1!$AB$19:$AB$27</c:f>
               <c:numCache>
                 <c:formatCode>General</c:formatCode>
                 <c:ptCount val="9"/>
                 <c:pt idx="0">
-                  <c:v>355</c:v>
+                  <c:v>17.75</c:v>
                 </c:pt>
                 <c:pt idx="1">
-                  <c:v>690</c:v>
+                  <c:v>34.5</c:v>
                 </c:pt>
                 <c:pt idx="2">
-                  <c:v>463</c:v>
+                  <c:v>23.150000000000002</c:v>
                 </c:pt>
                 <c:pt idx="3">
-                  <c:v>385</c:v>
+                  <c:v>19.25</c:v>
                 </c:pt>
                 <c:pt idx="4">
-                  <c:v>367</c:v>
+                  <c:v>18.350000000000001</c:v>
                 </c:pt>
                 <c:pt idx="5">
-                  <c:v>510</c:v>
+                  <c:v>25.5</c:v>
                 </c:pt>
                 <c:pt idx="6">
-                  <c:v>634</c:v>
+                  <c:v>31.7</c:v>
                 </c:pt>
                 <c:pt idx="7">
-                  <c:v>900</c:v>
+                  <c:v>45</c:v>
                 </c:pt>
                 <c:pt idx="8">
-                  <c:v>577</c:v>
+                  <c:v>28.849999999999998</c:v>
                 </c:pt>
               </c:numCache>
             </c:numRef>
@@ -678,7 +678,7 @@
           <c:order val="5"/>
           <c:tx>
             <c:strRef>
-              <c:f>Sheet1!$Q$18</c:f>
+              <c:f>Sheet1!$AH$18</c:f>
               <c:strCache>
                 <c:ptCount val="1"/>
                 <c:pt idx="0">
@@ -708,7 +708,7 @@
           </c:marker>
           <c:xVal>
             <c:numRef>
-              <c:f>Sheet1!$B$19:$B$27</c:f>
+              <c:f>Sheet1!$C$19:$C$27</c:f>
               <c:numCache>
                 <c:formatCode>General</c:formatCode>
                 <c:ptCount val="9"/>
@@ -744,36 +744,36 @@
           </c:xVal>
           <c:yVal>
             <c:numRef>
-              <c:f>Sheet1!$Q$19:$Q$27</c:f>
+              <c:f>Sheet1!$AH$19:$AH$27</c:f>
               <c:numCache>
                 <c:formatCode>General</c:formatCode>
                 <c:ptCount val="9"/>
                 <c:pt idx="0">
-                  <c:v>393</c:v>
+                  <c:v>19.650000000000002</c:v>
                 </c:pt>
                 <c:pt idx="1">
-                  <c:v>1221</c:v>
+                  <c:v>61.050000000000004</c:v>
                 </c:pt>
                 <c:pt idx="2">
-                  <c:v>1219</c:v>
+                  <c:v>60.95</c:v>
                 </c:pt>
                 <c:pt idx="3">
-                  <c:v>1134</c:v>
+                  <c:v>56.699999999999996</c:v>
                 </c:pt>
                 <c:pt idx="4">
-                  <c:v>1119</c:v>
+                  <c:v>55.95</c:v>
                 </c:pt>
                 <c:pt idx="5">
-                  <c:v>1250</c:v>
+                  <c:v>62.5</c:v>
                 </c:pt>
                 <c:pt idx="6">
-                  <c:v>1353</c:v>
+                  <c:v>67.650000000000006</c:v>
                 </c:pt>
                 <c:pt idx="7">
-                  <c:v>1195</c:v>
+                  <c:v>59.75</c:v>
                 </c:pt>
                 <c:pt idx="8">
-                  <c:v>692</c:v>
+                  <c:v>34.599999999999994</c:v>
                 </c:pt>
               </c:numCache>
             </c:numRef>
@@ -785,7 +785,7 @@
           <c:order val="6"/>
           <c:tx>
             <c:strRef>
-              <c:f>Sheet1!$O$18</c:f>
+              <c:f>Sheet1!$AD$18</c:f>
               <c:strCache>
                 <c:ptCount val="1"/>
                 <c:pt idx="0">
@@ -815,7 +815,7 @@
           </c:marker>
           <c:xVal>
             <c:numRef>
-              <c:f>Sheet1!$B$19:$B$27</c:f>
+              <c:f>Sheet1!$C$19:$C$27</c:f>
               <c:numCache>
                 <c:formatCode>General</c:formatCode>
                 <c:ptCount val="9"/>
@@ -851,36 +851,36 @@
           </c:xVal>
           <c:yVal>
             <c:numRef>
-              <c:f>Sheet1!$O$19:$O$27</c:f>
+              <c:f>Sheet1!$AD$19:$AD$27</c:f>
               <c:numCache>
                 <c:formatCode>General</c:formatCode>
                 <c:ptCount val="9"/>
                 <c:pt idx="0">
-                  <c:v>387</c:v>
+                  <c:v>19.350000000000001</c:v>
                 </c:pt>
                 <c:pt idx="1">
-                  <c:v>1242</c:v>
+                  <c:v>62.1</c:v>
                 </c:pt>
                 <c:pt idx="2">
-                  <c:v>1222</c:v>
+                  <c:v>61.1</c:v>
                 </c:pt>
                 <c:pt idx="3">
-                  <c:v>1104</c:v>
+                  <c:v>55.2</c:v>
                 </c:pt>
                 <c:pt idx="4">
-                  <c:v>1084</c:v>
+                  <c:v>54.2</c:v>
                 </c:pt>
                 <c:pt idx="5">
-                  <c:v>1199</c:v>
+                  <c:v>59.95</c:v>
                 </c:pt>
                 <c:pt idx="6">
-                  <c:v>1271</c:v>
+                  <c:v>63.55</c:v>
                 </c:pt>
                 <c:pt idx="7">
-                  <c:v>1050</c:v>
+                  <c:v>52.5</c:v>
                 </c:pt>
                 <c:pt idx="8">
-                  <c:v>644</c:v>
+                  <c:v>32.200000000000003</c:v>
                 </c:pt>
               </c:numCache>
             </c:numRef>
@@ -892,7 +892,7 @@
           <c:order val="7"/>
           <c:tx>
             <c:strRef>
-              <c:f>Sheet1!$P$18</c:f>
+              <c:f>Sheet1!$AF$18</c:f>
               <c:strCache>
                 <c:ptCount val="1"/>
                 <c:pt idx="0">
@@ -922,7 +922,7 @@
           </c:marker>
           <c:xVal>
             <c:numRef>
-              <c:f>Sheet1!$B$19:$B$27</c:f>
+              <c:f>Sheet1!$C$19:$C$27</c:f>
               <c:numCache>
                 <c:formatCode>General</c:formatCode>
                 <c:ptCount val="9"/>
@@ -958,36 +958,36 @@
           </c:xVal>
           <c:yVal>
             <c:numRef>
-              <c:f>Sheet1!$P$19:$P$27</c:f>
+              <c:f>Sheet1!$AF$19:$AF$27</c:f>
               <c:numCache>
                 <c:formatCode>General</c:formatCode>
                 <c:ptCount val="9"/>
                 <c:pt idx="0">
-                  <c:v>211</c:v>
+                  <c:v>10.549999999999999</c:v>
                 </c:pt>
                 <c:pt idx="1">
-                  <c:v>234</c:v>
+                  <c:v>11.700000000000001</c:v>
                 </c:pt>
                 <c:pt idx="2">
-                  <c:v>374</c:v>
+                  <c:v>18.7</c:v>
                 </c:pt>
                 <c:pt idx="3">
-                  <c:v>520</c:v>
+                  <c:v>26</c:v>
                 </c:pt>
                 <c:pt idx="4">
-                  <c:v>602</c:v>
+                  <c:v>30.099999999999998</c:v>
                 </c:pt>
                 <c:pt idx="5">
-                  <c:v>719</c:v>
+                  <c:v>35.949999999999996</c:v>
                 </c:pt>
                 <c:pt idx="6">
-                  <c:v>804</c:v>
+                  <c:v>40.200000000000003</c:v>
                 </c:pt>
                 <c:pt idx="7">
-                  <c:v>765</c:v>
+                  <c:v>38.25</c:v>
                 </c:pt>
                 <c:pt idx="8">
-                  <c:v>465</c:v>
+                  <c:v>23.25</c:v>
                 </c:pt>
               </c:numCache>
             </c:numRef>
@@ -999,7 +999,7 @@
           <c:order val="8"/>
           <c:tx>
             <c:strRef>
-              <c:f>Sheet1!$I$18</c:f>
+              <c:f>Sheet1!$R$18</c:f>
               <c:strCache>
                 <c:ptCount val="1"/>
                 <c:pt idx="0">
@@ -1029,7 +1029,7 @@
           </c:marker>
           <c:xVal>
             <c:numRef>
-              <c:f>Sheet1!$B$19:$B$27</c:f>
+              <c:f>Sheet1!$C$19:$C$27</c:f>
               <c:numCache>
                 <c:formatCode>General</c:formatCode>
                 <c:ptCount val="9"/>
@@ -1065,36 +1065,36 @@
           </c:xVal>
           <c:yVal>
             <c:numRef>
-              <c:f>Sheet1!$I$19:$I$27</c:f>
+              <c:f>Sheet1!$R$19:$R$27</c:f>
               <c:numCache>
                 <c:formatCode>General</c:formatCode>
                 <c:ptCount val="9"/>
                 <c:pt idx="0">
-                  <c:v>331</c:v>
+                  <c:v>16.55</c:v>
                 </c:pt>
                 <c:pt idx="1">
-                  <c:v>550</c:v>
+                  <c:v>27.500000000000004</c:v>
                 </c:pt>
                 <c:pt idx="2">
-                  <c:v>575</c:v>
+                  <c:v>28.749999999999996</c:v>
                 </c:pt>
                 <c:pt idx="3">
-                  <c:v>532</c:v>
+                  <c:v>26.6</c:v>
                 </c:pt>
                 <c:pt idx="4">
-                  <c:v>510</c:v>
+                  <c:v>25.5</c:v>
                 </c:pt>
                 <c:pt idx="5">
-                  <c:v>608</c:v>
+                  <c:v>30.4</c:v>
                 </c:pt>
                 <c:pt idx="6">
-                  <c:v>72</c:v>
+                  <c:v>3.5999999999999996</c:v>
                 </c:pt>
                 <c:pt idx="7">
-                  <c:v>623</c:v>
+                  <c:v>31.15</c:v>
                 </c:pt>
                 <c:pt idx="8">
-                  <c:v>395</c:v>
+                  <c:v>19.75</c:v>
                 </c:pt>
               </c:numCache>
             </c:numRef>
@@ -1106,7 +1106,7 @@
           <c:order val="9"/>
           <c:tx>
             <c:strRef>
-              <c:f>Sheet1!$J$18</c:f>
+              <c:f>Sheet1!$T$18</c:f>
               <c:strCache>
                 <c:ptCount val="1"/>
                 <c:pt idx="0">
@@ -1136,7 +1136,7 @@
           </c:marker>
           <c:xVal>
             <c:numRef>
-              <c:f>Sheet1!$B$19:$B$27</c:f>
+              <c:f>Sheet1!$C$19:$C$27</c:f>
               <c:numCache>
                 <c:formatCode>General</c:formatCode>
                 <c:ptCount val="9"/>
@@ -1172,36 +1172,36 @@
           </c:xVal>
           <c:yVal>
             <c:numRef>
-              <c:f>Sheet1!$J$19:$J$27</c:f>
+              <c:f>Sheet1!$T$19:$T$27</c:f>
               <c:numCache>
                 <c:formatCode>General</c:formatCode>
                 <c:ptCount val="9"/>
                 <c:pt idx="0">
-                  <c:v>198</c:v>
+                  <c:v>9.9</c:v>
                 </c:pt>
                 <c:pt idx="1">
-                  <c:v>252</c:v>
+                  <c:v>12.6</c:v>
                 </c:pt>
                 <c:pt idx="2">
-                  <c:v>230</c:v>
+                  <c:v>11.5</c:v>
                 </c:pt>
                 <c:pt idx="3">
-                  <c:v>147</c:v>
+                  <c:v>7.35</c:v>
                 </c:pt>
                 <c:pt idx="4">
-                  <c:v>227</c:v>
+                  <c:v>11.35</c:v>
                 </c:pt>
                 <c:pt idx="5">
-                  <c:v>253</c:v>
+                  <c:v>12.65</c:v>
                 </c:pt>
                 <c:pt idx="6">
-                  <c:v>247</c:v>
+                  <c:v>12.35</c:v>
                 </c:pt>
                 <c:pt idx="7">
-                  <c:v>190</c:v>
+                  <c:v>9.5</c:v>
                 </c:pt>
                 <c:pt idx="8">
-                  <c:v>140</c:v>
+                  <c:v>7.0000000000000009</c:v>
                 </c:pt>
               </c:numCache>
             </c:numRef>
@@ -1213,7 +1213,7 @@
           <c:order val="10"/>
           <c:tx>
             <c:strRef>
-              <c:f>Sheet1!$D$18</c:f>
+              <c:f>Sheet1!$G$18</c:f>
               <c:strCache>
                 <c:ptCount val="1"/>
                 <c:pt idx="0">
@@ -1243,7 +1243,7 @@
           </c:marker>
           <c:xVal>
             <c:numRef>
-              <c:f>Sheet1!$B$19:$B$27</c:f>
+              <c:f>Sheet1!$C$19:$C$27</c:f>
               <c:numCache>
                 <c:formatCode>General</c:formatCode>
                 <c:ptCount val="9"/>
@@ -1279,36 +1279,36 @@
           </c:xVal>
           <c:yVal>
             <c:numRef>
-              <c:f>Sheet1!$D$19:$D$27</c:f>
+              <c:f>Sheet1!$G$19:$G$27</c:f>
               <c:numCache>
                 <c:formatCode>General</c:formatCode>
                 <c:ptCount val="9"/>
                 <c:pt idx="0">
-                  <c:v>266</c:v>
+                  <c:v>13.3</c:v>
                 </c:pt>
                 <c:pt idx="1">
-                  <c:v>353</c:v>
+                  <c:v>17.649999999999999</c:v>
                 </c:pt>
                 <c:pt idx="2">
-                  <c:v>321</c:v>
+                  <c:v>16.05</c:v>
                 </c:pt>
                 <c:pt idx="3">
-                  <c:v>256</c:v>
+                  <c:v>12.8</c:v>
                 </c:pt>
                 <c:pt idx="4">
-                  <c:v>225</c:v>
+                  <c:v>11.25</c:v>
                 </c:pt>
                 <c:pt idx="5">
-                  <c:v>271</c:v>
+                  <c:v>13.55</c:v>
                 </c:pt>
                 <c:pt idx="6">
-                  <c:v>279</c:v>
+                  <c:v>13.950000000000001</c:v>
                 </c:pt>
                 <c:pt idx="7">
-                  <c:v>220</c:v>
+                  <c:v>11</c:v>
                 </c:pt>
                 <c:pt idx="8">
-                  <c:v>158</c:v>
+                  <c:v>7.9</c:v>
                 </c:pt>
               </c:numCache>
             </c:numRef>
@@ -1320,7 +1320,7 @@
           <c:order val="11"/>
           <c:tx>
             <c:strRef>
-              <c:f>Sheet1!$H$18</c:f>
+              <c:f>Sheet1!$P$18</c:f>
               <c:strCache>
                 <c:ptCount val="1"/>
                 <c:pt idx="0">
@@ -1352,7 +1352,7 @@
           </c:marker>
           <c:xVal>
             <c:numRef>
-              <c:f>Sheet1!$B$19:$B$27</c:f>
+              <c:f>Sheet1!$C$19:$C$27</c:f>
               <c:numCache>
                 <c:formatCode>General</c:formatCode>
                 <c:ptCount val="9"/>
@@ -1388,36 +1388,36 @@
           </c:xVal>
           <c:yVal>
             <c:numRef>
-              <c:f>Sheet1!$H$19:$H$27</c:f>
+              <c:f>Sheet1!$P$19:$P$27</c:f>
               <c:numCache>
                 <c:formatCode>General</c:formatCode>
                 <c:ptCount val="9"/>
                 <c:pt idx="0">
-                  <c:v>1056</c:v>
+                  <c:v>52.800000000000004</c:v>
                 </c:pt>
                 <c:pt idx="1">
-                  <c:v>1125</c:v>
+                  <c:v>56.25</c:v>
                 </c:pt>
                 <c:pt idx="2">
-                  <c:v>1030</c:v>
+                  <c:v>51.5</c:v>
                 </c:pt>
                 <c:pt idx="3">
-                  <c:v>1017</c:v>
+                  <c:v>50.849999999999994</c:v>
                 </c:pt>
                 <c:pt idx="4">
-                  <c:v>983</c:v>
+                  <c:v>49.15</c:v>
                 </c:pt>
                 <c:pt idx="5">
-                  <c:v>1075</c:v>
+                  <c:v>53.75</c:v>
                 </c:pt>
                 <c:pt idx="6">
-                  <c:v>1200</c:v>
+                  <c:v>60</c:v>
                 </c:pt>
                 <c:pt idx="7">
-                  <c:v>1040</c:v>
+                  <c:v>52</c:v>
                 </c:pt>
                 <c:pt idx="8">
-                  <c:v>593</c:v>
+                  <c:v>29.65</c:v>
                 </c:pt>
               </c:numCache>
             </c:numRef>
@@ -1429,7 +1429,7 @@
           <c:order val="12"/>
           <c:tx>
             <c:strRef>
-              <c:f>Sheet1!$E$18</c:f>
+              <c:f>Sheet1!$I$18</c:f>
               <c:strCache>
                 <c:ptCount val="1"/>
                 <c:pt idx="0">
@@ -1463,7 +1463,7 @@
           </c:marker>
           <c:xVal>
             <c:numRef>
-              <c:f>Sheet1!$B$19:$B$27</c:f>
+              <c:f>Sheet1!$C$19:$C$27</c:f>
               <c:numCache>
                 <c:formatCode>General</c:formatCode>
                 <c:ptCount val="9"/>
@@ -1499,30 +1499,30 @@
           </c:xVal>
           <c:yVal>
             <c:numRef>
-              <c:f>Sheet1!$E$19:$E$27</c:f>
+              <c:f>Sheet1!$I$19:$I$27</c:f>
               <c:numCache>
                 <c:formatCode>General</c:formatCode>
                 <c:ptCount val="9"/>
                 <c:pt idx="1">
-                  <c:v>1950</c:v>
+                  <c:v>97.5</c:v>
                 </c:pt>
                 <c:pt idx="2">
-                  <c:v>816</c:v>
+                  <c:v>40.799999999999997</c:v>
                 </c:pt>
                 <c:pt idx="3">
-                  <c:v>630</c:v>
+                  <c:v>31.5</c:v>
                 </c:pt>
                 <c:pt idx="4">
-                  <c:v>711</c:v>
+                  <c:v>35.549999999999997</c:v>
                 </c:pt>
                 <c:pt idx="5">
-                  <c:v>930</c:v>
+                  <c:v>46.5</c:v>
                 </c:pt>
                 <c:pt idx="6">
-                  <c:v>1360</c:v>
+                  <c:v>68</c:v>
                 </c:pt>
                 <c:pt idx="8">
-                  <c:v>1233</c:v>
+                  <c:v>61.650000000000006</c:v>
                 </c:pt>
               </c:numCache>
             </c:numRef>
@@ -1534,7 +1534,7 @@
           <c:order val="13"/>
           <c:tx>
             <c:strRef>
-              <c:f>Sheet1!$F$18</c:f>
+              <c:f>Sheet1!$L$18</c:f>
               <c:strCache>
                 <c:ptCount val="1"/>
                 <c:pt idx="0">
@@ -1567,7 +1567,7 @@
           </c:marker>
           <c:xVal>
             <c:numRef>
-              <c:f>Sheet1!$B$19:$B$27</c:f>
+              <c:f>Sheet1!$C$19:$C$27</c:f>
               <c:numCache>
                 <c:formatCode>General</c:formatCode>
                 <c:ptCount val="9"/>
@@ -1603,24 +1603,24 @@
           </c:xVal>
           <c:yVal>
             <c:numRef>
-              <c:f>Sheet1!$F$19:$F$27</c:f>
+              <c:f>Sheet1!$L$19:$L$27</c:f>
               <c:numCache>
                 <c:formatCode>General</c:formatCode>
                 <c:ptCount val="9"/>
                 <c:pt idx="2">
-                  <c:v>1421</c:v>
+                  <c:v>71.05</c:v>
                 </c:pt>
                 <c:pt idx="3">
-                  <c:v>1695</c:v>
+                  <c:v>84.75</c:v>
                 </c:pt>
                 <c:pt idx="4">
-                  <c:v>1299</c:v>
+                  <c:v>64.95</c:v>
                 </c:pt>
                 <c:pt idx="5">
-                  <c:v>1415</c:v>
+                  <c:v>70.75</c:v>
                 </c:pt>
                 <c:pt idx="8">
-                  <c:v>1160</c:v>
+                  <c:v>57.999999999999993</c:v>
                 </c:pt>
               </c:numCache>
             </c:numRef>
@@ -1632,7 +1632,7 @@
           <c:order val="14"/>
           <c:tx>
             <c:strRef>
-              <c:f>Sheet1!$K$18</c:f>
+              <c:f>Sheet1!$V$18</c:f>
               <c:strCache>
                 <c:ptCount val="1"/>
                 <c:pt idx="0">
@@ -1662,7 +1662,7 @@
           </c:marker>
           <c:xVal>
             <c:numRef>
-              <c:f>Sheet1!$B$19:$B$27</c:f>
+              <c:f>Sheet1!$C$19:$C$27</c:f>
               <c:numCache>
                 <c:formatCode>General</c:formatCode>
                 <c:ptCount val="9"/>
@@ -1698,36 +1698,36 @@
           </c:xVal>
           <c:yVal>
             <c:numRef>
-              <c:f>Sheet1!$K$19:$K$27</c:f>
+              <c:f>Sheet1!$V$19:$V$27</c:f>
               <c:numCache>
                 <c:formatCode>General</c:formatCode>
                 <c:ptCount val="9"/>
                 <c:pt idx="0">
-                  <c:v>125</c:v>
+                  <c:v>6.25</c:v>
                 </c:pt>
                 <c:pt idx="1">
-                  <c:v>152</c:v>
+                  <c:v>7.6</c:v>
                 </c:pt>
                 <c:pt idx="2">
-                  <c:v>157</c:v>
+                  <c:v>7.85</c:v>
                 </c:pt>
                 <c:pt idx="3">
-                  <c:v>137</c:v>
+                  <c:v>6.8500000000000005</c:v>
                 </c:pt>
                 <c:pt idx="4">
-                  <c:v>141</c:v>
+                  <c:v>7.0499999999999989</c:v>
                 </c:pt>
                 <c:pt idx="5">
-                  <c:v>262</c:v>
+                  <c:v>13.100000000000001</c:v>
                 </c:pt>
                 <c:pt idx="6">
-                  <c:v>497</c:v>
+                  <c:v>24.85</c:v>
                 </c:pt>
                 <c:pt idx="7">
-                  <c:v>725</c:v>
+                  <c:v>36.25</c:v>
                 </c:pt>
                 <c:pt idx="8">
-                  <c:v>460</c:v>
+                  <c:v>23</c:v>
                 </c:pt>
               </c:numCache>
             </c:numRef>
@@ -1742,11 +1742,11 @@
           <c:showPercent val="0"/>
           <c:showBubbleSize val="0"/>
         </c:dLbls>
-        <c:axId val="200740656"/>
-        <c:axId val="200741048"/>
+        <c:axId val="10027248"/>
+        <c:axId val="10027640"/>
       </c:scatterChart>
       <c:valAx>
-        <c:axId val="200740656"/>
+        <c:axId val="10027248"/>
         <c:scaling>
           <c:orientation val="minMax"/>
           <c:max val="950"/>
@@ -1782,16 +1782,15 @@
         <c:majorTickMark val="out"/>
         <c:minorTickMark val="none"/>
         <c:tickLblPos val="nextTo"/>
-        <c:crossAx val="200741048"/>
+        <c:crossAx val="10027640"/>
         <c:crosses val="autoZero"/>
         <c:crossBetween val="midCat"/>
       </c:valAx>
       <c:valAx>
-        <c:axId val="200741048"/>
+        <c:axId val="10027640"/>
         <c:scaling>
           <c:orientation val="minMax"/>
-          <c:max val="2000"/>
-          <c:min val="0"/>
+          <c:max val="100"/>
         </c:scaling>
         <c:delete val="0"/>
         <c:axPos val="l"/>
@@ -1806,9 +1805,10 @@
                   <a:defRPr/>
                 </a:pPr>
                 <a:r>
-                  <a:rPr lang="en-GB"/>
-                  <a:t>Intensity/AU</a:t>
+                  <a:rPr lang="en-GB" dirty="0" smtClean="0"/>
+                  <a:t>Intensity/%</a:t>
                 </a:r>
+                <a:endParaRPr lang="en-GB" dirty="0"/>
               </a:p>
             </c:rich>
           </c:tx>
@@ -1819,7 +1819,7 @@
         <c:majorTickMark val="out"/>
         <c:minorTickMark val="none"/>
         <c:tickLblPos val="nextTo"/>
-        <c:crossAx val="200740656"/>
+        <c:crossAx val="10027248"/>
         <c:crosses val="autoZero"/>
         <c:crossBetween val="midCat"/>
       </c:valAx>
@@ -1864,10 +1864,10 @@
         <c:manualLayout>
           <c:xMode val="edge"/>
           <c:yMode val="edge"/>
-          <c:x val="0.87188365316683336"/>
-          <c:y val="2.3449005909668289E-3"/>
+          <c:x val="0.87431987548091161"/>
+          <c:y val="8.7970656071302666E-2"/>
           <c:w val="0.12449318155882688"/>
-          <c:h val="0.99282669539230683"/>
+          <c:h val="0.82523230831704308"/>
         </c:manualLayout>
       </c:layout>
       <c:overlay val="0"/>
@@ -1915,9 +1915,9 @@
           <c:layoutTarget val="inner"/>
           <c:xMode val="edge"/>
           <c:yMode val="edge"/>
-          <c:x val="3.1502352528514577E-2"/>
-          <c:y val="1.1317559185698803E-2"/>
-          <c:w val="0.9349618051639087"/>
+          <c:x val="3.1502340444791568E-2"/>
+          <c:y val="1.7890709744229471E-2"/>
+          <c:w val="0.94892271111160964"/>
           <c:h val="0.94675049505287012"/>
         </c:manualLayout>
       </c:layout>
@@ -1929,7 +1929,7 @@
           <c:order val="0"/>
           <c:tx>
             <c:strRef>
-              <c:f>Sheet1!$C$18</c:f>
+              <c:f>Sheet1!$E$18</c:f>
               <c:strCache>
                 <c:ptCount val="1"/>
                 <c:pt idx="0">
@@ -1960,7 +1960,7 @@
           </c:marker>
           <c:xVal>
             <c:numRef>
-              <c:f>Sheet1!$B$19:$B$27</c:f>
+              <c:f>Sheet1!$C$19:$C$27</c:f>
               <c:numCache>
                 <c:formatCode>General</c:formatCode>
                 <c:ptCount val="9"/>
@@ -1996,36 +1996,36 @@
           </c:xVal>
           <c:yVal>
             <c:numRef>
-              <c:f>Sheet1!$C$19:$C$27</c:f>
+              <c:f>Sheet1!$E$19:$E$27</c:f>
               <c:numCache>
                 <c:formatCode>General</c:formatCode>
                 <c:ptCount val="9"/>
                 <c:pt idx="0">
-                  <c:v>151</c:v>
+                  <c:v>7.55</c:v>
                 </c:pt>
                 <c:pt idx="1">
-                  <c:v>280</c:v>
+                  <c:v>14.000000000000002</c:v>
                 </c:pt>
                 <c:pt idx="2">
-                  <c:v>211</c:v>
+                  <c:v>10.549999999999999</c:v>
                 </c:pt>
                 <c:pt idx="3">
-                  <c:v>165</c:v>
+                  <c:v>8.25</c:v>
                 </c:pt>
                 <c:pt idx="4">
-                  <c:v>123</c:v>
+                  <c:v>6.15</c:v>
                 </c:pt>
                 <c:pt idx="5">
-                  <c:v>249</c:v>
+                  <c:v>12.45</c:v>
                 </c:pt>
                 <c:pt idx="6">
-                  <c:v>412</c:v>
+                  <c:v>20.599999999999998</c:v>
                 </c:pt>
                 <c:pt idx="7">
-                  <c:v>615</c:v>
+                  <c:v>30.75</c:v>
                 </c:pt>
                 <c:pt idx="8">
-                  <c:v>405</c:v>
+                  <c:v>20.25</c:v>
                 </c:pt>
               </c:numCache>
             </c:numRef>
@@ -2040,11 +2040,11 @@
           <c:showPercent val="0"/>
           <c:showBubbleSize val="0"/>
         </c:dLbls>
-        <c:axId val="200741832"/>
-        <c:axId val="200742616"/>
+        <c:axId val="280712216"/>
+        <c:axId val="280709472"/>
       </c:scatterChart>
       <c:valAx>
-        <c:axId val="200741832"/>
+        <c:axId val="280712216"/>
         <c:scaling>
           <c:orientation val="minMax"/>
           <c:max val="950"/>
@@ -2056,12 +2056,12 @@
         <c:majorTickMark val="out"/>
         <c:minorTickMark val="none"/>
         <c:tickLblPos val="nextTo"/>
-        <c:crossAx val="200742616"/>
+        <c:crossAx val="280709472"/>
         <c:crosses val="autoZero"/>
         <c:crossBetween val="midCat"/>
       </c:valAx>
       <c:valAx>
-        <c:axId val="200742616"/>
+        <c:axId val="280709472"/>
         <c:scaling>
           <c:orientation val="minMax"/>
           <c:min val="0"/>
@@ -2073,7 +2073,7 @@
         <c:majorTickMark val="out"/>
         <c:minorTickMark val="none"/>
         <c:tickLblPos val="nextTo"/>
-        <c:crossAx val="200741832"/>
+        <c:crossAx val="280712216"/>
         <c:crosses val="autoZero"/>
         <c:crossBetween val="midCat"/>
       </c:valAx>
@@ -5505,14 +5505,10 @@
             </a:r>
             <a:r>
               <a:rPr lang="en-GB" sz="1200" dirty="0"/>
-              <a:t>your spectra measurements at </a:t>
-            </a:r>
-            <a:r>
-              <a:rPr lang="en-GB" sz="1200"/>
-              <a:t>other </a:t>
-            </a:r>
-            <a:r>
-              <a:rPr lang="en-GB" sz="1200" smtClean="0"/>
+              <a:t>your spectra measurements at other </a:t>
+            </a:r>
+            <a:r>
+              <a:rPr lang="en-GB" sz="1200" dirty="0" smtClean="0"/>
               <a:t>lunar phases </a:t>
             </a:r>
             <a:r>
@@ -5596,21 +5592,21 @@
       </p:sp>
       <p:graphicFrame>
         <p:nvGraphicFramePr>
-          <p:cNvPr id="5" name="Chart 4"/>
+          <p:cNvPr id="4" name="Chart 3"/>
           <p:cNvGraphicFramePr>
             <a:graphicFrameLocks/>
           </p:cNvGraphicFramePr>
           <p:nvPr>
             <p:extLst>
               <p:ext uri="{D42A27DB-BD31-4B8C-83A1-F6EECF244321}">
-                <p14:modId xmlns:p14="http://schemas.microsoft.com/office/powerpoint/2010/main" val="2745908023"/>
+                <p14:modId xmlns:p14="http://schemas.microsoft.com/office/powerpoint/2010/main" val="1317737821"/>
               </p:ext>
             </p:extLst>
           </p:nvPr>
         </p:nvGraphicFramePr>
         <p:xfrm>
-          <a:off x="0" y="1525225"/>
-          <a:ext cx="10843771" cy="5267461"/>
+          <a:off x="284389" y="1590539"/>
+          <a:ext cx="10426032" cy="5267461"/>
         </p:xfrm>
         <a:graphic>
           <a:graphicData uri="http://schemas.openxmlformats.org/drawingml/2006/chart">
@@ -5673,86 +5669,6 @@
       </p:sp>
       <p:grpSp>
         <p:nvGrpSpPr>
-          <p:cNvPr id="9" name="Group 8"/>
-          <p:cNvGrpSpPr/>
-          <p:nvPr/>
-        </p:nvGrpSpPr>
-        <p:grpSpPr>
-          <a:xfrm>
-            <a:off x="176495" y="1690688"/>
-            <a:ext cx="7106894" cy="3968940"/>
-            <a:chOff x="176495" y="1690688"/>
-            <a:chExt cx="7147414" cy="3968940"/>
-          </a:xfrm>
-        </p:grpSpPr>
-        <p:graphicFrame>
-          <p:nvGraphicFramePr>
-            <p:cNvPr id="4" name="Chart 3"/>
-            <p:cNvGraphicFramePr>
-              <a:graphicFrameLocks/>
-            </p:cNvGraphicFramePr>
-            <p:nvPr>
-              <p:extLst>
-                <p:ext uri="{D42A27DB-BD31-4B8C-83A1-F6EECF244321}">
-                  <p14:modId xmlns:p14="http://schemas.microsoft.com/office/powerpoint/2010/main" val="63599492"/>
-                </p:ext>
-              </p:extLst>
-            </p:nvPr>
-          </p:nvGraphicFramePr>
-          <p:xfrm>
-            <a:off x="176495" y="1690688"/>
-            <a:ext cx="7147414" cy="3968940"/>
-          </p:xfrm>
-          <a:graphic>
-            <a:graphicData uri="http://schemas.openxmlformats.org/drawingml/2006/chart">
-              <c:chart xmlns:c="http://schemas.openxmlformats.org/drawingml/2006/chart" xmlns:r="http://schemas.openxmlformats.org/officeDocument/2006/relationships" r:id="rId2"/>
-            </a:graphicData>
-          </a:graphic>
-        </p:graphicFrame>
-        <p:sp>
-          <p:nvSpPr>
-            <p:cNvPr id="7" name="Rectangle 6"/>
-            <p:cNvSpPr/>
-            <p:nvPr/>
-          </p:nvSpPr>
-          <p:spPr>
-            <a:xfrm>
-              <a:off x="838200" y="2926081"/>
-              <a:ext cx="3002280" cy="2333897"/>
-            </a:xfrm>
-            <a:prstGeom prst="rect">
-              <a:avLst/>
-            </a:prstGeom>
-            <a:noFill/>
-          </p:spPr>
-          <p:style>
-            <a:lnRef idx="2">
-              <a:schemeClr val="accent1">
-                <a:shade val="50000"/>
-              </a:schemeClr>
-            </a:lnRef>
-            <a:fillRef idx="1">
-              <a:schemeClr val="accent1"/>
-            </a:fillRef>
-            <a:effectRef idx="0">
-              <a:schemeClr val="accent1"/>
-            </a:effectRef>
-            <a:fontRef idx="minor">
-              <a:schemeClr val="lt1"/>
-            </a:fontRef>
-          </p:style>
-          <p:txBody>
-            <a:bodyPr rtlCol="0" anchor="ctr"/>
-            <a:lstStyle/>
-            <a:p>
-              <a:pPr algn="ctr"/>
-              <a:endParaRPr lang="en-GB"/>
-            </a:p>
-          </p:txBody>
-        </p:sp>
-      </p:grpSp>
-      <p:grpSp>
-        <p:nvGrpSpPr>
           <p:cNvPr id="10" name="Group 9"/>
           <p:cNvGrpSpPr/>
           <p:nvPr/>
@@ -5774,7 +5690,7 @@
             <p:nvPr/>
           </p:nvPicPr>
           <p:blipFill>
-            <a:blip r:embed="rId3">
+            <a:blip r:embed="rId2">
               <a:extLst>
                 <a:ext uri="{28A0092B-C50C-407E-A947-70E740481C1C}">
                   <a14:useLocalDpi xmlns:a14="http://schemas.microsoft.com/office/drawing/2010/main" val="0"/>
@@ -5891,6 +5807,86 @@
                 </a:rPr>
                 <a:t>. Available from: https://www.researchgate.net/figure/276212092_fig6_Figure-1-Mean-reflectance-spectra-of-brown-leaf-litter-n-20-and-green-foliage-n [accessed Feb 19, 2016]</a:t>
               </a:r>
+            </a:p>
+          </p:txBody>
+        </p:sp>
+      </p:grpSp>
+      <p:grpSp>
+        <p:nvGrpSpPr>
+          <p:cNvPr id="3" name="Group 2"/>
+          <p:cNvGrpSpPr/>
+          <p:nvPr/>
+        </p:nvGrpSpPr>
+        <p:grpSpPr>
+          <a:xfrm>
+            <a:off x="239632" y="1552163"/>
+            <a:ext cx="7106894" cy="3968940"/>
+            <a:chOff x="3214971" y="1690688"/>
+            <a:chExt cx="7106894" cy="3968940"/>
+          </a:xfrm>
+        </p:grpSpPr>
+        <p:graphicFrame>
+          <p:nvGraphicFramePr>
+            <p:cNvPr id="11" name="Chart 10"/>
+            <p:cNvGraphicFramePr>
+              <a:graphicFrameLocks/>
+            </p:cNvGraphicFramePr>
+            <p:nvPr>
+              <p:extLst>
+                <p:ext uri="{D42A27DB-BD31-4B8C-83A1-F6EECF244321}">
+                  <p14:modId xmlns:p14="http://schemas.microsoft.com/office/powerpoint/2010/main" val="3282992161"/>
+                </p:ext>
+              </p:extLst>
+            </p:nvPr>
+          </p:nvGraphicFramePr>
+          <p:xfrm>
+            <a:off x="3214971" y="1690688"/>
+            <a:ext cx="7106894" cy="3968940"/>
+          </p:xfrm>
+          <a:graphic>
+            <a:graphicData uri="http://schemas.openxmlformats.org/drawingml/2006/chart">
+              <c:chart xmlns:c="http://schemas.openxmlformats.org/drawingml/2006/chart" xmlns:r="http://schemas.openxmlformats.org/officeDocument/2006/relationships" r:id="rId3"/>
+            </a:graphicData>
+          </a:graphic>
+        </p:graphicFrame>
+        <p:sp>
+          <p:nvSpPr>
+            <p:cNvPr id="7" name="Rectangle 6"/>
+            <p:cNvSpPr/>
+            <p:nvPr/>
+          </p:nvSpPr>
+          <p:spPr>
+            <a:xfrm>
+              <a:off x="3839282" y="3016251"/>
+              <a:ext cx="2985260" cy="2333897"/>
+            </a:xfrm>
+            <a:prstGeom prst="rect">
+              <a:avLst/>
+            </a:prstGeom>
+            <a:noFill/>
+          </p:spPr>
+          <p:style>
+            <a:lnRef idx="2">
+              <a:schemeClr val="accent1">
+                <a:shade val="50000"/>
+              </a:schemeClr>
+            </a:lnRef>
+            <a:fillRef idx="1">
+              <a:schemeClr val="accent1"/>
+            </a:fillRef>
+            <a:effectRef idx="0">
+              <a:schemeClr val="accent1"/>
+            </a:effectRef>
+            <a:fontRef idx="minor">
+              <a:schemeClr val="lt1"/>
+            </a:fontRef>
+          </p:style>
+          <p:txBody>
+            <a:bodyPr rtlCol="0" anchor="ctr"/>
+            <a:lstStyle/>
+            <a:p>
+              <a:pPr algn="ctr"/>
+              <a:endParaRPr lang="en-GB"/>
             </a:p>
           </p:txBody>
         </p:sp>

</xml_diff>

<commit_message>
add lines to presentation graphs, add slide explaining calibration
</commit_message>
<xml_diff>
--- a/Spectra.of.the.Moon.using.a.Robotic.Telescope.pptx
+++ b/Spectra.of.the.Moon.using.a.Robotic.Telescope.pptx
@@ -8,7 +8,8 @@
     <p:sldId id="256" r:id="rId2"/>
     <p:sldId id="259" r:id="rId3"/>
     <p:sldId id="257" r:id="rId4"/>
-    <p:sldId id="258" r:id="rId5"/>
+    <p:sldId id="260" r:id="rId5"/>
+    <p:sldId id="258" r:id="rId6"/>
   </p:sldIdLst>
   <p:sldSz cx="12192000" cy="6858000"/>
   <p:notesSz cx="6858000" cy="9144000"/>
@@ -5659,6 +5660,109 @@
           <a:bodyPr/>
           <a:lstStyle/>
           <a:p>
+            <a:endParaRPr lang="en-GB"/>
+          </a:p>
+        </p:txBody>
+      </p:sp>
+      <p:sp>
+        <p:nvSpPr>
+          <p:cNvPr id="3" name="Content Placeholder 2"/>
+          <p:cNvSpPr>
+            <a:spLocks noGrp="1"/>
+          </p:cNvSpPr>
+          <p:nvPr>
+            <p:ph idx="1"/>
+          </p:nvPr>
+        </p:nvSpPr>
+        <p:spPr/>
+        <p:txBody>
+          <a:bodyPr/>
+          <a:lstStyle/>
+          <a:p>
+            <a:r>
+              <a:rPr lang="en-GB" dirty="0" smtClean="0"/>
+              <a:t>“Before </a:t>
+            </a:r>
+            <a:r>
+              <a:rPr lang="en-GB" dirty="0"/>
+              <a:t>analysing a sample it is frequently necessary to check the calibration of the spectrometer that is being used. This is performed by analysing known samples and measuring the error between the empirical and known values for the samples. A skew, or bias, can be introduced into the data handling routines of the data analysis equipment of the spectrometer to </a:t>
+            </a:r>
+            <a:r>
+              <a:rPr lang="en-GB" dirty="0" smtClean="0"/>
+              <a:t>compensate </a:t>
+            </a:r>
+            <a:r>
+              <a:rPr lang="en-GB" dirty="0"/>
+              <a:t>for these differences</a:t>
+            </a:r>
+            <a:r>
+              <a:rPr lang="en-GB" dirty="0" smtClean="0"/>
+              <a:t>.”</a:t>
+            </a:r>
+          </a:p>
+          <a:p>
+            <a:r>
+              <a:rPr lang="en-GB" dirty="0">
+                <a:solidFill>
+                  <a:schemeClr val="tx1">
+                    <a:lumMod val="50000"/>
+                    <a:lumOff val="50000"/>
+                  </a:schemeClr>
+                </a:solidFill>
+              </a:rPr>
+              <a:t>Davies, Anthony MC, and Harald A. Martens. "Method and apparatus for calibrating a spectrometer." U.S. Patent No. 5,321,970. 21 Jun. 1994.</a:t>
+            </a:r>
+          </a:p>
+          <a:p>
+            <a:endParaRPr lang="en-GB" dirty="0"/>
+          </a:p>
+        </p:txBody>
+      </p:sp>
+    </p:spTree>
+    <p:extLst>
+      <p:ext uri="{BB962C8B-B14F-4D97-AF65-F5344CB8AC3E}">
+        <p14:creationId xmlns:p14="http://schemas.microsoft.com/office/powerpoint/2010/main" val="759060608"/>
+      </p:ext>
+    </p:extLst>
+  </p:cSld>
+  <p:clrMapOvr>
+    <a:masterClrMapping/>
+  </p:clrMapOvr>
+</p:sld>
+</file>
+
+<file path=ppt/slides/slide5.xml><?xml version="1.0" encoding="utf-8"?>
+<p:sld xmlns:a="http://schemas.openxmlformats.org/drawingml/2006/main" xmlns:r="http://schemas.openxmlformats.org/officeDocument/2006/relationships" xmlns:p="http://schemas.openxmlformats.org/presentationml/2006/main">
+  <p:cSld>
+    <p:spTree>
+      <p:nvGrpSpPr>
+        <p:cNvPr id="1" name=""/>
+        <p:cNvGrpSpPr/>
+        <p:nvPr/>
+      </p:nvGrpSpPr>
+      <p:grpSpPr>
+        <a:xfrm>
+          <a:off x="0" y="0"/>
+          <a:ext cx="0" cy="0"/>
+          <a:chOff x="0" y="0"/>
+          <a:chExt cx="0" cy="0"/>
+        </a:xfrm>
+      </p:grpSpPr>
+      <p:sp>
+        <p:nvSpPr>
+          <p:cNvPr id="2" name="Title 1"/>
+          <p:cNvSpPr>
+            <a:spLocks noGrp="1"/>
+          </p:cNvSpPr>
+          <p:nvPr>
+            <p:ph type="title"/>
+          </p:nvPr>
+        </p:nvSpPr>
+        <p:spPr/>
+        <p:txBody>
+          <a:bodyPr/>
+          <a:lstStyle/>
+          <a:p>
             <a:r>
               <a:rPr lang="en-GB" dirty="0" smtClean="0"/>
               <a:t>Comparing to Known spectra</a:t>
@@ -5891,6 +5995,126 @@
           </p:txBody>
         </p:sp>
       </p:grpSp>
+      <p:cxnSp>
+        <p:nvCxnSpPr>
+          <p:cNvPr id="16" name="Straight Connector 15"/>
+          <p:cNvCxnSpPr/>
+          <p:nvPr/>
+        </p:nvCxnSpPr>
+        <p:spPr>
+          <a:xfrm>
+            <a:off x="9934575" y="4143375"/>
+            <a:ext cx="0" cy="923925"/>
+          </a:xfrm>
+          <a:prstGeom prst="line">
+            <a:avLst/>
+          </a:prstGeom>
+        </p:spPr>
+        <p:style>
+          <a:lnRef idx="1">
+            <a:schemeClr val="accent1"/>
+          </a:lnRef>
+          <a:fillRef idx="0">
+            <a:schemeClr val="accent1"/>
+          </a:fillRef>
+          <a:effectRef idx="0">
+            <a:schemeClr val="accent1"/>
+          </a:effectRef>
+          <a:fontRef idx="minor">
+            <a:schemeClr val="tx1"/>
+          </a:fontRef>
+        </p:style>
+      </p:cxnSp>
+      <p:cxnSp>
+        <p:nvCxnSpPr>
+          <p:cNvPr id="18" name="Straight Connector 17"/>
+          <p:cNvCxnSpPr/>
+          <p:nvPr/>
+        </p:nvCxnSpPr>
+        <p:spPr>
+          <a:xfrm flipH="1">
+            <a:off x="10690225" y="4448175"/>
+            <a:ext cx="9525" cy="619125"/>
+          </a:xfrm>
+          <a:prstGeom prst="line">
+            <a:avLst/>
+          </a:prstGeom>
+        </p:spPr>
+        <p:style>
+          <a:lnRef idx="1">
+            <a:schemeClr val="accent1"/>
+          </a:lnRef>
+          <a:fillRef idx="0">
+            <a:schemeClr val="accent1"/>
+          </a:fillRef>
+          <a:effectRef idx="0">
+            <a:schemeClr val="accent1"/>
+          </a:effectRef>
+          <a:fontRef idx="minor">
+            <a:schemeClr val="tx1"/>
+          </a:fontRef>
+        </p:style>
+      </p:cxnSp>
+      <p:cxnSp>
+        <p:nvCxnSpPr>
+          <p:cNvPr id="20" name="Straight Connector 19"/>
+          <p:cNvCxnSpPr/>
+          <p:nvPr/>
+        </p:nvCxnSpPr>
+        <p:spPr>
+          <a:xfrm>
+            <a:off x="1828800" y="3829050"/>
+            <a:ext cx="9525" cy="1382573"/>
+          </a:xfrm>
+          <a:prstGeom prst="line">
+            <a:avLst/>
+          </a:prstGeom>
+        </p:spPr>
+        <p:style>
+          <a:lnRef idx="1">
+            <a:schemeClr val="accent1"/>
+          </a:lnRef>
+          <a:fillRef idx="0">
+            <a:schemeClr val="accent1"/>
+          </a:fillRef>
+          <a:effectRef idx="0">
+            <a:schemeClr val="accent1"/>
+          </a:effectRef>
+          <a:fontRef idx="minor">
+            <a:schemeClr val="tx1"/>
+          </a:fontRef>
+        </p:style>
+      </p:cxnSp>
+      <p:cxnSp>
+        <p:nvCxnSpPr>
+          <p:cNvPr id="22" name="Straight Connector 21"/>
+          <p:cNvCxnSpPr/>
+          <p:nvPr/>
+        </p:nvCxnSpPr>
+        <p:spPr>
+          <a:xfrm flipH="1">
+            <a:off x="3181350" y="4143375"/>
+            <a:ext cx="1" cy="1068248"/>
+          </a:xfrm>
+          <a:prstGeom prst="line">
+            <a:avLst/>
+          </a:prstGeom>
+        </p:spPr>
+        <p:style>
+          <a:lnRef idx="1">
+            <a:schemeClr val="accent1"/>
+          </a:lnRef>
+          <a:fillRef idx="0">
+            <a:schemeClr val="accent1"/>
+          </a:fillRef>
+          <a:effectRef idx="0">
+            <a:schemeClr val="accent1"/>
+          </a:effectRef>
+          <a:fontRef idx="minor">
+            <a:schemeClr val="tx1"/>
+          </a:fontRef>
+        </p:style>
+      </p:cxnSp>
     </p:spTree>
     <p:extLst>
       <p:ext uri="{BB962C8B-B14F-4D97-AF65-F5344CB8AC3E}">

</xml_diff>

<commit_message>
Add slides with toms images from doc
</commit_message>
<xml_diff>
--- a/Spectra.of.the.Moon.using.a.Robotic.Telescope.pptx
+++ b/Spectra.of.the.Moon.using.a.Robotic.Telescope.pptx
@@ -10,6 +10,9 @@
     <p:sldId id="257" r:id="rId4"/>
     <p:sldId id="260" r:id="rId5"/>
     <p:sldId id="258" r:id="rId6"/>
+    <p:sldId id="261" r:id="rId7"/>
+    <p:sldId id="262" r:id="rId8"/>
+    <p:sldId id="263" r:id="rId9"/>
   </p:sldIdLst>
   <p:sldSz cx="12192000" cy="6858000"/>
   <p:notesSz cx="6858000" cy="9144000"/>
@@ -1743,11 +1746,11 @@
           <c:showPercent val="0"/>
           <c:showBubbleSize val="0"/>
         </c:dLbls>
-        <c:axId val="10027248"/>
-        <c:axId val="10027640"/>
+        <c:axId val="260869872"/>
+        <c:axId val="260869088"/>
       </c:scatterChart>
       <c:valAx>
-        <c:axId val="10027248"/>
+        <c:axId val="260869872"/>
         <c:scaling>
           <c:orientation val="minMax"/>
           <c:max val="950"/>
@@ -1776,19 +1779,18 @@
               </a:p>
             </c:rich>
           </c:tx>
-          <c:layout/>
           <c:overlay val="0"/>
         </c:title>
         <c:numFmt formatCode="General" sourceLinked="1"/>
         <c:majorTickMark val="out"/>
         <c:minorTickMark val="none"/>
         <c:tickLblPos val="nextTo"/>
-        <c:crossAx val="10027640"/>
+        <c:crossAx val="260869088"/>
         <c:crosses val="autoZero"/>
         <c:crossBetween val="midCat"/>
       </c:valAx>
       <c:valAx>
-        <c:axId val="10027640"/>
+        <c:axId val="260869088"/>
         <c:scaling>
           <c:orientation val="minMax"/>
           <c:max val="100"/>
@@ -1813,14 +1815,13 @@
               </a:p>
             </c:rich>
           </c:tx>
-          <c:layout/>
           <c:overlay val="0"/>
         </c:title>
         <c:numFmt formatCode="General" sourceLinked="1"/>
         <c:majorTickMark val="out"/>
         <c:minorTickMark val="none"/>
         <c:tickLblPos val="nextTo"/>
-        <c:crossAx val="10027248"/>
+        <c:crossAx val="260869872"/>
         <c:crosses val="autoZero"/>
         <c:crossBetween val="midCat"/>
       </c:valAx>
@@ -2041,11 +2042,11 @@
           <c:showPercent val="0"/>
           <c:showBubbleSize val="0"/>
         </c:dLbls>
-        <c:axId val="280712216"/>
-        <c:axId val="280709472"/>
+        <c:axId val="260867912"/>
+        <c:axId val="260866736"/>
       </c:scatterChart>
       <c:valAx>
-        <c:axId val="280712216"/>
+        <c:axId val="260867912"/>
         <c:scaling>
           <c:orientation val="minMax"/>
           <c:max val="950"/>
@@ -2057,12 +2058,12 @@
         <c:majorTickMark val="out"/>
         <c:minorTickMark val="none"/>
         <c:tickLblPos val="nextTo"/>
-        <c:crossAx val="280709472"/>
+        <c:crossAx val="260866736"/>
         <c:crosses val="autoZero"/>
         <c:crossBetween val="midCat"/>
       </c:valAx>
       <c:valAx>
-        <c:axId val="280709472"/>
+        <c:axId val="260866736"/>
         <c:scaling>
           <c:orientation val="minMax"/>
           <c:min val="0"/>
@@ -2074,7 +2075,7 @@
         <c:majorTickMark val="out"/>
         <c:minorTickMark val="none"/>
         <c:tickLblPos val="nextTo"/>
-        <c:crossAx val="280712216"/>
+        <c:crossAx val="260867912"/>
         <c:crosses val="autoZero"/>
         <c:crossBetween val="midCat"/>
       </c:valAx>
@@ -6128,6 +6129,458 @@
 </p:sld>
 </file>
 
+<file path=ppt/slides/slide6.xml><?xml version="1.0" encoding="utf-8"?>
+<p:sld xmlns:a="http://schemas.openxmlformats.org/drawingml/2006/main" xmlns:r="http://schemas.openxmlformats.org/officeDocument/2006/relationships" xmlns:p="http://schemas.openxmlformats.org/presentationml/2006/main">
+  <p:cSld>
+    <p:spTree>
+      <p:nvGrpSpPr>
+        <p:cNvPr id="1" name=""/>
+        <p:cNvGrpSpPr/>
+        <p:nvPr/>
+      </p:nvGrpSpPr>
+      <p:grpSpPr>
+        <a:xfrm>
+          <a:off x="0" y="0"/>
+          <a:ext cx="0" cy="0"/>
+          <a:chOff x="0" y="0"/>
+          <a:chExt cx="0" cy="0"/>
+        </a:xfrm>
+      </p:grpSpPr>
+      <p:sp>
+        <p:nvSpPr>
+          <p:cNvPr id="2" name="Title 1"/>
+          <p:cNvSpPr>
+            <a:spLocks noGrp="1"/>
+          </p:cNvSpPr>
+          <p:nvPr>
+            <p:ph type="title"/>
+          </p:nvPr>
+        </p:nvSpPr>
+        <p:spPr/>
+        <p:txBody>
+          <a:bodyPr/>
+          <a:lstStyle/>
+          <a:p>
+            <a:endParaRPr lang="en-GB"/>
+          </a:p>
+        </p:txBody>
+      </p:sp>
+      <p:sp>
+        <p:nvSpPr>
+          <p:cNvPr id="3" name="Content Placeholder 2"/>
+          <p:cNvSpPr>
+            <a:spLocks noGrp="1"/>
+          </p:cNvSpPr>
+          <p:nvPr>
+            <p:ph idx="1"/>
+          </p:nvPr>
+        </p:nvSpPr>
+        <p:spPr>
+          <a:xfrm>
+            <a:off x="838200" y="1825624"/>
+            <a:ext cx="10515600" cy="4879975"/>
+          </a:xfrm>
+        </p:spPr>
+        <p:txBody>
+          <a:bodyPr>
+            <a:normAutofit/>
+          </a:bodyPr>
+          <a:lstStyle/>
+          <a:p>
+            <a:endParaRPr lang="en-US" i="1" dirty="0" smtClean="0"/>
+          </a:p>
+          <a:p>
+            <a:endParaRPr lang="en-US" i="1" dirty="0"/>
+          </a:p>
+          <a:p>
+            <a:endParaRPr lang="en-US" i="1" dirty="0" smtClean="0"/>
+          </a:p>
+          <a:p>
+            <a:endParaRPr lang="en-US" i="1" dirty="0"/>
+          </a:p>
+          <a:p>
+            <a:endParaRPr lang="en-US" i="1" dirty="0" smtClean="0"/>
+          </a:p>
+          <a:p>
+            <a:endParaRPr lang="en-US" i="1" dirty="0"/>
+          </a:p>
+          <a:p>
+            <a:endParaRPr lang="en-US" i="1" dirty="0" smtClean="0"/>
+          </a:p>
+          <a:p>
+            <a:r>
+              <a:rPr lang="en-US" i="1" dirty="0" smtClean="0">
+                <a:solidFill>
+                  <a:schemeClr val="tx1">
+                    <a:lumMod val="50000"/>
+                    <a:lumOff val="50000"/>
+                  </a:schemeClr>
+                </a:solidFill>
+              </a:rPr>
+              <a:t>Figure </a:t>
+            </a:r>
+            <a:r>
+              <a:rPr lang="en-US" i="1" dirty="0">
+                <a:solidFill>
+                  <a:schemeClr val="tx1">
+                    <a:lumMod val="50000"/>
+                    <a:lumOff val="50000"/>
+                  </a:schemeClr>
+                </a:solidFill>
+              </a:rPr>
+              <a:t>1- Mare Serenitatis (top middle) and Mare </a:t>
+            </a:r>
+            <a:r>
+              <a:rPr lang="en-US" i="1" dirty="0" err="1">
+                <a:solidFill>
+                  <a:schemeClr val="tx1">
+                    <a:lumMod val="50000"/>
+                    <a:lumOff val="50000"/>
+                  </a:schemeClr>
+                </a:solidFill>
+              </a:rPr>
+              <a:t>Tranquillitatis</a:t>
+            </a:r>
+            <a:r>
+              <a:rPr lang="en-US" i="1" dirty="0">
+                <a:solidFill>
+                  <a:schemeClr val="tx1">
+                    <a:lumMod val="50000"/>
+                    <a:lumOff val="50000"/>
+                  </a:schemeClr>
+                </a:solidFill>
+              </a:rPr>
+              <a:t> (right) in R-Band</a:t>
+            </a:r>
+            <a:endParaRPr lang="en-GB" i="1" dirty="0">
+              <a:solidFill>
+                <a:schemeClr val="tx1">
+                  <a:lumMod val="50000"/>
+                  <a:lumOff val="50000"/>
+                </a:schemeClr>
+              </a:solidFill>
+            </a:endParaRPr>
+          </a:p>
+          <a:p>
+            <a:endParaRPr lang="en-GB" dirty="0"/>
+          </a:p>
+        </p:txBody>
+      </p:sp>
+      <p:pic>
+        <p:nvPicPr>
+          <p:cNvPr id="4" name="Picture 3"/>
+          <p:cNvPicPr/>
+          <p:nvPr/>
+        </p:nvPicPr>
+        <p:blipFill>
+          <a:blip r:embed="rId2">
+            <a:extLst>
+              <a:ext uri="{28A0092B-C50C-407E-A947-70E740481C1C}">
+                <a14:useLocalDpi xmlns:a14="http://schemas.microsoft.com/office/drawing/2010/main" val="0"/>
+              </a:ext>
+            </a:extLst>
+          </a:blip>
+          <a:stretch>
+            <a:fillRect/>
+          </a:stretch>
+        </p:blipFill>
+        <p:spPr>
+          <a:xfrm>
+            <a:off x="838200" y="1825625"/>
+            <a:ext cx="5760720" cy="3396615"/>
+          </a:xfrm>
+          <a:prstGeom prst="rect">
+            <a:avLst/>
+          </a:prstGeom>
+        </p:spPr>
+      </p:pic>
+    </p:spTree>
+    <p:extLst>
+      <p:ext uri="{BB962C8B-B14F-4D97-AF65-F5344CB8AC3E}">
+        <p14:creationId xmlns:p14="http://schemas.microsoft.com/office/powerpoint/2010/main" val="1243878959"/>
+      </p:ext>
+    </p:extLst>
+  </p:cSld>
+  <p:clrMapOvr>
+    <a:masterClrMapping/>
+  </p:clrMapOvr>
+</p:sld>
+</file>
+
+<file path=ppt/slides/slide7.xml><?xml version="1.0" encoding="utf-8"?>
+<p:sld xmlns:a="http://schemas.openxmlformats.org/drawingml/2006/main" xmlns:r="http://schemas.openxmlformats.org/officeDocument/2006/relationships" xmlns:p="http://schemas.openxmlformats.org/presentationml/2006/main">
+  <p:cSld>
+    <p:spTree>
+      <p:nvGrpSpPr>
+        <p:cNvPr id="1" name=""/>
+        <p:cNvGrpSpPr/>
+        <p:nvPr/>
+      </p:nvGrpSpPr>
+      <p:grpSpPr>
+        <a:xfrm>
+          <a:off x="0" y="0"/>
+          <a:ext cx="0" cy="0"/>
+          <a:chOff x="0" y="0"/>
+          <a:chExt cx="0" cy="0"/>
+        </a:xfrm>
+      </p:grpSpPr>
+      <p:sp>
+        <p:nvSpPr>
+          <p:cNvPr id="2" name="Title 1"/>
+          <p:cNvSpPr>
+            <a:spLocks noGrp="1"/>
+          </p:cNvSpPr>
+          <p:nvPr>
+            <p:ph type="title"/>
+          </p:nvPr>
+        </p:nvSpPr>
+        <p:spPr/>
+        <p:txBody>
+          <a:bodyPr/>
+          <a:lstStyle/>
+          <a:p>
+            <a:endParaRPr lang="en-GB"/>
+          </a:p>
+        </p:txBody>
+      </p:sp>
+      <p:sp>
+        <p:nvSpPr>
+          <p:cNvPr id="3" name="Content Placeholder 2"/>
+          <p:cNvSpPr>
+            <a:spLocks noGrp="1"/>
+          </p:cNvSpPr>
+          <p:nvPr>
+            <p:ph idx="1"/>
+          </p:nvPr>
+        </p:nvSpPr>
+        <p:spPr/>
+        <p:txBody>
+          <a:bodyPr/>
+          <a:lstStyle/>
+          <a:p>
+            <a:r>
+              <a:rPr lang="en-US" dirty="0"/>
+              <a:t>Combining this photo in RGB with Red representing I-band, Green representing R-band and Blue representing B-band yields the following result:</a:t>
+            </a:r>
+            <a:endParaRPr lang="en-GB" dirty="0"/>
+          </a:p>
+          <a:p>
+            <a:endParaRPr lang="en-GB" dirty="0"/>
+          </a:p>
+        </p:txBody>
+      </p:sp>
+      <p:pic>
+        <p:nvPicPr>
+          <p:cNvPr id="4" name="Picture 3"/>
+          <p:cNvPicPr/>
+          <p:nvPr/>
+        </p:nvPicPr>
+        <p:blipFill>
+          <a:blip r:embed="rId2">
+            <a:extLst>
+              <a:ext uri="{28A0092B-C50C-407E-A947-70E740481C1C}">
+                <a14:useLocalDpi xmlns:a14="http://schemas.microsoft.com/office/drawing/2010/main" val="0"/>
+              </a:ext>
+            </a:extLst>
+          </a:blip>
+          <a:stretch>
+            <a:fillRect/>
+          </a:stretch>
+        </p:blipFill>
+        <p:spPr>
+          <a:xfrm>
+            <a:off x="6781800" y="3481388"/>
+            <a:ext cx="4572000" cy="2695575"/>
+          </a:xfrm>
+          <a:prstGeom prst="rect">
+            <a:avLst/>
+          </a:prstGeom>
+        </p:spPr>
+      </p:pic>
+    </p:spTree>
+    <p:extLst>
+      <p:ext uri="{BB962C8B-B14F-4D97-AF65-F5344CB8AC3E}">
+        <p14:creationId xmlns:p14="http://schemas.microsoft.com/office/powerpoint/2010/main" val="2385396193"/>
+      </p:ext>
+    </p:extLst>
+  </p:cSld>
+  <p:clrMapOvr>
+    <a:masterClrMapping/>
+  </p:clrMapOvr>
+</p:sld>
+</file>
+
+<file path=ppt/slides/slide8.xml><?xml version="1.0" encoding="utf-8"?>
+<p:sld xmlns:a="http://schemas.openxmlformats.org/drawingml/2006/main" xmlns:r="http://schemas.openxmlformats.org/officeDocument/2006/relationships" xmlns:p="http://schemas.openxmlformats.org/presentationml/2006/main">
+  <p:cSld>
+    <p:spTree>
+      <p:nvGrpSpPr>
+        <p:cNvPr id="1" name=""/>
+        <p:cNvGrpSpPr/>
+        <p:nvPr/>
+      </p:nvGrpSpPr>
+      <p:grpSpPr>
+        <a:xfrm>
+          <a:off x="0" y="0"/>
+          <a:ext cx="0" cy="0"/>
+          <a:chOff x="0" y="0"/>
+          <a:chExt cx="0" cy="0"/>
+        </a:xfrm>
+      </p:grpSpPr>
+      <p:sp>
+        <p:nvSpPr>
+          <p:cNvPr id="3" name="Content Placeholder 2"/>
+          <p:cNvSpPr>
+            <a:spLocks noGrp="1"/>
+          </p:cNvSpPr>
+          <p:nvPr>
+            <p:ph idx="1"/>
+          </p:nvPr>
+        </p:nvSpPr>
+        <p:spPr>
+          <a:xfrm>
+            <a:off x="116306" y="397878"/>
+            <a:ext cx="3316706" cy="6318894"/>
+          </a:xfrm>
+        </p:spPr>
+        <p:txBody>
+          <a:bodyPr/>
+          <a:lstStyle/>
+          <a:p>
+            <a:r>
+              <a:rPr lang="en-US" dirty="0"/>
+              <a:t>Comparing this to NASAs spectral composition of the moon shows a similar result where Mare Serenitatis is in the green-yellow part of the spectrum and Mare </a:t>
+            </a:r>
+            <a:r>
+              <a:rPr lang="en-US" dirty="0" err="1"/>
+              <a:t>Tranquillitatis</a:t>
+            </a:r>
+            <a:r>
+              <a:rPr lang="en-US" dirty="0"/>
+              <a:t> is in the blue-purple part.</a:t>
+            </a:r>
+            <a:endParaRPr lang="en-GB" dirty="0"/>
+          </a:p>
+          <a:p>
+            <a:endParaRPr lang="en-GB" dirty="0"/>
+          </a:p>
+        </p:txBody>
+      </p:sp>
+      <p:pic>
+        <p:nvPicPr>
+          <p:cNvPr id="4" name="Picture 3"/>
+          <p:cNvPicPr/>
+          <p:nvPr/>
+        </p:nvPicPr>
+        <p:blipFill>
+          <a:blip r:embed="rId2" cstate="print">
+            <a:extLst>
+              <a:ext uri="{28A0092B-C50C-407E-A947-70E740481C1C}">
+                <a14:useLocalDpi xmlns:a14="http://schemas.microsoft.com/office/drawing/2010/main" val="0"/>
+              </a:ext>
+            </a:extLst>
+          </a:blip>
+          <a:stretch>
+            <a:fillRect/>
+          </a:stretch>
+        </p:blipFill>
+        <p:spPr>
+          <a:xfrm>
+            <a:off x="6023008" y="729006"/>
+            <a:ext cx="5760720" cy="5421630"/>
+          </a:xfrm>
+          <a:prstGeom prst="rect">
+            <a:avLst/>
+          </a:prstGeom>
+        </p:spPr>
+      </p:pic>
+      <p:pic>
+        <p:nvPicPr>
+          <p:cNvPr id="5" name="Picture 4"/>
+          <p:cNvPicPr/>
+          <p:nvPr/>
+        </p:nvPicPr>
+        <p:blipFill>
+          <a:blip r:embed="rId3">
+            <a:extLst>
+              <a:ext uri="{28A0092B-C50C-407E-A947-70E740481C1C}">
+                <a14:useLocalDpi xmlns:a14="http://schemas.microsoft.com/office/drawing/2010/main" val="0"/>
+              </a:ext>
+            </a:extLst>
+          </a:blip>
+          <a:stretch>
+            <a:fillRect/>
+          </a:stretch>
+        </p:blipFill>
+        <p:spPr>
+          <a:xfrm rot="3974466">
+            <a:off x="3183265" y="2733717"/>
+            <a:ext cx="4572000" cy="2695575"/>
+          </a:xfrm>
+          <a:prstGeom prst="rect">
+            <a:avLst/>
+          </a:prstGeom>
+        </p:spPr>
+      </p:pic>
+      <p:sp>
+        <p:nvSpPr>
+          <p:cNvPr id="6" name="Rectangle 5"/>
+          <p:cNvSpPr/>
+          <p:nvPr/>
+        </p:nvSpPr>
+        <p:spPr>
+          <a:xfrm rot="20269449">
+            <a:off x="7014849" y="1615479"/>
+            <a:ext cx="1152078" cy="1975770"/>
+          </a:xfrm>
+          <a:prstGeom prst="rect">
+            <a:avLst/>
+          </a:prstGeom>
+          <a:noFill/>
+          <a:ln w="38100">
+            <a:solidFill>
+              <a:schemeClr val="tx1"/>
+            </a:solidFill>
+          </a:ln>
+        </p:spPr>
+        <p:style>
+          <a:lnRef idx="2">
+            <a:schemeClr val="accent1">
+              <a:shade val="50000"/>
+            </a:schemeClr>
+          </a:lnRef>
+          <a:fillRef idx="1">
+            <a:schemeClr val="accent1"/>
+          </a:fillRef>
+          <a:effectRef idx="0">
+            <a:schemeClr val="accent1"/>
+          </a:effectRef>
+          <a:fontRef idx="minor">
+            <a:schemeClr val="lt1"/>
+          </a:fontRef>
+        </p:style>
+        <p:txBody>
+          <a:bodyPr rtlCol="0" anchor="ctr"/>
+          <a:lstStyle/>
+          <a:p>
+            <a:pPr algn="ctr"/>
+            <a:endParaRPr lang="en-GB"/>
+          </a:p>
+        </p:txBody>
+      </p:sp>
+    </p:spTree>
+    <p:extLst>
+      <p:ext uri="{BB962C8B-B14F-4D97-AF65-F5344CB8AC3E}">
+        <p14:creationId xmlns:p14="http://schemas.microsoft.com/office/powerpoint/2010/main" val="1075502349"/>
+      </p:ext>
+    </p:extLst>
+  </p:cSld>
+  <p:clrMapOvr>
+    <a:masterClrMapping/>
+  </p:clrMapOvr>
+</p:sld>
+</file>
+
 <file path=ppt/theme/theme1.xml><?xml version="1.0" encoding="utf-8"?>
 <a:theme xmlns:a="http://schemas.openxmlformats.org/drawingml/2006/main" name="Office Theme">
   <a:themeElements>

</xml_diff>